<commit_message>
Update "Lab - Final Presentation"
</commit_message>
<xml_diff>
--- a/Lab/REP.pptx
+++ b/Lab/REP.pptx
@@ -5,10 +5,10 @@
     <p:sldMasterId id="2147483648" r:id="rId3"/>
   </p:sldMasterIdLst>
   <p:notesMasterIdLst>
-    <p:notesMasterId r:id="rId18"/>
+    <p:notesMasterId r:id="rId20"/>
   </p:notesMasterIdLst>
   <p:handoutMasterIdLst>
-    <p:handoutMasterId r:id="rId19"/>
+    <p:handoutMasterId r:id="rId21"/>
   </p:handoutMasterIdLst>
   <p:sldIdLst>
     <p:sldId id="282" r:id="rId4"/>
@@ -19,12 +19,14 @@
     <p:sldId id="303" r:id="rId9"/>
     <p:sldId id="296" r:id="rId10"/>
     <p:sldId id="304" r:id="rId11"/>
-    <p:sldId id="305" r:id="rId12"/>
-    <p:sldId id="307" r:id="rId13"/>
-    <p:sldId id="306" r:id="rId14"/>
-    <p:sldId id="308" r:id="rId15"/>
-    <p:sldId id="309" r:id="rId16"/>
-    <p:sldId id="310" r:id="rId17"/>
+    <p:sldId id="312" r:id="rId12"/>
+    <p:sldId id="311" r:id="rId13"/>
+    <p:sldId id="305" r:id="rId14"/>
+    <p:sldId id="307" r:id="rId15"/>
+    <p:sldId id="306" r:id="rId16"/>
+    <p:sldId id="308" r:id="rId17"/>
+    <p:sldId id="309" r:id="rId18"/>
+    <p:sldId id="310" r:id="rId19"/>
   </p:sldIdLst>
   <p:sldSz cx="12192000" cy="6858000"/>
   <p:notesSz cx="6858000" cy="9144000"/>
@@ -238,7 +240,7 @@
                 <a:ea typeface="Microsoft JhengHei UI" panose="020B0604030504040204" pitchFamily="34" charset="-120"/>
                 <a:sym typeface="Microsoft JhengHei UI" panose="020B0604030504040204" pitchFamily="34" charset="-120"/>
               </a:rPr>
-              <a:t>2020/12/21</a:t>
+              <a:t>2020/12/22</a:t>
             </a:fld>
             <a:endParaRPr lang="en-US" altLang="zh-TW" dirty="0">
               <a:latin typeface="Microsoft JhengHei UI" panose="020B0604030504040204" pitchFamily="34" charset="-120"/>
@@ -442,7 +444,7 @@
             <a:fld id="{AA006804-164C-4CDA-8F38-2D5258C292C6}" type="datetime1">
               <a:rPr lang="zh-TW" altLang="en-US" smtClean="0"/>
               <a:pPr/>
-              <a:t>2020/12/21</a:t>
+              <a:t>2020/12/22</a:t>
             </a:fld>
             <a:endParaRPr lang="zh-TW" altLang="en-US" dirty="0"/>
           </a:p>
@@ -885,7 +887,7 @@
     </p:spTree>
     <p:extLst>
       <p:ext uri="{BB962C8B-B14F-4D97-AF65-F5344CB8AC3E}">
-        <p14:creationId xmlns:p14="http://schemas.microsoft.com/office/powerpoint/2010/main" val="2701519937"/>
+        <p14:creationId xmlns:p14="http://schemas.microsoft.com/office/powerpoint/2010/main" val="3214425974"/>
       </p:ext>
     </p:extLst>
   </p:cSld>
@@ -970,7 +972,7 @@
     </p:spTree>
     <p:extLst>
       <p:ext uri="{BB962C8B-B14F-4D97-AF65-F5344CB8AC3E}">
-        <p14:creationId xmlns:p14="http://schemas.microsoft.com/office/powerpoint/2010/main" val="3565233456"/>
+        <p14:creationId xmlns:p14="http://schemas.microsoft.com/office/powerpoint/2010/main" val="409340556"/>
       </p:ext>
     </p:extLst>
   </p:cSld>
@@ -1055,7 +1057,7 @@
     </p:spTree>
     <p:extLst>
       <p:ext uri="{BB962C8B-B14F-4D97-AF65-F5344CB8AC3E}">
-        <p14:creationId xmlns:p14="http://schemas.microsoft.com/office/powerpoint/2010/main" val="2220057016"/>
+        <p14:creationId xmlns:p14="http://schemas.microsoft.com/office/powerpoint/2010/main" val="2701519937"/>
       </p:ext>
     </p:extLst>
   </p:cSld>
@@ -1140,7 +1142,7 @@
     </p:spTree>
     <p:extLst>
       <p:ext uri="{BB962C8B-B14F-4D97-AF65-F5344CB8AC3E}">
-        <p14:creationId xmlns:p14="http://schemas.microsoft.com/office/powerpoint/2010/main" val="2333112210"/>
+        <p14:creationId xmlns:p14="http://schemas.microsoft.com/office/powerpoint/2010/main" val="3565233456"/>
       </p:ext>
     </p:extLst>
   </p:cSld>
@@ -1217,6 +1219,176 @@
               <a:rPr lang="en-ZA" smtClean="0"/>
               <a:pPr/>
               <a:t>14</a:t>
+            </a:fld>
+            <a:endParaRPr lang="en-ZA"/>
+          </a:p>
+        </p:txBody>
+      </p:sp>
+    </p:spTree>
+    <p:extLst>
+      <p:ext uri="{BB962C8B-B14F-4D97-AF65-F5344CB8AC3E}">
+        <p14:creationId xmlns:p14="http://schemas.microsoft.com/office/powerpoint/2010/main" val="2220057016"/>
+      </p:ext>
+    </p:extLst>
+  </p:cSld>
+  <p:clrMapOvr>
+    <a:masterClrMapping/>
+  </p:clrMapOvr>
+</p:notes>
+</file>
+
+<file path=ppt/notesSlides/notesSlide15.xml><?xml version="1.0" encoding="utf-8"?>
+<p:notes xmlns:a="http://schemas.openxmlformats.org/drawingml/2006/main" xmlns:r="http://schemas.openxmlformats.org/officeDocument/2006/relationships" xmlns:p="http://schemas.openxmlformats.org/presentationml/2006/main">
+  <p:cSld>
+    <p:spTree>
+      <p:nvGrpSpPr>
+        <p:cNvPr id="1" name=""/>
+        <p:cNvGrpSpPr/>
+        <p:nvPr/>
+      </p:nvGrpSpPr>
+      <p:grpSpPr>
+        <a:xfrm>
+          <a:off x="0" y="0"/>
+          <a:ext cx="0" cy="0"/>
+          <a:chOff x="0" y="0"/>
+          <a:chExt cx="0" cy="0"/>
+        </a:xfrm>
+      </p:grpSpPr>
+      <p:sp>
+        <p:nvSpPr>
+          <p:cNvPr id="2" name="投影片影像版面配置區 1"/>
+          <p:cNvSpPr>
+            <a:spLocks noGrp="1" noRot="1" noChangeAspect="1"/>
+          </p:cNvSpPr>
+          <p:nvPr>
+            <p:ph type="sldImg"/>
+          </p:nvPr>
+        </p:nvSpPr>
+        <p:spPr/>
+      </p:sp>
+      <p:sp>
+        <p:nvSpPr>
+          <p:cNvPr id="3" name="備忘稿版面配置區 2"/>
+          <p:cNvSpPr>
+            <a:spLocks noGrp="1"/>
+          </p:cNvSpPr>
+          <p:nvPr>
+            <p:ph type="body" idx="1"/>
+          </p:nvPr>
+        </p:nvSpPr>
+        <p:spPr/>
+        <p:txBody>
+          <a:bodyPr/>
+          <a:lstStyle/>
+          <a:p>
+            <a:endParaRPr lang="zh-TW" altLang="en-US" dirty="0"/>
+          </a:p>
+        </p:txBody>
+      </p:sp>
+      <p:sp>
+        <p:nvSpPr>
+          <p:cNvPr id="4" name="投影片編號版面配置區 3"/>
+          <p:cNvSpPr>
+            <a:spLocks noGrp="1"/>
+          </p:cNvSpPr>
+          <p:nvPr>
+            <p:ph type="sldNum" sz="quarter" idx="10"/>
+          </p:nvPr>
+        </p:nvSpPr>
+        <p:spPr/>
+        <p:txBody>
+          <a:bodyPr/>
+          <a:lstStyle/>
+          <a:p>
+            <a:fld id="{8530193B-564F-4854-8A52-728F3FB19C85}" type="slidenum">
+              <a:rPr lang="en-ZA" smtClean="0"/>
+              <a:pPr/>
+              <a:t>15</a:t>
+            </a:fld>
+            <a:endParaRPr lang="en-ZA"/>
+          </a:p>
+        </p:txBody>
+      </p:sp>
+    </p:spTree>
+    <p:extLst>
+      <p:ext uri="{BB962C8B-B14F-4D97-AF65-F5344CB8AC3E}">
+        <p14:creationId xmlns:p14="http://schemas.microsoft.com/office/powerpoint/2010/main" val="2333112210"/>
+      </p:ext>
+    </p:extLst>
+  </p:cSld>
+  <p:clrMapOvr>
+    <a:masterClrMapping/>
+  </p:clrMapOvr>
+</p:notes>
+</file>
+
+<file path=ppt/notesSlides/notesSlide16.xml><?xml version="1.0" encoding="utf-8"?>
+<p:notes xmlns:a="http://schemas.openxmlformats.org/drawingml/2006/main" xmlns:r="http://schemas.openxmlformats.org/officeDocument/2006/relationships" xmlns:p="http://schemas.openxmlformats.org/presentationml/2006/main">
+  <p:cSld>
+    <p:spTree>
+      <p:nvGrpSpPr>
+        <p:cNvPr id="1" name=""/>
+        <p:cNvGrpSpPr/>
+        <p:nvPr/>
+      </p:nvGrpSpPr>
+      <p:grpSpPr>
+        <a:xfrm>
+          <a:off x="0" y="0"/>
+          <a:ext cx="0" cy="0"/>
+          <a:chOff x="0" y="0"/>
+          <a:chExt cx="0" cy="0"/>
+        </a:xfrm>
+      </p:grpSpPr>
+      <p:sp>
+        <p:nvSpPr>
+          <p:cNvPr id="2" name="投影片影像版面配置區 1"/>
+          <p:cNvSpPr>
+            <a:spLocks noGrp="1" noRot="1" noChangeAspect="1"/>
+          </p:cNvSpPr>
+          <p:nvPr>
+            <p:ph type="sldImg"/>
+          </p:nvPr>
+        </p:nvSpPr>
+        <p:spPr/>
+      </p:sp>
+      <p:sp>
+        <p:nvSpPr>
+          <p:cNvPr id="3" name="備忘稿版面配置區 2"/>
+          <p:cNvSpPr>
+            <a:spLocks noGrp="1"/>
+          </p:cNvSpPr>
+          <p:nvPr>
+            <p:ph type="body" idx="1"/>
+          </p:nvPr>
+        </p:nvSpPr>
+        <p:spPr/>
+        <p:txBody>
+          <a:bodyPr/>
+          <a:lstStyle/>
+          <a:p>
+            <a:endParaRPr lang="zh-TW" altLang="en-US" dirty="0"/>
+          </a:p>
+        </p:txBody>
+      </p:sp>
+      <p:sp>
+        <p:nvSpPr>
+          <p:cNvPr id="4" name="投影片編號版面配置區 3"/>
+          <p:cNvSpPr>
+            <a:spLocks noGrp="1"/>
+          </p:cNvSpPr>
+          <p:nvPr>
+            <p:ph type="sldNum" sz="quarter" idx="10"/>
+          </p:nvPr>
+        </p:nvSpPr>
+        <p:spPr/>
+        <p:txBody>
+          <a:bodyPr/>
+          <a:lstStyle/>
+          <a:p>
+            <a:fld id="{8530193B-564F-4854-8A52-728F3FB19C85}" type="slidenum">
+              <a:rPr lang="en-ZA" smtClean="0"/>
+              <a:pPr/>
+              <a:t>16</a:t>
             </a:fld>
             <a:endParaRPr lang="en-ZA"/>
           </a:p>
@@ -1905,7 +2077,7 @@
     </p:spTree>
     <p:extLst>
       <p:ext uri="{BB962C8B-B14F-4D97-AF65-F5344CB8AC3E}">
-        <p14:creationId xmlns:p14="http://schemas.microsoft.com/office/powerpoint/2010/main" val="409340556"/>
+        <p14:creationId xmlns:p14="http://schemas.microsoft.com/office/powerpoint/2010/main" val="1917265971"/>
       </p:ext>
     </p:extLst>
   </p:cSld>
@@ -7958,24 +8130,45 @@
           <a:lstStyle/>
           <a:p>
             <a:pPr rtl="0"/>
+            <a:endParaRPr lang="en-US" altLang="zh-TW" sz="2500" b="1" i="0" dirty="0">
+              <a:latin typeface="+mn-lt"/>
+              <a:ea typeface="Microsoft JhengHei UI" panose="020B0604030504040204" pitchFamily="34" charset="-120"/>
+              <a:sym typeface="Microsoft JhengHei UI" panose="020B0604030504040204" pitchFamily="34" charset="-120"/>
+            </a:endParaRPr>
+          </a:p>
+          <a:p>
+            <a:pPr rtl="0"/>
             <a:r>
               <a:rPr lang="en-US" altLang="zh-TW" sz="2500" b="1" i="0" dirty="0">
                 <a:latin typeface="+mn-lt"/>
                 <a:ea typeface="Microsoft JhengHei UI" panose="020B0604030504040204" pitchFamily="34" charset="-120"/>
                 <a:sym typeface="Microsoft JhengHei UI" panose="020B0604030504040204" pitchFamily="34" charset="-120"/>
               </a:rPr>
-              <a:t>NLP Model</a:t>
-            </a:r>
+              <a:t>Enhancing the Dependency Mechanism of </a:t>
+            </a:r>
+            <a:r>
+              <a:rPr lang="en-US" altLang="zh-TW" sz="2500" b="1" i="0" dirty="0" err="1">
+                <a:latin typeface="+mn-lt"/>
+                <a:ea typeface="Microsoft JhengHei UI" panose="020B0604030504040204" pitchFamily="34" charset="-120"/>
+                <a:sym typeface="Microsoft JhengHei UI" panose="020B0604030504040204" pitchFamily="34" charset="-120"/>
+              </a:rPr>
+              <a:t>RoBERTa</a:t>
+            </a:r>
+            <a:endParaRPr lang="en-US" altLang="zh-TW" sz="2500" b="1" i="0" dirty="0">
+              <a:latin typeface="+mn-lt"/>
+              <a:ea typeface="Microsoft JhengHei UI" panose="020B0604030504040204" pitchFamily="34" charset="-120"/>
+              <a:sym typeface="Microsoft JhengHei UI" panose="020B0604030504040204" pitchFamily="34" charset="-120"/>
+            </a:endParaRPr>
           </a:p>
           <a:p>
             <a:pPr rtl="0"/>
             <a:r>
-              <a:rPr lang="en-US" altLang="zh-TW" sz="2500" b="1" i="0" dirty="0">
+              <a:rPr lang="en-US" altLang="zh-TW" sz="1400" b="1" i="0" dirty="0">
                 <a:latin typeface="+mn-lt"/>
               </a:rPr>
-              <a:t>CSMU MI</a:t>
-            </a:r>
-            <a:endParaRPr lang="en-US" altLang="zh-TW" sz="2500" b="1" i="0" dirty="0">
+              <a:t>			</a:t>
+            </a:r>
+            <a:endParaRPr lang="en-US" altLang="zh-TW" sz="1400" b="1" i="0" dirty="0">
               <a:latin typeface="+mn-lt"/>
               <a:ea typeface="Microsoft JhengHei UI" panose="020B0604030504040204" pitchFamily="34" charset="-120"/>
               <a:sym typeface="Microsoft JhengHei UI" panose="020B0604030504040204" pitchFamily="34" charset="-120"/>
@@ -8072,13 +8265,9 @@
   <p:cSld>
     <p:bg>
       <p:bgPr>
-        <a:blipFill dpi="0" rotWithShape="1">
-          <a:blip r:embed="rId3">
-            <a:alphaModFix amt="56000"/>
-          </a:blip>
-          <a:srcRect/>
-          <a:tile tx="0" ty="0" sx="100000" sy="100000" flip="none" algn="tl"/>
-        </a:blipFill>
+        <a:solidFill>
+          <a:schemeClr val="bg1"/>
+        </a:solidFill>
         <a:effectLst/>
       </p:bgPr>
     </p:bg>
@@ -8126,22 +8315,17 @@
           <a:p>
             <a:r>
               <a:rPr lang="en-US" sz="2800" b="1" dirty="0"/>
-              <a:t>Optimization:  EDM-</a:t>
-            </a:r>
-            <a:r>
-              <a:rPr lang="en-US" sz="2800" b="1" dirty="0" err="1"/>
-              <a:t>RoBERTa</a:t>
-            </a:r>
-            <a:endParaRPr lang="en-US" sz="2800" b="1" dirty="0"/>
-          </a:p>
-        </p:txBody>
-      </p:sp>
-      <p:sp>
-        <p:nvSpPr>
-          <p:cNvPr id="5" name="TextBox 4">
-            <a:extLst>
-              <a:ext uri="{FF2B5EF4-FFF2-40B4-BE49-F238E27FC236}">
-                <a16:creationId xmlns:a16="http://schemas.microsoft.com/office/drawing/2014/main" id="{0F0A5022-A9F2-4143-B927-A449071B04E6}"/>
+              <a:t>Problems with Attention Mechanism</a:t>
+            </a:r>
+          </a:p>
+        </p:txBody>
+      </p:sp>
+      <p:sp>
+        <p:nvSpPr>
+          <p:cNvPr id="13" name="TextBox 5">
+            <a:extLst>
+              <a:ext uri="{FF2B5EF4-FFF2-40B4-BE49-F238E27FC236}">
+                <a16:creationId xmlns:a16="http://schemas.microsoft.com/office/drawing/2014/main" id="{A35F1A04-046B-42E3-9C3B-FFD642B26147}"/>
               </a:ext>
             </a:extLst>
           </p:cNvPr>
@@ -8150,8 +8334,8 @@
         </p:nvSpPr>
         <p:spPr>
           <a:xfrm>
-            <a:off x="952373" y="1568534"/>
-            <a:ext cx="6661567" cy="461665"/>
+            <a:off x="2146013" y="2037722"/>
+            <a:ext cx="2593852" cy="461665"/>
           </a:xfrm>
           <a:prstGeom prst="rect">
             <a:avLst/>
@@ -8165,39 +8349,29 @@
           <a:lstStyle/>
           <a:p>
             <a:pPr marL="342900" indent="-342900">
-              <a:buFont typeface="Arial" panose="020B0604020202020204" pitchFamily="34" charset="0"/>
-              <a:buChar char="•"/>
+              <a:buFont typeface="Wingdings" pitchFamily="2" charset="2"/>
+              <a:buChar char="§"/>
             </a:pPr>
             <a:r>
-              <a:rPr lang="en-US" sz="2400" dirty="0">
+              <a:rPr lang="en-US" sz="2400" b="1" dirty="0">
                 <a:latin typeface="Calibri" panose="020F0502020204030204" pitchFamily="34" charset="0"/>
                 <a:cs typeface="Calibri" panose="020F0502020204030204" pitchFamily="34" charset="0"/>
               </a:rPr>
-              <a:t>Choose the best-performance model: </a:t>
-            </a:r>
-            <a:r>
-              <a:rPr lang="en-US" sz="2400" b="1" dirty="0" err="1">
-                <a:latin typeface="Times New Roman" panose="02020603050405020304" pitchFamily="18" charset="0"/>
-                <a:cs typeface="Times New Roman" panose="02020603050405020304" pitchFamily="18" charset="0"/>
-              </a:rPr>
-              <a:t>RoBERTa</a:t>
-            </a:r>
-            <a:r>
-              <a:rPr lang="en-US" sz="2400" dirty="0">
-                <a:latin typeface="Calibri" panose="020F0502020204030204" pitchFamily="34" charset="0"/>
-                <a:cs typeface="Calibri" panose="020F0502020204030204" pitchFamily="34" charset="0"/>
-              </a:rPr>
-              <a:t> </a:t>
-            </a:r>
-          </a:p>
-        </p:txBody>
-      </p:sp>
-      <p:sp>
-        <p:nvSpPr>
-          <p:cNvPr id="6" name="TextBox 5">
-            <a:extLst>
-              <a:ext uri="{FF2B5EF4-FFF2-40B4-BE49-F238E27FC236}">
-                <a16:creationId xmlns:a16="http://schemas.microsoft.com/office/drawing/2014/main" id="{F0562E0E-EEBC-9146-9A8A-71CE457A66D7}"/>
+              <a:t>Too many heads</a:t>
+            </a:r>
+            <a:endParaRPr lang="en-US" sz="2400" dirty="0">
+              <a:latin typeface="Calibri" panose="020F0502020204030204" pitchFamily="34" charset="0"/>
+              <a:cs typeface="Calibri" panose="020F0502020204030204" pitchFamily="34" charset="0"/>
+            </a:endParaRPr>
+          </a:p>
+        </p:txBody>
+      </p:sp>
+      <p:sp>
+        <p:nvSpPr>
+          <p:cNvPr id="14" name="TextBox 6">
+            <a:extLst>
+              <a:ext uri="{FF2B5EF4-FFF2-40B4-BE49-F238E27FC236}">
+                <a16:creationId xmlns:a16="http://schemas.microsoft.com/office/drawing/2014/main" id="{1DFF8FF5-A1E8-4D4B-9DE1-775A18258604}"/>
               </a:ext>
             </a:extLst>
           </p:cNvPr>
@@ -8206,8 +8380,8 @@
         </p:nvSpPr>
         <p:spPr>
           <a:xfrm>
-            <a:off x="952373" y="2274836"/>
-            <a:ext cx="2593852" cy="461665"/>
+            <a:off x="2146013" y="2605508"/>
+            <a:ext cx="3747949" cy="461665"/>
           </a:xfrm>
           <a:prstGeom prst="rect">
             <a:avLst/>
@@ -8215,122 +8389,103 @@
           <a:noFill/>
         </p:spPr>
         <p:txBody>
+          <a:bodyPr wrap="none" rtlCol="0">
+            <a:spAutoFit/>
+          </a:bodyPr>
+          <a:lstStyle/>
+          <a:p>
+            <a:pPr marL="342900" indent="-342900">
+              <a:buFont typeface="Wingdings" pitchFamily="2" charset="2"/>
+              <a:buChar char="§"/>
+            </a:pPr>
+            <a:r>
+              <a:rPr lang="en-US" sz="2400" b="1" dirty="0">
+                <a:solidFill>
+                  <a:srgbClr val="FF0000"/>
+                </a:solidFill>
+                <a:latin typeface="Calibri" panose="020F0502020204030204" pitchFamily="34" charset="0"/>
+                <a:cs typeface="Calibri" panose="020F0502020204030204" pitchFamily="34" charset="0"/>
+              </a:rPr>
+              <a:t>Valid heads are unknown</a:t>
+            </a:r>
+          </a:p>
+        </p:txBody>
+      </p:sp>
+      <p:sp>
+        <p:nvSpPr>
+          <p:cNvPr id="15" name="TextBox 9">
+            <a:extLst>
+              <a:ext uri="{FF2B5EF4-FFF2-40B4-BE49-F238E27FC236}">
+                <a16:creationId xmlns:a16="http://schemas.microsoft.com/office/drawing/2014/main" id="{4F69F72C-E1BD-4408-B368-6888FC13EC7B}"/>
+              </a:ext>
+            </a:extLst>
+          </p:cNvPr>
+          <p:cNvSpPr txBox="1"/>
+          <p:nvPr/>
+        </p:nvSpPr>
+        <p:spPr>
+          <a:xfrm>
+            <a:off x="2146013" y="3256761"/>
+            <a:ext cx="5458080" cy="830997"/>
+          </a:xfrm>
+          <a:prstGeom prst="rect">
+            <a:avLst/>
+          </a:prstGeom>
+          <a:noFill/>
+        </p:spPr>
+        <p:txBody>
           <a:bodyPr wrap="square" rtlCol="0">
             <a:spAutoFit/>
           </a:bodyPr>
           <a:lstStyle/>
           <a:p>
             <a:pPr marL="342900" indent="-342900">
-              <a:buFont typeface="Arial" panose="020B0604020202020204" pitchFamily="34" charset="0"/>
-              <a:buChar char="•"/>
+              <a:buFont typeface="Wingdings" pitchFamily="2" charset="2"/>
+              <a:buChar char="§"/>
             </a:pPr>
+            <a:r>
+              <a:rPr lang="en-US" sz="2400" b="1" dirty="0">
+                <a:solidFill>
+                  <a:srgbClr val="FF0000"/>
+                </a:solidFill>
+                <a:latin typeface="Calibri" panose="020F0502020204030204" pitchFamily="34" charset="0"/>
+                <a:cs typeface="Calibri" panose="020F0502020204030204" pitchFamily="34" charset="0"/>
+              </a:rPr>
+              <a:t>Deal with “heads”:</a:t>
+            </a:r>
+            <a:br>
+              <a:rPr lang="en-US" sz="2400" b="1" dirty="0">
+                <a:solidFill>
+                  <a:srgbClr val="FF0000"/>
+                </a:solidFill>
+                <a:latin typeface="Calibri" panose="020F0502020204030204" pitchFamily="34" charset="0"/>
+                <a:cs typeface="Calibri" panose="020F0502020204030204" pitchFamily="34" charset="0"/>
+              </a:rPr>
+            </a:br>
+            <a:r>
+              <a:rPr lang="en-US" sz="2400" b="1" dirty="0">
+                <a:solidFill>
+                  <a:srgbClr val="FF0000"/>
+                </a:solidFill>
+                <a:latin typeface="Calibri" panose="020F0502020204030204" pitchFamily="34" charset="0"/>
+                <a:cs typeface="Calibri" panose="020F0502020204030204" pitchFamily="34" charset="0"/>
+              </a:rPr>
+              <a:t>	</a:t>
+            </a:r>
             <a:r>
               <a:rPr lang="en-US" sz="2400" b="1" dirty="0">
                 <a:latin typeface="Calibri" panose="020F0502020204030204" pitchFamily="34" charset="0"/>
                 <a:cs typeface="Calibri" panose="020F0502020204030204" pitchFamily="34" charset="0"/>
               </a:rPr>
-              <a:t>Boom Layer</a:t>
-            </a:r>
-            <a:endParaRPr lang="en-US" sz="2400" dirty="0">
-              <a:latin typeface="Calibri" panose="020F0502020204030204" pitchFamily="34" charset="0"/>
-              <a:cs typeface="Calibri" panose="020F0502020204030204" pitchFamily="34" charset="0"/>
-            </a:endParaRPr>
-          </a:p>
-        </p:txBody>
-      </p:sp>
-      <p:pic>
-        <p:nvPicPr>
-          <p:cNvPr id="7" name="Picture 6">
-            <a:extLst>
-              <a:ext uri="{FF2B5EF4-FFF2-40B4-BE49-F238E27FC236}">
-                <a16:creationId xmlns:a16="http://schemas.microsoft.com/office/drawing/2014/main" id="{03DD16DF-6DDD-1440-BEC6-E2C893E34BBD}"/>
-              </a:ext>
-            </a:extLst>
-          </p:cNvPr>
-          <p:cNvPicPr>
-            <a:picLocks noChangeAspect="1"/>
-          </p:cNvPicPr>
-          <p:nvPr/>
-        </p:nvPicPr>
-        <p:blipFill>
-          <a:blip r:embed="rId4">
-            <a:extLst>
-              <a:ext uri="{28A0092B-C50C-407E-A947-70E740481C1C}">
-                <a14:useLocalDpi xmlns:a14="http://schemas.microsoft.com/office/drawing/2010/main" val="0"/>
-              </a:ext>
-            </a:extLst>
-          </a:blip>
-          <a:stretch>
-            <a:fillRect/>
-          </a:stretch>
-        </p:blipFill>
-        <p:spPr>
-          <a:xfrm>
-            <a:off x="9496950" y="254929"/>
-            <a:ext cx="2356795" cy="6348141"/>
-          </a:xfrm>
-          <a:prstGeom prst="rect">
-            <a:avLst/>
-          </a:prstGeom>
-        </p:spPr>
-      </p:pic>
-      <p:sp>
-        <p:nvSpPr>
-          <p:cNvPr id="14" name="TextBox 13">
-            <a:extLst>
-              <a:ext uri="{FF2B5EF4-FFF2-40B4-BE49-F238E27FC236}">
-                <a16:creationId xmlns:a16="http://schemas.microsoft.com/office/drawing/2014/main" id="{8A847973-0319-9B4F-B5CD-4F522B13162B}"/>
-              </a:ext>
-            </a:extLst>
-          </p:cNvPr>
-          <p:cNvSpPr txBox="1"/>
-          <p:nvPr/>
-        </p:nvSpPr>
-        <p:spPr>
-          <a:xfrm>
-            <a:off x="952373" y="4121500"/>
-            <a:ext cx="7978190" cy="477054"/>
-          </a:xfrm>
-          <a:prstGeom prst="rect">
-            <a:avLst/>
-          </a:prstGeom>
-          <a:noFill/>
-        </p:spPr>
-        <p:txBody>
-          <a:bodyPr wrap="square" rtlCol="0">
-            <a:spAutoFit/>
-          </a:bodyPr>
-          <a:lstStyle/>
-          <a:p>
-            <a:pPr marL="342900" indent="-342900">
-              <a:buFont typeface="Arial" panose="020B0604020202020204" pitchFamily="34" charset="0"/>
-              <a:buChar char="•"/>
-            </a:pPr>
-            <a:r>
-              <a:rPr lang="en-US" sz="2500" b="1" dirty="0">
-                <a:latin typeface="Times New Roman" panose="02020603050405020304" pitchFamily="18" charset="0"/>
-                <a:cs typeface="Times New Roman" panose="02020603050405020304" pitchFamily="18" charset="0"/>
-              </a:rPr>
-              <a:t>Enhancing the Dependency Mechanism of </a:t>
-            </a:r>
-            <a:r>
-              <a:rPr lang="en-US" sz="2500" b="1" dirty="0" err="1">
-                <a:latin typeface="Times New Roman" panose="02020603050405020304" pitchFamily="18" charset="0"/>
-                <a:cs typeface="Times New Roman" panose="02020603050405020304" pitchFamily="18" charset="0"/>
-              </a:rPr>
-              <a:t>RoBERTa</a:t>
-            </a:r>
-            <a:endParaRPr lang="en-US" sz="2500" dirty="0">
-              <a:latin typeface="Times New Roman" panose="02020603050405020304" pitchFamily="18" charset="0"/>
-              <a:cs typeface="Times New Roman" panose="02020603050405020304" pitchFamily="18" charset="0"/>
-            </a:endParaRPr>
+              <a:t>Optimizing the attention process</a:t>
+            </a:r>
           </a:p>
         </p:txBody>
       </p:sp>
     </p:spTree>
     <p:extLst>
       <p:ext uri="{BB962C8B-B14F-4D97-AF65-F5344CB8AC3E}">
-        <p14:creationId xmlns:p14="http://schemas.microsoft.com/office/powerpoint/2010/main" val="2301789250"/>
+        <p14:creationId xmlns:p14="http://schemas.microsoft.com/office/powerpoint/2010/main" val="4156085279"/>
       </p:ext>
     </p:extLst>
   </p:cSld>
@@ -8345,13 +8500,9 @@
   <p:cSld>
     <p:bg>
       <p:bgPr>
-        <a:blipFill dpi="0" rotWithShape="1">
-          <a:blip r:embed="rId3">
-            <a:alphaModFix amt="56000"/>
-          </a:blip>
-          <a:srcRect/>
-          <a:tile tx="0" ty="0" sx="100000" sy="100000" flip="none" algn="tl"/>
-        </a:blipFill>
+        <a:solidFill>
+          <a:schemeClr val="bg1"/>
+        </a:solidFill>
         <a:effectLst/>
       </p:bgPr>
     </p:bg>
@@ -8399,17 +8550,105 @@
           <a:p>
             <a:r>
               <a:rPr lang="en-US" sz="2800" b="1" dirty="0"/>
-              <a:t>Optimization: Statistics</a:t>
-            </a:r>
+              <a:t>Optimization</a:t>
+            </a:r>
+          </a:p>
+        </p:txBody>
+      </p:sp>
+      <p:sp>
+        <p:nvSpPr>
+          <p:cNvPr id="5" name="TextBox 4">
+            <a:extLst>
+              <a:ext uri="{FF2B5EF4-FFF2-40B4-BE49-F238E27FC236}">
+                <a16:creationId xmlns:a16="http://schemas.microsoft.com/office/drawing/2014/main" id="{0F0A5022-A9F2-4143-B927-A449071B04E6}"/>
+              </a:ext>
+            </a:extLst>
+          </p:cNvPr>
+          <p:cNvSpPr txBox="1"/>
+          <p:nvPr/>
+        </p:nvSpPr>
+        <p:spPr>
+          <a:xfrm>
+            <a:off x="952373" y="1568534"/>
+            <a:ext cx="4364656" cy="461665"/>
+          </a:xfrm>
+          <a:prstGeom prst="rect">
+            <a:avLst/>
+          </a:prstGeom>
+          <a:noFill/>
+        </p:spPr>
+        <p:txBody>
+          <a:bodyPr wrap="none" rtlCol="0">
+            <a:spAutoFit/>
+          </a:bodyPr>
+          <a:lstStyle/>
+          <a:p>
+            <a:pPr marL="342900" indent="-342900">
+              <a:buFont typeface="Arial" panose="020B0604020202020204" pitchFamily="34" charset="0"/>
+              <a:buChar char="•"/>
+            </a:pPr>
+            <a:r>
+              <a:rPr lang="en-US" sz="2400" dirty="0">
+                <a:latin typeface="Calibri" panose="020F0502020204030204" pitchFamily="34" charset="0"/>
+                <a:cs typeface="Calibri" panose="020F0502020204030204" pitchFamily="34" charset="0"/>
+              </a:rPr>
+              <a:t>Single-headed RNN (SHA-RNN)</a:t>
+            </a:r>
+          </a:p>
+        </p:txBody>
+      </p:sp>
+      <p:sp>
+        <p:nvSpPr>
+          <p:cNvPr id="6" name="TextBox 5">
+            <a:extLst>
+              <a:ext uri="{FF2B5EF4-FFF2-40B4-BE49-F238E27FC236}">
+                <a16:creationId xmlns:a16="http://schemas.microsoft.com/office/drawing/2014/main" id="{F0562E0E-EEBC-9146-9A8A-71CE457A66D7}"/>
+              </a:ext>
+            </a:extLst>
+          </p:cNvPr>
+          <p:cNvSpPr txBox="1"/>
+          <p:nvPr/>
+        </p:nvSpPr>
+        <p:spPr>
+          <a:xfrm>
+            <a:off x="1516652" y="2219787"/>
+            <a:ext cx="2593852" cy="461665"/>
+          </a:xfrm>
+          <a:prstGeom prst="rect">
+            <a:avLst/>
+          </a:prstGeom>
+          <a:noFill/>
+        </p:spPr>
+        <p:txBody>
+          <a:bodyPr wrap="square" rtlCol="0">
+            <a:spAutoFit/>
+          </a:bodyPr>
+          <a:lstStyle/>
+          <a:p>
+            <a:pPr marL="342900" indent="-342900">
+              <a:buFont typeface="Wingdings" pitchFamily="2" charset="2"/>
+              <a:buChar char="§"/>
+            </a:pPr>
+            <a:r>
+              <a:rPr lang="en-US" sz="2400" b="1" dirty="0">
+                <a:latin typeface="Calibri" panose="020F0502020204030204" pitchFamily="34" charset="0"/>
+                <a:cs typeface="Calibri" panose="020F0502020204030204" pitchFamily="34" charset="0"/>
+              </a:rPr>
+              <a:t>Boom Layer</a:t>
+            </a:r>
+            <a:endParaRPr lang="en-US" sz="2400" dirty="0">
+              <a:latin typeface="Calibri" panose="020F0502020204030204" pitchFamily="34" charset="0"/>
+              <a:cs typeface="Calibri" panose="020F0502020204030204" pitchFamily="34" charset="0"/>
+            </a:endParaRPr>
           </a:p>
         </p:txBody>
       </p:sp>
       <p:pic>
         <p:nvPicPr>
-          <p:cNvPr id="7" name="Picture 6">
-            <a:extLst>
-              <a:ext uri="{FF2B5EF4-FFF2-40B4-BE49-F238E27FC236}">
-                <a16:creationId xmlns:a16="http://schemas.microsoft.com/office/drawing/2014/main" id="{3EA49A00-B665-BB4E-8414-F14A25C37FAF}"/>
+          <p:cNvPr id="4" name="Picture 3">
+            <a:extLst>
+              <a:ext uri="{FF2B5EF4-FFF2-40B4-BE49-F238E27FC236}">
+                <a16:creationId xmlns:a16="http://schemas.microsoft.com/office/drawing/2014/main" id="{C37648F9-7CB8-0A41-831D-BCB3F0DA04B2}"/>
               </a:ext>
             </a:extLst>
           </p:cNvPr>
@@ -8419,7 +8658,7 @@
           <p:nvPr/>
         </p:nvPicPr>
         <p:blipFill>
-          <a:blip r:embed="rId4">
+          <a:blip r:embed="rId3">
             <a:extLst>
               <a:ext uri="{28A0092B-C50C-407E-A947-70E740481C1C}">
                 <a14:useLocalDpi xmlns:a14="http://schemas.microsoft.com/office/drawing/2010/main" val="0"/>
@@ -8432,54 +8671,204 @@
         </p:blipFill>
         <p:spPr>
           <a:xfrm>
-            <a:off x="817123" y="1479649"/>
-            <a:ext cx="8716836" cy="2237989"/>
+            <a:off x="2285999" y="2871040"/>
+            <a:ext cx="6519559" cy="623384"/>
           </a:xfrm>
           <a:prstGeom prst="rect">
             <a:avLst/>
           </a:prstGeom>
         </p:spPr>
       </p:pic>
-      <p:pic>
-        <p:nvPicPr>
-          <p:cNvPr id="9" name="Picture 8">
-            <a:extLst>
-              <a:ext uri="{FF2B5EF4-FFF2-40B4-BE49-F238E27FC236}">
-                <a16:creationId xmlns:a16="http://schemas.microsoft.com/office/drawing/2014/main" id="{039B4765-42F5-9541-BC34-8ACF710B3366}"/>
-              </a:ext>
-            </a:extLst>
-          </p:cNvPr>
-          <p:cNvPicPr>
-            <a:picLocks noChangeAspect="1"/>
-          </p:cNvPicPr>
+      <p:sp>
+        <p:nvSpPr>
+          <p:cNvPr id="11" name="TextBox 10">
+            <a:extLst>
+              <a:ext uri="{FF2B5EF4-FFF2-40B4-BE49-F238E27FC236}">
+                <a16:creationId xmlns:a16="http://schemas.microsoft.com/office/drawing/2014/main" id="{047DF914-B467-334D-87BF-6ED281A9340C}"/>
+              </a:ext>
+            </a:extLst>
+          </p:cNvPr>
+          <p:cNvSpPr txBox="1"/>
           <p:nvPr/>
-        </p:nvPicPr>
-        <p:blipFill>
-          <a:blip r:embed="rId5">
-            <a:extLst>
-              <a:ext uri="{28A0092B-C50C-407E-A947-70E740481C1C}">
-                <a14:useLocalDpi xmlns:a14="http://schemas.microsoft.com/office/drawing/2010/main" val="0"/>
-              </a:ext>
-            </a:extLst>
-          </a:blip>
-          <a:stretch>
-            <a:fillRect/>
-          </a:stretch>
-        </p:blipFill>
-        <p:spPr>
-          <a:xfrm>
-            <a:off x="2869660" y="4330567"/>
-            <a:ext cx="9015380" cy="2237989"/>
+        </p:nvSpPr>
+        <p:spPr>
+          <a:xfrm>
+            <a:off x="1516652" y="3684012"/>
+            <a:ext cx="7578710" cy="461665"/>
           </a:xfrm>
           <a:prstGeom prst="rect">
             <a:avLst/>
           </a:prstGeom>
-        </p:spPr>
-      </p:pic>
+          <a:noFill/>
+        </p:spPr>
+        <p:txBody>
+          <a:bodyPr wrap="square" rtlCol="0">
+            <a:spAutoFit/>
+          </a:bodyPr>
+          <a:lstStyle/>
+          <a:p>
+            <a:pPr marL="342900" indent="-342900">
+              <a:buFont typeface="Wingdings" pitchFamily="2" charset="2"/>
+              <a:buChar char="§"/>
+            </a:pPr>
+            <a:r>
+              <a:rPr lang="en-US" sz="2400" b="1" dirty="0">
+                <a:latin typeface="Calibri" panose="020F0502020204030204" pitchFamily="34" charset="0"/>
+                <a:cs typeface="Calibri" panose="020F0502020204030204" pitchFamily="34" charset="0"/>
+              </a:rPr>
+              <a:t>Activation Function:   </a:t>
+            </a:r>
+            <a:r>
+              <a:rPr lang="en-US" sz="2400" dirty="0">
+                <a:latin typeface="Times New Roman" panose="02020603050405020304" pitchFamily="18" charset="0"/>
+                <a:cs typeface="Times New Roman" panose="02020603050405020304" pitchFamily="18" charset="0"/>
+              </a:rPr>
+              <a:t>Gaussian Linear Unit (</a:t>
+            </a:r>
+            <a:r>
+              <a:rPr lang="en-US" sz="2400" dirty="0" err="1">
+                <a:latin typeface="Times New Roman" panose="02020603050405020304" pitchFamily="18" charset="0"/>
+                <a:cs typeface="Times New Roman" panose="02020603050405020304" pitchFamily="18" charset="0"/>
+              </a:rPr>
+              <a:t>GeLU</a:t>
+            </a:r>
+            <a:r>
+              <a:rPr lang="en-US" sz="2400" dirty="0">
+                <a:latin typeface="Times New Roman" panose="02020603050405020304" pitchFamily="18" charset="0"/>
+                <a:cs typeface="Times New Roman" panose="02020603050405020304" pitchFamily="18" charset="0"/>
+              </a:rPr>
+              <a:t>)</a:t>
+            </a:r>
+          </a:p>
+        </p:txBody>
+      </p:sp>
+      <p:sp>
+        <p:nvSpPr>
+          <p:cNvPr id="12" name="TextBox 11">
+            <a:extLst>
+              <a:ext uri="{FF2B5EF4-FFF2-40B4-BE49-F238E27FC236}">
+                <a16:creationId xmlns:a16="http://schemas.microsoft.com/office/drawing/2014/main" id="{87F6B32E-0BBB-5943-984B-398FF49AE20E}"/>
+              </a:ext>
+            </a:extLst>
+          </p:cNvPr>
+          <p:cNvSpPr txBox="1"/>
+          <p:nvPr/>
+        </p:nvSpPr>
+        <p:spPr>
+          <a:xfrm>
+            <a:off x="952373" y="4496984"/>
+            <a:ext cx="5692392" cy="461665"/>
+          </a:xfrm>
+          <a:prstGeom prst="rect">
+            <a:avLst/>
+          </a:prstGeom>
+          <a:noFill/>
+        </p:spPr>
+        <p:txBody>
+          <a:bodyPr wrap="none" rtlCol="0">
+            <a:spAutoFit/>
+          </a:bodyPr>
+          <a:lstStyle/>
+          <a:p>
+            <a:pPr marL="342900" indent="-342900">
+              <a:buFont typeface="Arial" panose="020B0604020202020204" pitchFamily="34" charset="0"/>
+              <a:buChar char="•"/>
+            </a:pPr>
+            <a:r>
+              <a:rPr lang="en-US" sz="2400" dirty="0">
+                <a:latin typeface="Calibri" panose="020F0502020204030204" pitchFamily="34" charset="0"/>
+                <a:cs typeface="Calibri" panose="020F0502020204030204" pitchFamily="34" charset="0"/>
+              </a:rPr>
+              <a:t>Models: BERT, </a:t>
+            </a:r>
+            <a:r>
+              <a:rPr lang="en-US" sz="2400" dirty="0" err="1">
+                <a:latin typeface="Calibri" panose="020F0502020204030204" pitchFamily="34" charset="0"/>
+                <a:cs typeface="Calibri" panose="020F0502020204030204" pitchFamily="34" charset="0"/>
+              </a:rPr>
+              <a:t>RoBERTa</a:t>
+            </a:r>
+            <a:r>
+              <a:rPr lang="en-US" sz="2400" dirty="0">
+                <a:latin typeface="Calibri" panose="020F0502020204030204" pitchFamily="34" charset="0"/>
+                <a:cs typeface="Calibri" panose="020F0502020204030204" pitchFamily="34" charset="0"/>
+              </a:rPr>
+              <a:t>, </a:t>
+            </a:r>
+            <a:r>
+              <a:rPr lang="en-US" sz="2400" dirty="0" err="1">
+                <a:latin typeface="Calibri" panose="020F0502020204030204" pitchFamily="34" charset="0"/>
+                <a:cs typeface="Calibri" panose="020F0502020204030204" pitchFamily="34" charset="0"/>
+              </a:rPr>
+              <a:t>DistilBERT</a:t>
+            </a:r>
+            <a:r>
+              <a:rPr lang="en-US" sz="2400" dirty="0">
+                <a:latin typeface="Calibri" panose="020F0502020204030204" pitchFamily="34" charset="0"/>
+                <a:cs typeface="Calibri" panose="020F0502020204030204" pitchFamily="34" charset="0"/>
+              </a:rPr>
+              <a:t>, </a:t>
+            </a:r>
+            <a:r>
+              <a:rPr lang="en-US" sz="2400" dirty="0" err="1">
+                <a:latin typeface="Calibri" panose="020F0502020204030204" pitchFamily="34" charset="0"/>
+                <a:cs typeface="Calibri" panose="020F0502020204030204" pitchFamily="34" charset="0"/>
+              </a:rPr>
+              <a:t>XLNet</a:t>
+            </a:r>
+            <a:endParaRPr lang="en-US" sz="2400" dirty="0">
+              <a:latin typeface="Calibri" panose="020F0502020204030204" pitchFamily="34" charset="0"/>
+              <a:cs typeface="Calibri" panose="020F0502020204030204" pitchFamily="34" charset="0"/>
+            </a:endParaRPr>
+          </a:p>
+        </p:txBody>
+      </p:sp>
+      <p:sp>
+        <p:nvSpPr>
+          <p:cNvPr id="13" name="TextBox 12">
+            <a:extLst>
+              <a:ext uri="{FF2B5EF4-FFF2-40B4-BE49-F238E27FC236}">
+                <a16:creationId xmlns:a16="http://schemas.microsoft.com/office/drawing/2014/main" id="{EF565234-AACD-4849-9DD1-72F925B48DE6}"/>
+              </a:ext>
+            </a:extLst>
+          </p:cNvPr>
+          <p:cNvSpPr txBox="1"/>
+          <p:nvPr/>
+        </p:nvSpPr>
+        <p:spPr>
+          <a:xfrm>
+            <a:off x="952373" y="5289466"/>
+            <a:ext cx="10008317" cy="461665"/>
+          </a:xfrm>
+          <a:prstGeom prst="rect">
+            <a:avLst/>
+          </a:prstGeom>
+          <a:noFill/>
+        </p:spPr>
+        <p:txBody>
+          <a:bodyPr wrap="none" rtlCol="0">
+            <a:spAutoFit/>
+          </a:bodyPr>
+          <a:lstStyle/>
+          <a:p>
+            <a:pPr marL="342900" indent="-342900">
+              <a:buFont typeface="Arial" panose="020B0604020202020204" pitchFamily="34" charset="0"/>
+              <a:buChar char="•"/>
+            </a:pPr>
+            <a:r>
+              <a:rPr lang="en-US" sz="2400" b="1" dirty="0">
+                <a:latin typeface="Calibri" panose="020F0502020204030204" pitchFamily="34" charset="0"/>
+                <a:cs typeface="Calibri" panose="020F0502020204030204" pitchFamily="34" charset="0"/>
+              </a:rPr>
+              <a:t>Solving the short-term dependency problem of Transformer-based Models</a:t>
+            </a:r>
+          </a:p>
+        </p:txBody>
+      </p:sp>
     </p:spTree>
     <p:extLst>
       <p:ext uri="{BB962C8B-B14F-4D97-AF65-F5344CB8AC3E}">
-        <p14:creationId xmlns:p14="http://schemas.microsoft.com/office/powerpoint/2010/main" val="1987724706"/>
+        <p14:creationId xmlns:p14="http://schemas.microsoft.com/office/powerpoint/2010/main" val="1030187098"/>
       </p:ext>
     </p:extLst>
   </p:cSld>
@@ -8494,13 +8883,9 @@
   <p:cSld>
     <p:bg>
       <p:bgPr>
-        <a:blipFill dpi="0" rotWithShape="1">
-          <a:blip r:embed="rId3">
-            <a:alphaModFix amt="56000"/>
-          </a:blip>
-          <a:srcRect/>
-          <a:tile tx="0" ty="0" sx="100000" sy="100000" flip="none" algn="tl"/>
-        </a:blipFill>
+        <a:solidFill>
+          <a:schemeClr val="bg1"/>
+        </a:solidFill>
         <a:effectLst/>
       </p:bgPr>
     </p:bg>
@@ -8533,7 +8918,7 @@
         <p:spPr>
           <a:xfrm>
             <a:off x="616225" y="569844"/>
-            <a:ext cx="11008328" cy="523220"/>
+            <a:ext cx="9500541" cy="523220"/>
           </a:xfrm>
           <a:prstGeom prst="rect">
             <a:avLst/>
@@ -8548,30 +8933,124 @@
           <a:p>
             <a:r>
               <a:rPr lang="en-US" sz="2800" b="1" dirty="0"/>
-              <a:t>EDM-</a:t>
+              <a:t>Optimization:  EDM-</a:t>
             </a:r>
             <a:r>
               <a:rPr lang="en-US" sz="2800" b="1" dirty="0" err="1"/>
               <a:t>RoBERTa</a:t>
             </a:r>
-            <a:r>
-              <a:rPr lang="en-US" sz="2800" b="1" dirty="0"/>
-              <a:t>: Enhancing the Dependency Structure of </a:t>
-            </a:r>
-            <a:r>
-              <a:rPr lang="en-US" sz="2800" b="1" dirty="0" err="1"/>
+            <a:endParaRPr lang="en-US" sz="2800" b="1" dirty="0"/>
+          </a:p>
+        </p:txBody>
+      </p:sp>
+      <p:sp>
+        <p:nvSpPr>
+          <p:cNvPr id="5" name="TextBox 4">
+            <a:extLst>
+              <a:ext uri="{FF2B5EF4-FFF2-40B4-BE49-F238E27FC236}">
+                <a16:creationId xmlns:a16="http://schemas.microsoft.com/office/drawing/2014/main" id="{0F0A5022-A9F2-4143-B927-A449071B04E6}"/>
+              </a:ext>
+            </a:extLst>
+          </p:cNvPr>
+          <p:cNvSpPr txBox="1"/>
+          <p:nvPr/>
+        </p:nvSpPr>
+        <p:spPr>
+          <a:xfrm>
+            <a:off x="952373" y="1568534"/>
+            <a:ext cx="6661567" cy="461665"/>
+          </a:xfrm>
+          <a:prstGeom prst="rect">
+            <a:avLst/>
+          </a:prstGeom>
+          <a:noFill/>
+        </p:spPr>
+        <p:txBody>
+          <a:bodyPr wrap="none" rtlCol="0">
+            <a:spAutoFit/>
+          </a:bodyPr>
+          <a:lstStyle/>
+          <a:p>
+            <a:pPr marL="342900" indent="-342900">
+              <a:buFont typeface="Arial" panose="020B0604020202020204" pitchFamily="34" charset="0"/>
+              <a:buChar char="•"/>
+            </a:pPr>
+            <a:r>
+              <a:rPr lang="en-US" sz="2400" dirty="0">
+                <a:latin typeface="Calibri" panose="020F0502020204030204" pitchFamily="34" charset="0"/>
+                <a:cs typeface="Calibri" panose="020F0502020204030204" pitchFamily="34" charset="0"/>
+              </a:rPr>
+              <a:t>Choose the best-performance model: </a:t>
+            </a:r>
+            <a:r>
+              <a:rPr lang="en-US" sz="2400" b="1" dirty="0" err="1">
+                <a:latin typeface="Times New Roman" panose="02020603050405020304" pitchFamily="18" charset="0"/>
+                <a:cs typeface="Times New Roman" panose="02020603050405020304" pitchFamily="18" charset="0"/>
+              </a:rPr>
               <a:t>RoBERTa</a:t>
             </a:r>
-            <a:endParaRPr lang="en-US" sz="2800" b="1" dirty="0"/>
+            <a:r>
+              <a:rPr lang="en-US" sz="2400" dirty="0">
+                <a:latin typeface="Calibri" panose="020F0502020204030204" pitchFamily="34" charset="0"/>
+                <a:cs typeface="Calibri" panose="020F0502020204030204" pitchFamily="34" charset="0"/>
+              </a:rPr>
+              <a:t> </a:t>
+            </a:r>
+          </a:p>
+        </p:txBody>
+      </p:sp>
+      <p:sp>
+        <p:nvSpPr>
+          <p:cNvPr id="6" name="TextBox 5">
+            <a:extLst>
+              <a:ext uri="{FF2B5EF4-FFF2-40B4-BE49-F238E27FC236}">
+                <a16:creationId xmlns:a16="http://schemas.microsoft.com/office/drawing/2014/main" id="{F0562E0E-EEBC-9146-9A8A-71CE457A66D7}"/>
+              </a:ext>
+            </a:extLst>
+          </p:cNvPr>
+          <p:cNvSpPr txBox="1"/>
+          <p:nvPr/>
+        </p:nvSpPr>
+        <p:spPr>
+          <a:xfrm>
+            <a:off x="952373" y="2376449"/>
+            <a:ext cx="6661566" cy="461665"/>
+          </a:xfrm>
+          <a:prstGeom prst="rect">
+            <a:avLst/>
+          </a:prstGeom>
+          <a:noFill/>
+        </p:spPr>
+        <p:txBody>
+          <a:bodyPr wrap="square" rtlCol="0">
+            <a:spAutoFit/>
+          </a:bodyPr>
+          <a:lstStyle/>
+          <a:p>
+            <a:pPr marL="342900" indent="-342900">
+              <a:buFont typeface="Arial" panose="020B0604020202020204" pitchFamily="34" charset="0"/>
+              <a:buChar char="•"/>
+            </a:pPr>
+            <a:r>
+              <a:rPr lang="en-US" sz="2400" b="1" dirty="0">
+                <a:latin typeface="Calibri" panose="020F0502020204030204" pitchFamily="34" charset="0"/>
+                <a:cs typeface="Calibri" panose="020F0502020204030204" pitchFamily="34" charset="0"/>
+              </a:rPr>
+              <a:t>Re-organization: Optimizing with Boom Layer</a:t>
+            </a:r>
+            <a:endParaRPr lang="en-US" sz="2400" dirty="0">
+              <a:latin typeface="Calibri" panose="020F0502020204030204" pitchFamily="34" charset="0"/>
+              <a:cs typeface="Calibri" panose="020F0502020204030204" pitchFamily="34" charset="0"/>
+            </a:endParaRPr>
           </a:p>
         </p:txBody>
       </p:sp>
       <p:pic>
         <p:nvPicPr>
-          <p:cNvPr id="4" name="Picture 3">
-            <a:extLst>
-              <a:ext uri="{FF2B5EF4-FFF2-40B4-BE49-F238E27FC236}">
-                <a16:creationId xmlns:a16="http://schemas.microsoft.com/office/drawing/2014/main" id="{01A05A17-4134-CB42-BA18-D7A967D0F2DB}"/>
+          <p:cNvPr id="7" name="Picture 6">
+            <a:extLst>
+              <a:ext uri="{FF2B5EF4-FFF2-40B4-BE49-F238E27FC236}">
+                <a16:creationId xmlns:a16="http://schemas.microsoft.com/office/drawing/2014/main" id="{03DD16DF-6DDD-1440-BEC6-E2C893E34BBD}"/>
               </a:ext>
             </a:extLst>
           </p:cNvPr>
@@ -8581,7 +9060,7 @@
           <p:nvPr/>
         </p:nvPicPr>
         <p:blipFill>
-          <a:blip r:embed="rId4">
+          <a:blip r:embed="rId3">
             <a:extLst>
               <a:ext uri="{28A0092B-C50C-407E-A947-70E740481C1C}">
                 <a14:useLocalDpi xmlns:a14="http://schemas.microsoft.com/office/drawing/2010/main" val="0"/>
@@ -8594,8 +9073,8 @@
         </p:blipFill>
         <p:spPr>
           <a:xfrm>
-            <a:off x="1595337" y="2944314"/>
-            <a:ext cx="9766570" cy="1904236"/>
+            <a:off x="9091898" y="138352"/>
+            <a:ext cx="2483877" cy="6690442"/>
           </a:xfrm>
           <a:prstGeom prst="rect">
             <a:avLst/>
@@ -8604,10 +9083,10 @@
       </p:pic>
       <p:sp>
         <p:nvSpPr>
-          <p:cNvPr id="5" name="TextBox 4">
-            <a:extLst>
-              <a:ext uri="{FF2B5EF4-FFF2-40B4-BE49-F238E27FC236}">
-                <a16:creationId xmlns:a16="http://schemas.microsoft.com/office/drawing/2014/main" id="{7143B78D-B6B3-474D-B531-66EC4DED1CA1}"/>
+          <p:cNvPr id="14" name="TextBox 13">
+            <a:extLst>
+              <a:ext uri="{FF2B5EF4-FFF2-40B4-BE49-F238E27FC236}">
+                <a16:creationId xmlns:a16="http://schemas.microsoft.com/office/drawing/2014/main" id="{8A847973-0319-9B4F-B5CD-4F522B13162B}"/>
               </a:ext>
             </a:extLst>
           </p:cNvPr>
@@ -8616,8 +9095,8 @@
         </p:nvSpPr>
         <p:spPr>
           <a:xfrm>
-            <a:off x="1322962" y="1780162"/>
-            <a:ext cx="5985293" cy="477054"/>
+            <a:off x="667117" y="3722402"/>
+            <a:ext cx="8424781" cy="477054"/>
           </a:xfrm>
           <a:prstGeom prst="rect">
             <a:avLst/>
@@ -8625,31 +9104,36 @@
           <a:noFill/>
         </p:spPr>
         <p:txBody>
-          <a:bodyPr wrap="none" rtlCol="0">
+          <a:bodyPr wrap="square" rtlCol="0">
             <a:spAutoFit/>
           </a:bodyPr>
           <a:lstStyle/>
           <a:p>
-            <a:pPr marL="342900" indent="-342900">
-              <a:buFont typeface="Arial" panose="020B0604020202020204" pitchFamily="34" charset="0"/>
-              <a:buChar char="•"/>
-            </a:pPr>
-            <a:r>
-              <a:rPr lang="en-US" sz="2500" b="1" dirty="0"/>
-              <a:t>Detailed parameters of EDM-</a:t>
-            </a:r>
-            <a:r>
-              <a:rPr lang="en-US" sz="2500" b="1" dirty="0" err="1"/>
+            <a:r>
+              <a:rPr lang="en-US" sz="2500" b="1" dirty="0">
+                <a:latin typeface="Times New Roman" panose="02020603050405020304" pitchFamily="18" charset="0"/>
+                <a:cs typeface="Times New Roman" panose="02020603050405020304" pitchFamily="18" charset="0"/>
+              </a:rPr>
+              <a:t>Target: Enhancing the Dependency Mechanism of </a:t>
+            </a:r>
+            <a:r>
+              <a:rPr lang="en-US" sz="2500" b="1" dirty="0" err="1">
+                <a:latin typeface="Times New Roman" panose="02020603050405020304" pitchFamily="18" charset="0"/>
+                <a:cs typeface="Times New Roman" panose="02020603050405020304" pitchFamily="18" charset="0"/>
+              </a:rPr>
               <a:t>RoBERTa</a:t>
             </a:r>
-            <a:endParaRPr lang="en-US" sz="2500" b="1" dirty="0"/>
+            <a:endParaRPr lang="en-US" sz="2500" dirty="0">
+              <a:latin typeface="Times New Roman" panose="02020603050405020304" pitchFamily="18" charset="0"/>
+              <a:cs typeface="Times New Roman" panose="02020603050405020304" pitchFamily="18" charset="0"/>
+            </a:endParaRPr>
           </a:p>
         </p:txBody>
       </p:sp>
     </p:spTree>
     <p:extLst>
       <p:ext uri="{BB962C8B-B14F-4D97-AF65-F5344CB8AC3E}">
-        <p14:creationId xmlns:p14="http://schemas.microsoft.com/office/powerpoint/2010/main" val="266460702"/>
+        <p14:creationId xmlns:p14="http://schemas.microsoft.com/office/powerpoint/2010/main" val="2301789250"/>
       </p:ext>
     </p:extLst>
   </p:cSld>
@@ -8664,13 +9148,9 @@
   <p:cSld>
     <p:bg>
       <p:bgPr>
-        <a:blipFill dpi="0" rotWithShape="1">
-          <a:blip r:embed="rId3">
-            <a:alphaModFix amt="56000"/>
-          </a:blip>
-          <a:srcRect/>
-          <a:tile tx="0" ty="0" sx="100000" sy="100000" flip="none" algn="tl"/>
-        </a:blipFill>
+        <a:solidFill>
+          <a:schemeClr val="bg1"/>
+        </a:solidFill>
         <a:effectLst/>
       </p:bgPr>
     </p:bg>
@@ -8703,7 +9183,7 @@
         <p:spPr>
           <a:xfrm>
             <a:off x="616225" y="569844"/>
-            <a:ext cx="11008328" cy="523220"/>
+            <a:ext cx="9500541" cy="523220"/>
           </a:xfrm>
           <a:prstGeom prst="rect">
             <a:avLst/>
@@ -8718,17 +9198,53 @@
           <a:p>
             <a:r>
               <a:rPr lang="en-US" sz="2800" b="1" dirty="0"/>
-              <a:t>Environments</a:t>
+              <a:t>Optimization: Statistics</a:t>
             </a:r>
           </a:p>
         </p:txBody>
       </p:sp>
       <p:pic>
         <p:nvPicPr>
-          <p:cNvPr id="6" name="Picture 5">
-            <a:extLst>
-              <a:ext uri="{FF2B5EF4-FFF2-40B4-BE49-F238E27FC236}">
-                <a16:creationId xmlns:a16="http://schemas.microsoft.com/office/drawing/2014/main" id="{138C9CDB-FB79-7B43-A512-EBA1A3B74DFD}"/>
+          <p:cNvPr id="7" name="Picture 6">
+            <a:extLst>
+              <a:ext uri="{FF2B5EF4-FFF2-40B4-BE49-F238E27FC236}">
+                <a16:creationId xmlns:a16="http://schemas.microsoft.com/office/drawing/2014/main" id="{3EA49A00-B665-BB4E-8414-F14A25C37FAF}"/>
+              </a:ext>
+            </a:extLst>
+          </p:cNvPr>
+          <p:cNvPicPr>
+            <a:picLocks noChangeAspect="1"/>
+          </p:cNvPicPr>
+          <p:nvPr/>
+        </p:nvPicPr>
+        <p:blipFill>
+          <a:blip r:embed="rId3">
+            <a:extLst>
+              <a:ext uri="{28A0092B-C50C-407E-A947-70E740481C1C}">
+                <a14:useLocalDpi xmlns:a14="http://schemas.microsoft.com/office/drawing/2010/main" val="0"/>
+              </a:ext>
+            </a:extLst>
+          </a:blip>
+          <a:stretch>
+            <a:fillRect/>
+          </a:stretch>
+        </p:blipFill>
+        <p:spPr>
+          <a:xfrm>
+            <a:off x="817123" y="1479649"/>
+            <a:ext cx="8716836" cy="2237989"/>
+          </a:xfrm>
+          <a:prstGeom prst="rect">
+            <a:avLst/>
+          </a:prstGeom>
+        </p:spPr>
+      </p:pic>
+      <p:pic>
+        <p:nvPicPr>
+          <p:cNvPr id="9" name="Picture 8">
+            <a:extLst>
+              <a:ext uri="{FF2B5EF4-FFF2-40B4-BE49-F238E27FC236}">
+                <a16:creationId xmlns:a16="http://schemas.microsoft.com/office/drawing/2014/main" id="{039B4765-42F5-9541-BC34-8ACF710B3366}"/>
               </a:ext>
             </a:extLst>
           </p:cNvPr>
@@ -8751,8 +9267,8 @@
         </p:blipFill>
         <p:spPr>
           <a:xfrm>
-            <a:off x="540194" y="1812004"/>
-            <a:ext cx="11111611" cy="3674396"/>
+            <a:off x="2869660" y="4330567"/>
+            <a:ext cx="9015380" cy="2237989"/>
           </a:xfrm>
           <a:prstGeom prst="rect">
             <a:avLst/>
@@ -8762,7 +9278,7 @@
     </p:spTree>
     <p:extLst>
       <p:ext uri="{BB962C8B-B14F-4D97-AF65-F5344CB8AC3E}">
-        <p14:creationId xmlns:p14="http://schemas.microsoft.com/office/powerpoint/2010/main" val="1320879586"/>
+        <p14:creationId xmlns:p14="http://schemas.microsoft.com/office/powerpoint/2010/main" val="1987724706"/>
       </p:ext>
     </p:extLst>
   </p:cSld>
@@ -8777,13 +9293,9 @@
   <p:cSld>
     <p:bg>
       <p:bgPr>
-        <a:blipFill dpi="0" rotWithShape="1">
-          <a:blip r:embed="rId3">
-            <a:alphaModFix amt="56000"/>
-          </a:blip>
-          <a:srcRect/>
-          <a:tile tx="0" ty="0" sx="100000" sy="100000" flip="none" algn="tl"/>
-        </a:blipFill>
+        <a:solidFill>
+          <a:schemeClr val="bg1"/>
+        </a:solidFill>
         <a:effectLst/>
       </p:bgPr>
     </p:bg>
@@ -8831,15 +9343,108 @@
           <a:p>
             <a:r>
               <a:rPr lang="en-US" sz="2800" b="1" dirty="0"/>
-              <a:t>Conclusions</a:t>
-            </a:r>
+              <a:t>EDM-</a:t>
+            </a:r>
+            <a:r>
+              <a:rPr lang="en-US" sz="2800" b="1" dirty="0" err="1"/>
+              <a:t>RoBERTa</a:t>
+            </a:r>
+            <a:r>
+              <a:rPr lang="en-US" sz="2800" b="1" dirty="0"/>
+              <a:t>: Enhancing the Dependency Structure of </a:t>
+            </a:r>
+            <a:r>
+              <a:rPr lang="en-US" sz="2800" b="1" dirty="0" err="1"/>
+              <a:t>RoBERTa</a:t>
+            </a:r>
+            <a:endParaRPr lang="en-US" sz="2800" b="1" dirty="0"/>
+          </a:p>
+        </p:txBody>
+      </p:sp>
+      <p:pic>
+        <p:nvPicPr>
+          <p:cNvPr id="4" name="Picture 3">
+            <a:extLst>
+              <a:ext uri="{FF2B5EF4-FFF2-40B4-BE49-F238E27FC236}">
+                <a16:creationId xmlns:a16="http://schemas.microsoft.com/office/drawing/2014/main" id="{01A05A17-4134-CB42-BA18-D7A967D0F2DB}"/>
+              </a:ext>
+            </a:extLst>
+          </p:cNvPr>
+          <p:cNvPicPr>
+            <a:picLocks noChangeAspect="1"/>
+          </p:cNvPicPr>
+          <p:nvPr/>
+        </p:nvPicPr>
+        <p:blipFill>
+          <a:blip r:embed="rId3">
+            <a:extLst>
+              <a:ext uri="{28A0092B-C50C-407E-A947-70E740481C1C}">
+                <a14:useLocalDpi xmlns:a14="http://schemas.microsoft.com/office/drawing/2010/main" val="0"/>
+              </a:ext>
+            </a:extLst>
+          </a:blip>
+          <a:stretch>
+            <a:fillRect/>
+          </a:stretch>
+        </p:blipFill>
+        <p:spPr>
+          <a:xfrm>
+            <a:off x="1589975" y="2907884"/>
+            <a:ext cx="9012050" cy="1757124"/>
+          </a:xfrm>
+          <a:prstGeom prst="rect">
+            <a:avLst/>
+          </a:prstGeom>
+        </p:spPr>
+      </p:pic>
+      <p:sp>
+        <p:nvSpPr>
+          <p:cNvPr id="5" name="TextBox 4">
+            <a:extLst>
+              <a:ext uri="{FF2B5EF4-FFF2-40B4-BE49-F238E27FC236}">
+                <a16:creationId xmlns:a16="http://schemas.microsoft.com/office/drawing/2014/main" id="{7143B78D-B6B3-474D-B531-66EC4DED1CA1}"/>
+              </a:ext>
+            </a:extLst>
+          </p:cNvPr>
+          <p:cNvSpPr txBox="1"/>
+          <p:nvPr/>
+        </p:nvSpPr>
+        <p:spPr>
+          <a:xfrm>
+            <a:off x="1322962" y="1780162"/>
+            <a:ext cx="5985293" cy="477054"/>
+          </a:xfrm>
+          <a:prstGeom prst="rect">
+            <a:avLst/>
+          </a:prstGeom>
+          <a:noFill/>
+        </p:spPr>
+        <p:txBody>
+          <a:bodyPr wrap="none" rtlCol="0">
+            <a:spAutoFit/>
+          </a:bodyPr>
+          <a:lstStyle/>
+          <a:p>
+            <a:pPr marL="342900" indent="-342900">
+              <a:buFont typeface="Arial" panose="020B0604020202020204" pitchFamily="34" charset="0"/>
+              <a:buChar char="•"/>
+            </a:pPr>
+            <a:r>
+              <a:rPr lang="en-US" sz="2500" b="1" dirty="0"/>
+              <a:t>Detailed parameters of EDM-</a:t>
+            </a:r>
+            <a:r>
+              <a:rPr lang="en-US" sz="2500" b="1" dirty="0" err="1"/>
+              <a:t>RoBERTa</a:t>
+            </a:r>
+            <a:endParaRPr lang="en-US" sz="2500" b="1" dirty="0"/>
           </a:p>
         </p:txBody>
       </p:sp>
     </p:spTree>
     <p:extLst>
       <p:ext uri="{BB962C8B-B14F-4D97-AF65-F5344CB8AC3E}">
-        <p14:creationId xmlns:p14="http://schemas.microsoft.com/office/powerpoint/2010/main" val="1742442189"/>
+        <p14:creationId xmlns:p14="http://schemas.microsoft.com/office/powerpoint/2010/main" val="266460702"/>
       </p:ext>
     </p:extLst>
   </p:cSld>
@@ -8849,19 +9454,14 @@
 </p:sld>
 </file>
 
-<file path=ppt/slides/slide2.xml><?xml version="1.0" encoding="utf-8"?>
+<file path=ppt/slides/slide15.xml><?xml version="1.0" encoding="utf-8"?>
 <p:sld xmlns:a="http://schemas.openxmlformats.org/drawingml/2006/main" xmlns:r="http://schemas.openxmlformats.org/officeDocument/2006/relationships" xmlns:p="http://schemas.openxmlformats.org/presentationml/2006/main">
   <p:cSld>
     <p:bg>
       <p:bgPr>
-        <a:blipFill dpi="0" rotWithShape="1">
-          <a:blip r:embed="rId3">
-            <a:alphaModFix amt="56000"/>
-            <a:lum/>
-          </a:blip>
-          <a:srcRect/>
-          <a:tile tx="0" ty="0" sx="100000" sy="100000" flip="none" algn="tl"/>
-        </a:blipFill>
+        <a:solidFill>
+          <a:schemeClr val="bg1"/>
+        </a:solidFill>
         <a:effectLst/>
       </p:bgPr>
     </p:bg>
@@ -8881,10 +9481,10 @@
       </p:grpSpPr>
       <p:sp>
         <p:nvSpPr>
-          <p:cNvPr id="3" name="TextBox 2">
-            <a:extLst>
-              <a:ext uri="{FF2B5EF4-FFF2-40B4-BE49-F238E27FC236}">
-                <a16:creationId xmlns:a16="http://schemas.microsoft.com/office/drawing/2014/main" id="{5EE55C47-AE59-E04E-9F74-44AF926D0C17}"/>
+          <p:cNvPr id="2" name="文字方塊 9">
+            <a:extLst>
+              <a:ext uri="{FF2B5EF4-FFF2-40B4-BE49-F238E27FC236}">
+                <a16:creationId xmlns:a16="http://schemas.microsoft.com/office/drawing/2014/main" id="{1472181F-E1C9-5B4B-AC5F-B6ABF9C576B7}"/>
               </a:ext>
             </a:extLst>
           </p:cNvPr>
@@ -8893,8 +9493,8 @@
         </p:nvSpPr>
         <p:spPr>
           <a:xfrm>
-            <a:off x="451836" y="449466"/>
-            <a:ext cx="8843318" cy="1015663"/>
+            <a:off x="616225" y="569844"/>
+            <a:ext cx="11008328" cy="523220"/>
           </a:xfrm>
           <a:prstGeom prst="rect">
             <a:avLst/>
@@ -8902,43 +9502,98 @@
           <a:noFill/>
         </p:spPr>
         <p:txBody>
-          <a:bodyPr wrap="none" rtlCol="0">
+          <a:bodyPr wrap="square" rtlCol="0">
             <a:spAutoFit/>
           </a:bodyPr>
           <a:lstStyle/>
           <a:p>
             <a:r>
-              <a:rPr lang="en-US" sz="3000" b="1" dirty="0"/>
-              <a:t>Enhancing the Dependency Mechanism of </a:t>
-            </a:r>
-            <a:r>
-              <a:rPr lang="en-US" sz="3000" b="1" dirty="0" err="1"/>
-              <a:t>RoBERTa</a:t>
-            </a:r>
-            <a:endParaRPr lang="en-US" sz="3000" b="1" dirty="0"/>
-          </a:p>
-          <a:p>
-            <a:r>
-              <a:rPr lang="en-US" sz="3000" b="1" dirty="0"/>
-              <a:t>(EDM-</a:t>
-            </a:r>
-            <a:r>
-              <a:rPr lang="en-US" sz="3000" b="1" dirty="0" err="1"/>
-              <a:t>RoBERTa</a:t>
-            </a:r>
-            <a:r>
-              <a:rPr lang="en-US" sz="3000" b="1" dirty="0"/>
-              <a:t>)</a:t>
-            </a:r>
-          </a:p>
-        </p:txBody>
-      </p:sp>
-      <p:sp>
-        <p:nvSpPr>
-          <p:cNvPr id="4" name="TextBox 3">
-            <a:extLst>
-              <a:ext uri="{FF2B5EF4-FFF2-40B4-BE49-F238E27FC236}">
-                <a16:creationId xmlns:a16="http://schemas.microsoft.com/office/drawing/2014/main" id="{1DB80405-79F9-894C-BEFE-7E73F99E0F76}"/>
+              <a:rPr lang="en-US" sz="2800" b="1" dirty="0"/>
+              <a:t>Environments</a:t>
+            </a:r>
+          </a:p>
+        </p:txBody>
+      </p:sp>
+      <p:pic>
+        <p:nvPicPr>
+          <p:cNvPr id="6" name="Picture 5">
+            <a:extLst>
+              <a:ext uri="{FF2B5EF4-FFF2-40B4-BE49-F238E27FC236}">
+                <a16:creationId xmlns:a16="http://schemas.microsoft.com/office/drawing/2014/main" id="{138C9CDB-FB79-7B43-A512-EBA1A3B74DFD}"/>
+              </a:ext>
+            </a:extLst>
+          </p:cNvPr>
+          <p:cNvPicPr>
+            <a:picLocks noChangeAspect="1"/>
+          </p:cNvPicPr>
+          <p:nvPr/>
+        </p:nvPicPr>
+        <p:blipFill>
+          <a:blip r:embed="rId3">
+            <a:extLst>
+              <a:ext uri="{28A0092B-C50C-407E-A947-70E740481C1C}">
+                <a14:useLocalDpi xmlns:a14="http://schemas.microsoft.com/office/drawing/2010/main" val="0"/>
+              </a:ext>
+            </a:extLst>
+          </a:blip>
+          <a:stretch>
+            <a:fillRect/>
+          </a:stretch>
+        </p:blipFill>
+        <p:spPr>
+          <a:xfrm>
+            <a:off x="540194" y="1812004"/>
+            <a:ext cx="11111611" cy="3674396"/>
+          </a:xfrm>
+          <a:prstGeom prst="rect">
+            <a:avLst/>
+          </a:prstGeom>
+        </p:spPr>
+      </p:pic>
+    </p:spTree>
+    <p:extLst>
+      <p:ext uri="{BB962C8B-B14F-4D97-AF65-F5344CB8AC3E}">
+        <p14:creationId xmlns:p14="http://schemas.microsoft.com/office/powerpoint/2010/main" val="1320879586"/>
+      </p:ext>
+    </p:extLst>
+  </p:cSld>
+  <p:clrMapOvr>
+    <a:masterClrMapping/>
+  </p:clrMapOvr>
+</p:sld>
+</file>
+
+<file path=ppt/slides/slide16.xml><?xml version="1.0" encoding="utf-8"?>
+<p:sld xmlns:a="http://schemas.openxmlformats.org/drawingml/2006/main" xmlns:r="http://schemas.openxmlformats.org/officeDocument/2006/relationships" xmlns:p="http://schemas.openxmlformats.org/presentationml/2006/main">
+  <p:cSld>
+    <p:bg>
+      <p:bgPr>
+        <a:solidFill>
+          <a:schemeClr val="bg1"/>
+        </a:solidFill>
+        <a:effectLst/>
+      </p:bgPr>
+    </p:bg>
+    <p:spTree>
+      <p:nvGrpSpPr>
+        <p:cNvPr id="1" name=""/>
+        <p:cNvGrpSpPr/>
+        <p:nvPr/>
+      </p:nvGrpSpPr>
+      <p:grpSpPr>
+        <a:xfrm>
+          <a:off x="0" y="0"/>
+          <a:ext cx="0" cy="0"/>
+          <a:chOff x="0" y="0"/>
+          <a:chExt cx="0" cy="0"/>
+        </a:xfrm>
+      </p:grpSpPr>
+      <p:sp>
+        <p:nvSpPr>
+          <p:cNvPr id="2" name="文字方塊 9">
+            <a:extLst>
+              <a:ext uri="{FF2B5EF4-FFF2-40B4-BE49-F238E27FC236}">
+                <a16:creationId xmlns:a16="http://schemas.microsoft.com/office/drawing/2014/main" id="{1472181F-E1C9-5B4B-AC5F-B6ABF9C576B7}"/>
               </a:ext>
             </a:extLst>
           </p:cNvPr>
@@ -8947,8 +9602,8 @@
         </p:nvSpPr>
         <p:spPr>
           <a:xfrm>
-            <a:off x="924128" y="2013626"/>
-            <a:ext cx="5513689" cy="477054"/>
+            <a:off x="616225" y="569844"/>
+            <a:ext cx="11008328" cy="523220"/>
           </a:xfrm>
           <a:prstGeom prst="rect">
             <a:avLst/>
@@ -8956,6 +9611,122 @@
           <a:noFill/>
         </p:spPr>
         <p:txBody>
+          <a:bodyPr wrap="square" rtlCol="0">
+            <a:spAutoFit/>
+          </a:bodyPr>
+          <a:lstStyle/>
+          <a:p>
+            <a:r>
+              <a:rPr lang="en-US" sz="2800" b="1" dirty="0"/>
+              <a:t>Conclusions</a:t>
+            </a:r>
+          </a:p>
+        </p:txBody>
+      </p:sp>
+    </p:spTree>
+    <p:extLst>
+      <p:ext uri="{BB962C8B-B14F-4D97-AF65-F5344CB8AC3E}">
+        <p14:creationId xmlns:p14="http://schemas.microsoft.com/office/powerpoint/2010/main" val="1742442189"/>
+      </p:ext>
+    </p:extLst>
+  </p:cSld>
+  <p:clrMapOvr>
+    <a:masterClrMapping/>
+  </p:clrMapOvr>
+</p:sld>
+</file>
+
+<file path=ppt/slides/slide2.xml><?xml version="1.0" encoding="utf-8"?>
+<p:sld xmlns:a="http://schemas.openxmlformats.org/drawingml/2006/main" xmlns:r="http://schemas.openxmlformats.org/officeDocument/2006/relationships" xmlns:p="http://schemas.openxmlformats.org/presentationml/2006/main">
+  <p:cSld>
+    <p:spTree>
+      <p:nvGrpSpPr>
+        <p:cNvPr id="1" name=""/>
+        <p:cNvGrpSpPr/>
+        <p:nvPr/>
+      </p:nvGrpSpPr>
+      <p:grpSpPr>
+        <a:xfrm>
+          <a:off x="0" y="0"/>
+          <a:ext cx="0" cy="0"/>
+          <a:chOff x="0" y="0"/>
+          <a:chExt cx="0" cy="0"/>
+        </a:xfrm>
+      </p:grpSpPr>
+      <p:sp>
+        <p:nvSpPr>
+          <p:cNvPr id="3" name="TextBox 2">
+            <a:extLst>
+              <a:ext uri="{FF2B5EF4-FFF2-40B4-BE49-F238E27FC236}">
+                <a16:creationId xmlns:a16="http://schemas.microsoft.com/office/drawing/2014/main" id="{5EE55C47-AE59-E04E-9F74-44AF926D0C17}"/>
+              </a:ext>
+            </a:extLst>
+          </p:cNvPr>
+          <p:cNvSpPr txBox="1"/>
+          <p:nvPr/>
+        </p:nvSpPr>
+        <p:spPr>
+          <a:xfrm>
+            <a:off x="284256" y="551471"/>
+            <a:ext cx="12156683" cy="553998"/>
+          </a:xfrm>
+          <a:prstGeom prst="rect">
+            <a:avLst/>
+          </a:prstGeom>
+          <a:noFill/>
+        </p:spPr>
+        <p:txBody>
+          <a:bodyPr wrap="square" rtlCol="0">
+            <a:spAutoFit/>
+          </a:bodyPr>
+          <a:lstStyle/>
+          <a:p>
+            <a:r>
+              <a:rPr lang="en-US" sz="3000" b="1" dirty="0"/>
+              <a:t>Enhancing the Dependency Mechanism of </a:t>
+            </a:r>
+            <a:r>
+              <a:rPr lang="en-US" sz="3000" b="1" dirty="0" err="1"/>
+              <a:t>RoBERTa</a:t>
+            </a:r>
+            <a:r>
+              <a:rPr lang="en-US" sz="3000" b="1" dirty="0"/>
+              <a:t>  (EDM-</a:t>
+            </a:r>
+            <a:r>
+              <a:rPr lang="en-US" sz="3000" b="1" dirty="0" err="1"/>
+              <a:t>RoBERTa</a:t>
+            </a:r>
+            <a:r>
+              <a:rPr lang="en-US" sz="3000" b="1" dirty="0"/>
+              <a:t>)</a:t>
+            </a:r>
+          </a:p>
+        </p:txBody>
+      </p:sp>
+      <p:sp>
+        <p:nvSpPr>
+          <p:cNvPr id="4" name="TextBox 3">
+            <a:extLst>
+              <a:ext uri="{FF2B5EF4-FFF2-40B4-BE49-F238E27FC236}">
+                <a16:creationId xmlns:a16="http://schemas.microsoft.com/office/drawing/2014/main" id="{1DB80405-79F9-894C-BEFE-7E73F99E0F76}"/>
+              </a:ext>
+            </a:extLst>
+          </p:cNvPr>
+          <p:cNvSpPr txBox="1"/>
+          <p:nvPr/>
+        </p:nvSpPr>
+        <p:spPr>
+          <a:xfrm>
+            <a:off x="875285" y="1441953"/>
+            <a:ext cx="10394449" cy="477054"/>
+          </a:xfrm>
+          <a:prstGeom prst="rect">
+            <a:avLst/>
+          </a:prstGeom>
+          <a:noFill/>
+        </p:spPr>
+        <p:txBody>
           <a:bodyPr wrap="none" rtlCol="0">
             <a:spAutoFit/>
           </a:bodyPr>
@@ -8967,11 +9738,47 @@
             </a:pPr>
             <a:r>
               <a:rPr lang="en-US" sz="2500" b="1" dirty="0"/>
-              <a:t>Learning Language Representations</a:t>
-            </a:r>
-          </a:p>
-        </p:txBody>
-      </p:sp>
+              <a:t>Learning Language Representations: Word Vector (Word Embeddings) </a:t>
+            </a:r>
+          </a:p>
+        </p:txBody>
+      </p:sp>
+      <p:pic>
+        <p:nvPicPr>
+          <p:cNvPr id="5" name="圖片 4">
+            <a:extLst>
+              <a:ext uri="{FF2B5EF4-FFF2-40B4-BE49-F238E27FC236}">
+                <a16:creationId xmlns:a16="http://schemas.microsoft.com/office/drawing/2014/main" id="{79DAFDD5-E509-4888-A0D9-C4EA4047A2C6}"/>
+              </a:ext>
+            </a:extLst>
+          </p:cNvPr>
+          <p:cNvPicPr>
+            <a:picLocks noChangeAspect="1"/>
+          </p:cNvPicPr>
+          <p:nvPr/>
+        </p:nvPicPr>
+        <p:blipFill>
+          <a:blip r:embed="rId3">
+            <a:extLst>
+              <a:ext uri="{28A0092B-C50C-407E-A947-70E740481C1C}">
+                <a14:useLocalDpi xmlns:a14="http://schemas.microsoft.com/office/drawing/2010/main" val="0"/>
+              </a:ext>
+            </a:extLst>
+          </a:blip>
+          <a:stretch>
+            <a:fillRect/>
+          </a:stretch>
+        </p:blipFill>
+        <p:spPr>
+          <a:xfrm>
+            <a:off x="2354996" y="2216079"/>
+            <a:ext cx="8234592" cy="4090449"/>
+          </a:xfrm>
+          <a:prstGeom prst="rect">
+            <a:avLst/>
+          </a:prstGeom>
+        </p:spPr>
+      </p:pic>
     </p:spTree>
     <p:extLst>
       <p:ext uri="{BB962C8B-B14F-4D97-AF65-F5344CB8AC3E}">
@@ -8990,14 +9797,9 @@
   <p:cSld>
     <p:bg>
       <p:bgPr>
-        <a:blipFill dpi="0" rotWithShape="1">
-          <a:blip r:embed="rId3">
-            <a:alphaModFix amt="56000"/>
-            <a:lum/>
-          </a:blip>
-          <a:srcRect/>
-          <a:tile tx="0" ty="0" sx="100000" sy="100000" flip="none" algn="tl"/>
-        </a:blipFill>
+        <a:solidFill>
+          <a:schemeClr val="bg1"/>
+        </a:solidFill>
         <a:effectLst/>
       </p:bgPr>
     </p:bg>
@@ -9264,14 +10066,9 @@
   <p:cSld>
     <p:bg>
       <p:bgPr>
-        <a:blipFill dpi="0" rotWithShape="1">
-          <a:blip r:embed="rId3">
-            <a:alphaModFix amt="56000"/>
-            <a:lum/>
-          </a:blip>
-          <a:srcRect/>
-          <a:tile tx="0" ty="0" sx="100000" sy="100000" flip="none" algn="tl"/>
-        </a:blipFill>
+        <a:solidFill>
+          <a:schemeClr val="bg1"/>
+        </a:solidFill>
         <a:effectLst/>
       </p:bgPr>
     </p:bg>
@@ -9304,7 +10101,7 @@
         <p:spPr>
           <a:xfrm>
             <a:off x="616225" y="569844"/>
-            <a:ext cx="5959673" cy="523220"/>
+            <a:ext cx="9693544" cy="523220"/>
           </a:xfrm>
           <a:prstGeom prst="rect">
             <a:avLst/>
@@ -9319,7 +10116,7 @@
           <a:p>
             <a:r>
               <a:rPr lang="en-US" sz="2800" b="1" dirty="0"/>
-              <a:t>Flowchart &amp; Structure of Seq2Seq</a:t>
+              <a:t>Flowchart of NLP &amp;Model and Bottleneck Problem </a:t>
             </a:r>
           </a:p>
         </p:txBody>
@@ -9330,6 +10127,42 @@
             <a:extLst>
               <a:ext uri="{FF2B5EF4-FFF2-40B4-BE49-F238E27FC236}">
                 <a16:creationId xmlns:a16="http://schemas.microsoft.com/office/drawing/2014/main" id="{283A6487-7FE0-7344-8B49-BC02C9576B77}"/>
+              </a:ext>
+            </a:extLst>
+          </p:cNvPr>
+          <p:cNvPicPr>
+            <a:picLocks noChangeAspect="1"/>
+          </p:cNvPicPr>
+          <p:nvPr/>
+        </p:nvPicPr>
+        <p:blipFill>
+          <a:blip r:embed="rId3">
+            <a:extLst>
+              <a:ext uri="{28A0092B-C50C-407E-A947-70E740481C1C}">
+                <a14:useLocalDpi xmlns:a14="http://schemas.microsoft.com/office/drawing/2010/main" val="0"/>
+              </a:ext>
+            </a:extLst>
+          </a:blip>
+          <a:stretch>
+            <a:fillRect/>
+          </a:stretch>
+        </p:blipFill>
+        <p:spPr>
+          <a:xfrm>
+            <a:off x="3217289" y="1944712"/>
+            <a:ext cx="8974711" cy="3767541"/>
+          </a:xfrm>
+          <a:prstGeom prst="rect">
+            <a:avLst/>
+          </a:prstGeom>
+        </p:spPr>
+      </p:pic>
+      <p:pic>
+        <p:nvPicPr>
+          <p:cNvPr id="6" name="Picture 5">
+            <a:extLst>
+              <a:ext uri="{FF2B5EF4-FFF2-40B4-BE49-F238E27FC236}">
+                <a16:creationId xmlns:a16="http://schemas.microsoft.com/office/drawing/2014/main" id="{722DFDD4-4509-8547-AED8-E58912951B6E}"/>
               </a:ext>
             </a:extLst>
           </p:cNvPr>
@@ -9352,43 +10185,7 @@
         </p:blipFill>
         <p:spPr>
           <a:xfrm>
-            <a:off x="3217289" y="1944712"/>
-            <a:ext cx="8974711" cy="3767541"/>
-          </a:xfrm>
-          <a:prstGeom prst="rect">
-            <a:avLst/>
-          </a:prstGeom>
-        </p:spPr>
-      </p:pic>
-      <p:pic>
-        <p:nvPicPr>
-          <p:cNvPr id="6" name="Picture 5">
-            <a:extLst>
-              <a:ext uri="{FF2B5EF4-FFF2-40B4-BE49-F238E27FC236}">
-                <a16:creationId xmlns:a16="http://schemas.microsoft.com/office/drawing/2014/main" id="{722DFDD4-4509-8547-AED8-E58912951B6E}"/>
-              </a:ext>
-            </a:extLst>
-          </p:cNvPr>
-          <p:cNvPicPr>
-            <a:picLocks noChangeAspect="1"/>
-          </p:cNvPicPr>
-          <p:nvPr/>
-        </p:nvPicPr>
-        <p:blipFill>
-          <a:blip r:embed="rId5">
-            <a:extLst>
-              <a:ext uri="{28A0092B-C50C-407E-A947-70E740481C1C}">
-                <a14:useLocalDpi xmlns:a14="http://schemas.microsoft.com/office/drawing/2010/main" val="0"/>
-              </a:ext>
-            </a:extLst>
-          </a:blip>
-          <a:stretch>
-            <a:fillRect/>
-          </a:stretch>
-        </p:blipFill>
-        <p:spPr>
-          <a:xfrm>
-            <a:off x="1748076" y="1461887"/>
+            <a:off x="1807343" y="1588887"/>
             <a:ext cx="1847985" cy="4250366"/>
           </a:xfrm>
           <a:prstGeom prst="rect">
@@ -9414,14 +10211,9 @@
   <p:cSld>
     <p:bg>
       <p:bgPr>
-        <a:blipFill dpi="0" rotWithShape="1">
-          <a:blip r:embed="rId3">
-            <a:alphaModFix amt="56000"/>
-            <a:lum/>
-          </a:blip>
-          <a:srcRect/>
-          <a:tile tx="0" ty="0" sx="100000" sy="100000" flip="none" algn="tl"/>
-        </a:blipFill>
+        <a:solidFill>
+          <a:schemeClr val="bg1"/>
+        </a:solidFill>
         <a:effectLst/>
       </p:bgPr>
     </p:bg>
@@ -9683,14 +10475,9 @@
   <p:cSld>
     <p:bg>
       <p:bgPr>
-        <a:blipFill dpi="0" rotWithShape="1">
-          <a:blip r:embed="rId3">
-            <a:alphaModFix amt="56000"/>
-            <a:lum/>
-          </a:blip>
-          <a:srcRect/>
-          <a:tile tx="0" ty="0" sx="100000" sy="100000" flip="none" algn="tl"/>
-        </a:blipFill>
+        <a:solidFill>
+          <a:schemeClr val="bg1"/>
+        </a:solidFill>
         <a:effectLst/>
       </p:bgPr>
     </p:bg>
@@ -9949,8 +10736,8 @@
         </p:nvSpPr>
         <p:spPr>
           <a:xfrm>
-            <a:off x="616225" y="4153221"/>
-            <a:ext cx="5332229" cy="461665"/>
+            <a:off x="1752850" y="3922389"/>
+            <a:ext cx="5001690" cy="461665"/>
           </a:xfrm>
           <a:prstGeom prst="rect">
             <a:avLst/>
@@ -9968,12 +10755,9 @@
               <a:buChar char="ü"/>
             </a:pPr>
             <a:r>
-              <a:rPr lang="en-US" sz="2400" b="1" dirty="0">
-                <a:solidFill>
-                  <a:srgbClr val="FF0000"/>
-                </a:solidFill>
-                <a:latin typeface="Times New Roman" panose="02020603050405020304" pitchFamily="18" charset="0"/>
-                <a:cs typeface="Times New Roman" panose="02020603050405020304" pitchFamily="18" charset="0"/>
+              <a:rPr lang="en-US" sz="2400" dirty="0">
+                <a:latin typeface="Calibri" panose="020F0502020204030204" pitchFamily="34" charset="0"/>
+                <a:cs typeface="Calibri" panose="020F0502020204030204" pitchFamily="34" charset="0"/>
               </a:rPr>
               <a:t>First GOP Debate Twitter Sentiment</a:t>
             </a:r>
@@ -9994,8 +10778,8 @@
         </p:nvSpPr>
         <p:spPr>
           <a:xfrm>
-            <a:off x="616225" y="4726542"/>
-            <a:ext cx="11430822" cy="461665"/>
+            <a:off x="1752850" y="4495710"/>
+            <a:ext cx="10907922" cy="461665"/>
           </a:xfrm>
           <a:prstGeom prst="rect">
             <a:avLst/>
@@ -10013,12 +10797,9 @@
               <a:buChar char="ü"/>
             </a:pPr>
             <a:r>
-              <a:rPr lang="en-US" sz="2400" b="1" dirty="0">
-                <a:solidFill>
-                  <a:srgbClr val="FF0000"/>
-                </a:solidFill>
-                <a:latin typeface="Times New Roman" panose="02020603050405020304" pitchFamily="18" charset="0"/>
-                <a:cs typeface="Times New Roman" panose="02020603050405020304" pitchFamily="18" charset="0"/>
+              <a:rPr lang="en-US" sz="2400" dirty="0">
+                <a:latin typeface="Calibri" panose="020F0502020204030204" pitchFamily="34" charset="0"/>
+                <a:cs typeface="Calibri" panose="020F0502020204030204" pitchFamily="34" charset="0"/>
               </a:rPr>
               <a:t>Tweets from verified users concerning stocks traded on the NYSE, NASDQ &amp; SNP </a:t>
             </a:r>
@@ -10039,8 +10820,8 @@
         </p:nvSpPr>
         <p:spPr>
           <a:xfrm>
-            <a:off x="616224" y="5289035"/>
-            <a:ext cx="4462055" cy="461665"/>
+            <a:off x="1752849" y="5058203"/>
+            <a:ext cx="4111960" cy="461665"/>
           </a:xfrm>
           <a:prstGeom prst="rect">
             <a:avLst/>
@@ -10058,12 +10839,9 @@
               <a:buChar char="ü"/>
             </a:pPr>
             <a:r>
-              <a:rPr lang="en-US" sz="2400" b="1" dirty="0">
-                <a:solidFill>
-                  <a:srgbClr val="FF0000"/>
-                </a:solidFill>
-                <a:latin typeface="Times New Roman" panose="02020603050405020304" pitchFamily="18" charset="0"/>
-                <a:cs typeface="Times New Roman" panose="02020603050405020304" pitchFamily="18" charset="0"/>
+              <a:rPr lang="en-US" sz="2400" dirty="0">
+                <a:latin typeface="Calibri" panose="020F0502020204030204" pitchFamily="34" charset="0"/>
+                <a:cs typeface="Calibri" panose="020F0502020204030204" pitchFamily="34" charset="0"/>
               </a:rPr>
               <a:t>SST-2: IMDb Movies Reviews</a:t>
             </a:r>
@@ -10084,8 +10862,8 @@
         </p:nvSpPr>
         <p:spPr>
           <a:xfrm>
-            <a:off x="616223" y="5903211"/>
-            <a:ext cx="5872505" cy="461665"/>
+            <a:off x="1752848" y="5672379"/>
+            <a:ext cx="5536259" cy="461665"/>
           </a:xfrm>
           <a:prstGeom prst="rect">
             <a:avLst/>
@@ -10103,12 +10881,9 @@
               <a:buChar char="ü"/>
             </a:pPr>
             <a:r>
-              <a:rPr lang="en-US" sz="2400" b="1" dirty="0">
-                <a:solidFill>
-                  <a:srgbClr val="FF0000"/>
-                </a:solidFill>
-                <a:latin typeface="Times New Roman" panose="02020603050405020304" pitchFamily="18" charset="0"/>
-                <a:cs typeface="Times New Roman" panose="02020603050405020304" pitchFamily="18" charset="0"/>
+              <a:rPr lang="en-US" sz="2400" dirty="0">
+                <a:latin typeface="Calibri" panose="020F0502020204030204" pitchFamily="34" charset="0"/>
+                <a:cs typeface="Calibri" panose="020F0502020204030204" pitchFamily="34" charset="0"/>
               </a:rPr>
               <a:t>SST-5: Rotten Tomatoes Movies Reviews</a:t>
             </a:r>
@@ -10133,13 +10908,9 @@
   <p:cSld>
     <p:bg>
       <p:bgPr>
-        <a:blipFill dpi="0" rotWithShape="1">
-          <a:blip r:embed="rId3">
-            <a:alphaModFix amt="56000"/>
-          </a:blip>
-          <a:srcRect/>
-          <a:tile tx="0" ty="0" sx="100000" sy="100000" flip="none" algn="tl"/>
-        </a:blipFill>
+        <a:solidFill>
+          <a:schemeClr val="bg1"/>
+        </a:solidFill>
         <a:effectLst/>
       </p:bgPr>
     </p:bg>
@@ -10207,7 +10978,7 @@
           <p:nvPr/>
         </p:nvPicPr>
         <p:blipFill>
-          <a:blip r:embed="rId4">
+          <a:blip r:embed="rId3">
             <a:extLst>
               <a:ext uri="{28A0092B-C50C-407E-A947-70E740481C1C}">
                 <a14:useLocalDpi xmlns:a14="http://schemas.microsoft.com/office/drawing/2010/main" val="0"/>
@@ -10242,8 +11013,8 @@
         </p:nvSpPr>
         <p:spPr>
           <a:xfrm>
-            <a:off x="1867711" y="2159541"/>
-            <a:ext cx="6076600" cy="461665"/>
+            <a:off x="1430548" y="2272206"/>
+            <a:ext cx="6170344" cy="461665"/>
           </a:xfrm>
           <a:prstGeom prst="rect">
             <a:avLst/>
@@ -10265,7 +11036,7 @@
                 <a:latin typeface="Calibri" panose="020F0502020204030204" pitchFamily="34" charset="0"/>
                 <a:cs typeface="Calibri" panose="020F0502020204030204" pitchFamily="34" charset="0"/>
               </a:rPr>
-              <a:t>BERT: </a:t>
+              <a:t>BERT:  </a:t>
             </a:r>
             <a:r>
               <a:rPr lang="en-US" sz="2400" dirty="0" err="1">
@@ -10298,7 +11069,7 @@
         </p:nvSpPr>
         <p:spPr>
           <a:xfrm>
-            <a:off x="1867711" y="2967335"/>
+            <a:off x="1430548" y="2992554"/>
             <a:ext cx="1723933" cy="461665"/>
           </a:xfrm>
           <a:prstGeom prst="rect">
@@ -10347,8 +11118,8 @@
         </p:nvSpPr>
         <p:spPr>
           <a:xfrm>
-            <a:off x="2527741" y="3687683"/>
-            <a:ext cx="3840539" cy="461665"/>
+            <a:off x="2090578" y="3712902"/>
+            <a:ext cx="4325671" cy="830997"/>
           </a:xfrm>
           <a:prstGeom prst="rect">
             <a:avLst/>
@@ -10380,7 +11151,46 @@
                 <a:latin typeface="Calibri" panose="020F0502020204030204" pitchFamily="34" charset="0"/>
                 <a:cs typeface="Calibri" panose="020F0502020204030204" pitchFamily="34" charset="0"/>
               </a:rPr>
-              <a:t>More Corpus</a:t>
+              <a:t>More Corpus </a:t>
+            </a:r>
+            <a:br>
+              <a:rPr lang="en-US" sz="2400" b="1" dirty="0">
+                <a:solidFill>
+                  <a:srgbClr val="FF0000"/>
+                </a:solidFill>
+                <a:latin typeface="Calibri" panose="020F0502020204030204" pitchFamily="34" charset="0"/>
+                <a:cs typeface="Calibri" panose="020F0502020204030204" pitchFamily="34" charset="0"/>
+              </a:rPr>
+            </a:br>
+            <a:r>
+              <a:rPr lang="en-US" sz="2400" b="1" dirty="0">
+                <a:solidFill>
+                  <a:srgbClr val="FF0000"/>
+                </a:solidFill>
+                <a:latin typeface="Calibri" panose="020F0502020204030204" pitchFamily="34" charset="0"/>
+                <a:cs typeface="Calibri" panose="020F0502020204030204" pitchFamily="34" charset="0"/>
+              </a:rPr>
+              <a:t>	(WikiText103 &amp; </a:t>
+            </a:r>
+            <a:r>
+              <a:rPr lang="en-US" sz="2400" b="1" dirty="0" err="1">
+                <a:solidFill>
+                  <a:srgbClr val="FF0000"/>
+                </a:solidFill>
+                <a:latin typeface="Calibri" panose="020F0502020204030204" pitchFamily="34" charset="0"/>
+                <a:cs typeface="Calibri" panose="020F0502020204030204" pitchFamily="34" charset="0"/>
+              </a:rPr>
+              <a:t>CCNews</a:t>
+            </a:r>
+            <a:r>
+              <a:rPr lang="en-US" sz="2400" b="1" dirty="0">
+                <a:solidFill>
+                  <a:srgbClr val="FF0000"/>
+                </a:solidFill>
+                <a:latin typeface="Calibri" panose="020F0502020204030204" pitchFamily="34" charset="0"/>
+                <a:cs typeface="Calibri" panose="020F0502020204030204" pitchFamily="34" charset="0"/>
+              </a:rPr>
+              <a:t>) </a:t>
             </a:r>
           </a:p>
         </p:txBody>
@@ -10399,7 +11209,7 @@
         </p:nvSpPr>
         <p:spPr>
           <a:xfrm>
-            <a:off x="2527741" y="4408031"/>
+            <a:off x="2048245" y="5008984"/>
             <a:ext cx="4501232" cy="461665"/>
           </a:xfrm>
           <a:prstGeom prst="rect">
@@ -10451,7 +11261,7 @@
         </p:nvSpPr>
         <p:spPr>
           <a:xfrm>
-            <a:off x="2527741" y="5128379"/>
+            <a:off x="2048245" y="5729332"/>
             <a:ext cx="3747629" cy="461665"/>
           </a:xfrm>
           <a:prstGeom prst="rect">
@@ -10479,6 +11289,48 @@
               </a:rPr>
               <a:t>Next Sentence Prediction</a:t>
             </a:r>
+          </a:p>
+        </p:txBody>
+      </p:sp>
+      <p:sp>
+        <p:nvSpPr>
+          <p:cNvPr id="10" name="TextBox 4">
+            <a:extLst>
+              <a:ext uri="{FF2B5EF4-FFF2-40B4-BE49-F238E27FC236}">
+                <a16:creationId xmlns:a16="http://schemas.microsoft.com/office/drawing/2014/main" id="{63537FB0-121E-415E-8CFE-3EBE420ABEE7}"/>
+              </a:ext>
+            </a:extLst>
+          </p:cNvPr>
+          <p:cNvSpPr txBox="1"/>
+          <p:nvPr/>
+        </p:nvSpPr>
+        <p:spPr>
+          <a:xfrm>
+            <a:off x="926092" y="1464412"/>
+            <a:ext cx="3238835" cy="461665"/>
+          </a:xfrm>
+          <a:prstGeom prst="rect">
+            <a:avLst/>
+          </a:prstGeom>
+          <a:noFill/>
+        </p:spPr>
+        <p:txBody>
+          <a:bodyPr wrap="none" rtlCol="0">
+            <a:spAutoFit/>
+          </a:bodyPr>
+          <a:lstStyle/>
+          <a:p>
+            <a:r>
+              <a:rPr lang="en-US" sz="2400" b="1" dirty="0">
+                <a:latin typeface="Calibri" panose="020F0502020204030204" pitchFamily="34" charset="0"/>
+                <a:cs typeface="Calibri" panose="020F0502020204030204" pitchFamily="34" charset="0"/>
+              </a:rPr>
+              <a:t>Pre-training approaches</a:t>
+            </a:r>
+            <a:endParaRPr lang="en-US" sz="2400" dirty="0">
+              <a:latin typeface="Calibri" panose="020F0502020204030204" pitchFamily="34" charset="0"/>
+              <a:cs typeface="Calibri" panose="020F0502020204030204" pitchFamily="34" charset="0"/>
+            </a:endParaRPr>
           </a:p>
         </p:txBody>
       </p:sp>
@@ -10500,13 +11352,9 @@
   <p:cSld>
     <p:bg>
       <p:bgPr>
-        <a:blipFill dpi="0" rotWithShape="1">
-          <a:blip r:embed="rId3">
-            <a:alphaModFix amt="56000"/>
-          </a:blip>
-          <a:srcRect/>
-          <a:tile tx="0" ty="0" sx="100000" sy="100000" flip="none" algn="tl"/>
-        </a:blipFill>
+        <a:solidFill>
+          <a:schemeClr val="bg1"/>
+        </a:solidFill>
         <a:effectLst/>
       </p:bgPr>
     </p:bg>
@@ -10573,8 +11421,8 @@
         </p:nvSpPr>
         <p:spPr>
           <a:xfrm>
-            <a:off x="2866461" y="3477634"/>
-            <a:ext cx="3481274" cy="461665"/>
+            <a:off x="1806418" y="4185280"/>
+            <a:ext cx="3560077" cy="461665"/>
           </a:xfrm>
           <a:prstGeom prst="rect">
             <a:avLst/>
@@ -10592,173 +11440,11 @@
               <a:buChar char="•"/>
             </a:pPr>
             <a:r>
-              <a:rPr lang="en-US" sz="2400" dirty="0">
+              <a:rPr lang="en-US" sz="2400" b="1" dirty="0">
                 <a:latin typeface="Calibri" panose="020F0502020204030204" pitchFamily="34" charset="0"/>
                 <a:cs typeface="Calibri" panose="020F0502020204030204" pitchFamily="34" charset="0"/>
               </a:rPr>
               <a:t>Multi-headed Attention</a:t>
-            </a:r>
-          </a:p>
-        </p:txBody>
-      </p:sp>
-      <p:sp>
-        <p:nvSpPr>
-          <p:cNvPr id="6" name="TextBox 5">
-            <a:extLst>
-              <a:ext uri="{FF2B5EF4-FFF2-40B4-BE49-F238E27FC236}">
-                <a16:creationId xmlns:a16="http://schemas.microsoft.com/office/drawing/2014/main" id="{F0562E0E-EEBC-9146-9A8A-71CE457A66D7}"/>
-              </a:ext>
-            </a:extLst>
-          </p:cNvPr>
-          <p:cNvSpPr txBox="1"/>
-          <p:nvPr/>
-        </p:nvSpPr>
-        <p:spPr>
-          <a:xfrm>
-            <a:off x="528676" y="4304333"/>
-            <a:ext cx="2593852" cy="461665"/>
-          </a:xfrm>
-          <a:prstGeom prst="rect">
-            <a:avLst/>
-          </a:prstGeom>
-          <a:noFill/>
-        </p:spPr>
-        <p:txBody>
-          <a:bodyPr wrap="none" rtlCol="0">
-            <a:spAutoFit/>
-          </a:bodyPr>
-          <a:lstStyle/>
-          <a:p>
-            <a:pPr marL="342900" indent="-342900">
-              <a:buFont typeface="Wingdings" pitchFamily="2" charset="2"/>
-              <a:buChar char="§"/>
-            </a:pPr>
-            <a:r>
-              <a:rPr lang="en-US" sz="2400" b="1" dirty="0">
-                <a:latin typeface="Calibri" panose="020F0502020204030204" pitchFamily="34" charset="0"/>
-                <a:cs typeface="Calibri" panose="020F0502020204030204" pitchFamily="34" charset="0"/>
-              </a:rPr>
-              <a:t>Too many heads</a:t>
-            </a:r>
-            <a:endParaRPr lang="en-US" sz="2400" dirty="0">
-              <a:latin typeface="Calibri" panose="020F0502020204030204" pitchFamily="34" charset="0"/>
-              <a:cs typeface="Calibri" panose="020F0502020204030204" pitchFamily="34" charset="0"/>
-            </a:endParaRPr>
-          </a:p>
-        </p:txBody>
-      </p:sp>
-      <p:sp>
-        <p:nvSpPr>
-          <p:cNvPr id="7" name="TextBox 6">
-            <a:extLst>
-              <a:ext uri="{FF2B5EF4-FFF2-40B4-BE49-F238E27FC236}">
-                <a16:creationId xmlns:a16="http://schemas.microsoft.com/office/drawing/2014/main" id="{355704DE-69FB-6741-8A5C-9D7C9D428879}"/>
-              </a:ext>
-            </a:extLst>
-          </p:cNvPr>
-          <p:cNvSpPr txBox="1"/>
-          <p:nvPr/>
-        </p:nvSpPr>
-        <p:spPr>
-          <a:xfrm>
-            <a:off x="528676" y="4872119"/>
-            <a:ext cx="3747949" cy="461665"/>
-          </a:xfrm>
-          <a:prstGeom prst="rect">
-            <a:avLst/>
-          </a:prstGeom>
-          <a:noFill/>
-        </p:spPr>
-        <p:txBody>
-          <a:bodyPr wrap="none" rtlCol="0">
-            <a:spAutoFit/>
-          </a:bodyPr>
-          <a:lstStyle/>
-          <a:p>
-            <a:pPr marL="342900" indent="-342900">
-              <a:buFont typeface="Wingdings" pitchFamily="2" charset="2"/>
-              <a:buChar char="§"/>
-            </a:pPr>
-            <a:r>
-              <a:rPr lang="en-US" sz="2400" b="1" dirty="0">
-                <a:solidFill>
-                  <a:srgbClr val="FF0000"/>
-                </a:solidFill>
-                <a:latin typeface="Calibri" panose="020F0502020204030204" pitchFamily="34" charset="0"/>
-                <a:cs typeface="Calibri" panose="020F0502020204030204" pitchFamily="34" charset="0"/>
-              </a:rPr>
-              <a:t>Valid heads are unknown</a:t>
-            </a:r>
-          </a:p>
-        </p:txBody>
-      </p:sp>
-      <p:sp>
-        <p:nvSpPr>
-          <p:cNvPr id="10" name="TextBox 9">
-            <a:extLst>
-              <a:ext uri="{FF2B5EF4-FFF2-40B4-BE49-F238E27FC236}">
-                <a16:creationId xmlns:a16="http://schemas.microsoft.com/office/drawing/2014/main" id="{91D8B0F3-D526-8444-AAE9-6AA65AC40028}"/>
-              </a:ext>
-            </a:extLst>
-          </p:cNvPr>
-          <p:cNvSpPr txBox="1"/>
-          <p:nvPr/>
-        </p:nvSpPr>
-        <p:spPr>
-          <a:xfrm>
-            <a:off x="528676" y="5523372"/>
-            <a:ext cx="5458080" cy="830997"/>
-          </a:xfrm>
-          <a:prstGeom prst="rect">
-            <a:avLst/>
-          </a:prstGeom>
-          <a:noFill/>
-        </p:spPr>
-        <p:txBody>
-          <a:bodyPr wrap="square" rtlCol="0">
-            <a:spAutoFit/>
-          </a:bodyPr>
-          <a:lstStyle/>
-          <a:p>
-            <a:pPr marL="342900" indent="-342900">
-              <a:buFont typeface="Wingdings" pitchFamily="2" charset="2"/>
-              <a:buChar char="§"/>
-            </a:pPr>
-            <a:r>
-              <a:rPr lang="en-US" sz="2400" b="1" dirty="0">
-                <a:solidFill>
-                  <a:srgbClr val="FF0000"/>
-                </a:solidFill>
-                <a:latin typeface="Calibri" panose="020F0502020204030204" pitchFamily="34" charset="0"/>
-                <a:cs typeface="Calibri" panose="020F0502020204030204" pitchFamily="34" charset="0"/>
-              </a:rPr>
-              <a:t>Deal with “heads”:</a:t>
-            </a:r>
-            <a:br>
-              <a:rPr lang="en-US" sz="2400" b="1" dirty="0">
-                <a:solidFill>
-                  <a:srgbClr val="FF0000"/>
-                </a:solidFill>
-                <a:latin typeface="Calibri" panose="020F0502020204030204" pitchFamily="34" charset="0"/>
-                <a:cs typeface="Calibri" panose="020F0502020204030204" pitchFamily="34" charset="0"/>
-              </a:rPr>
-            </a:br>
-            <a:r>
-              <a:rPr lang="en-US" sz="2400" b="1" dirty="0">
-                <a:solidFill>
-                  <a:srgbClr val="FF0000"/>
-                </a:solidFill>
-                <a:latin typeface="Calibri" panose="020F0502020204030204" pitchFamily="34" charset="0"/>
-                <a:cs typeface="Calibri" panose="020F0502020204030204" pitchFamily="34" charset="0"/>
-              </a:rPr>
-              <a:t>	</a:t>
-            </a:r>
-            <a:r>
-              <a:rPr lang="en-US" sz="2400" b="1" dirty="0">
-                <a:latin typeface="Calibri" panose="020F0502020204030204" pitchFamily="34" charset="0"/>
-                <a:cs typeface="Calibri" panose="020F0502020204030204" pitchFamily="34" charset="0"/>
-              </a:rPr>
-              <a:t>Optimizing the attention process</a:t>
             </a:r>
           </a:p>
         </p:txBody>
@@ -10778,13 +11464,13 @@
           <p:nvPr/>
         </p:nvPicPr>
         <p:blipFill>
-          <a:blip r:embed="rId4">
+          <a:blip r:embed="rId3">
             <a:extLst>
               <a:ext uri="{28A0092B-C50C-407E-A947-70E740481C1C}">
                 <a14:useLocalDpi xmlns:a14="http://schemas.microsoft.com/office/drawing/2010/main" val="0"/>
               </a:ext>
               <a:ext uri="{96DAC541-7B7A-43D3-8B79-37D633B846F1}">
-                <asvg:svgBlip xmlns:asvg="http://schemas.microsoft.com/office/drawing/2016/SVG/main" r:embed="rId5"/>
+                <asvg:svgBlip xmlns:asvg="http://schemas.microsoft.com/office/drawing/2016/SVG/main" r:embed="rId4"/>
               </a:ext>
             </a:extLst>
           </a:blip>
@@ -10794,8 +11480,8 @@
         </p:blipFill>
         <p:spPr>
           <a:xfrm>
-            <a:off x="6234911" y="569844"/>
-            <a:ext cx="5739176" cy="2664617"/>
+            <a:off x="5472731" y="1371006"/>
+            <a:ext cx="5293823" cy="2457846"/>
           </a:xfrm>
           <a:prstGeom prst="rect">
             <a:avLst/>
@@ -10817,13 +11503,13 @@
           <p:nvPr/>
         </p:nvPicPr>
         <p:blipFill>
-          <a:blip r:embed="rId6">
+          <a:blip r:embed="rId5">
             <a:extLst>
               <a:ext uri="{28A0092B-C50C-407E-A947-70E740481C1C}">
                 <a14:useLocalDpi xmlns:a14="http://schemas.microsoft.com/office/drawing/2010/main" val="0"/>
               </a:ext>
               <a:ext uri="{96DAC541-7B7A-43D3-8B79-37D633B846F1}">
-                <asvg:svgBlip xmlns:asvg="http://schemas.microsoft.com/office/drawing/2016/SVG/main" r:embed="rId7"/>
+                <asvg:svgBlip xmlns:asvg="http://schemas.microsoft.com/office/drawing/2016/SVG/main" r:embed="rId6"/>
               </a:ext>
             </a:extLst>
           </a:blip>
@@ -10833,8 +11519,8 @@
         </p:blipFill>
         <p:spPr>
           <a:xfrm>
-            <a:off x="6366191" y="3692502"/>
-            <a:ext cx="5724457" cy="2892841"/>
+            <a:off x="5773593" y="4106795"/>
+            <a:ext cx="5272839" cy="2664617"/>
           </a:xfrm>
           <a:prstGeom prst="rect">
             <a:avLst/>
@@ -10855,8 +11541,8 @@
         </p:nvSpPr>
         <p:spPr>
           <a:xfrm>
-            <a:off x="2866461" y="1871680"/>
-            <a:ext cx="2237344" cy="461665"/>
+            <a:off x="2382742" y="1633442"/>
+            <a:ext cx="2288896" cy="461665"/>
           </a:xfrm>
           <a:prstGeom prst="rect">
             <a:avLst/>
@@ -10874,7 +11560,7 @@
               <a:buChar char="•"/>
             </a:pPr>
             <a:r>
-              <a:rPr lang="en-US" sz="2400" dirty="0">
+              <a:rPr lang="en-US" sz="2400" b="1" dirty="0">
                 <a:latin typeface="Calibri" panose="020F0502020204030204" pitchFamily="34" charset="0"/>
                 <a:cs typeface="Calibri" panose="020F0502020204030204" pitchFamily="34" charset="0"/>
               </a:rPr>
@@ -10901,13 +11587,9 @@
   <p:cSld>
     <p:bg>
       <p:bgPr>
-        <a:blipFill dpi="0" rotWithShape="1">
-          <a:blip r:embed="rId3">
-            <a:alphaModFix amt="56000"/>
-          </a:blip>
-          <a:srcRect/>
-          <a:tile tx="0" ty="0" sx="100000" sy="100000" flip="none" algn="tl"/>
-        </a:blipFill>
+        <a:solidFill>
+          <a:schemeClr val="bg1"/>
+        </a:solidFill>
         <a:effectLst/>
       </p:bgPr>
     </p:bg>
@@ -10955,7 +11637,7 @@
           <a:p>
             <a:r>
               <a:rPr lang="en-US" sz="2800" b="1" dirty="0"/>
-              <a:t>Optimization</a:t>
+              <a:t>Attention Mechanism</a:t>
             </a:r>
           </a:p>
         </p:txBody>
@@ -10974,8 +11656,8 @@
         </p:nvSpPr>
         <p:spPr>
           <a:xfrm>
-            <a:off x="952373" y="1568534"/>
-            <a:ext cx="4364656" cy="461665"/>
+            <a:off x="1806418" y="4185280"/>
+            <a:ext cx="3560077" cy="461665"/>
           </a:xfrm>
           <a:prstGeom prst="rect">
             <a:avLst/>
@@ -10993,21 +11675,21 @@
               <a:buChar char="•"/>
             </a:pPr>
             <a:r>
-              <a:rPr lang="en-US" sz="2400" dirty="0">
+              <a:rPr lang="en-US" sz="2400" b="1" dirty="0">
                 <a:latin typeface="Calibri" panose="020F0502020204030204" pitchFamily="34" charset="0"/>
                 <a:cs typeface="Calibri" panose="020F0502020204030204" pitchFamily="34" charset="0"/>
               </a:rPr>
-              <a:t>Single-headed RNN (SHA-RNN)</a:t>
-            </a:r>
-          </a:p>
-        </p:txBody>
-      </p:sp>
-      <p:sp>
-        <p:nvSpPr>
-          <p:cNvPr id="6" name="TextBox 5">
-            <a:extLst>
-              <a:ext uri="{FF2B5EF4-FFF2-40B4-BE49-F238E27FC236}">
-                <a16:creationId xmlns:a16="http://schemas.microsoft.com/office/drawing/2014/main" id="{F0562E0E-EEBC-9146-9A8A-71CE457A66D7}"/>
+              <a:t>Multi-headed Attention</a:t>
+            </a:r>
+          </a:p>
+        </p:txBody>
+      </p:sp>
+      <p:sp>
+        <p:nvSpPr>
+          <p:cNvPr id="12" name="TextBox 11">
+            <a:extLst>
+              <a:ext uri="{FF2B5EF4-FFF2-40B4-BE49-F238E27FC236}">
+                <a16:creationId xmlns:a16="http://schemas.microsoft.com/office/drawing/2014/main" id="{BADF6B0D-70A2-C543-A968-7B986D74325C}"/>
               </a:ext>
             </a:extLst>
           </p:cNvPr>
@@ -11016,8 +11698,8 @@
         </p:nvSpPr>
         <p:spPr>
           <a:xfrm>
-            <a:off x="1516652" y="2219787"/>
-            <a:ext cx="2593852" cy="461665"/>
+            <a:off x="2382742" y="1633442"/>
+            <a:ext cx="2288896" cy="461665"/>
           </a:xfrm>
           <a:prstGeom prst="rect">
             <a:avLst/>
@@ -11025,247 +11707,21 @@
           <a:noFill/>
         </p:spPr>
         <p:txBody>
-          <a:bodyPr wrap="square" rtlCol="0">
+          <a:bodyPr wrap="none" rtlCol="0">
             <a:spAutoFit/>
           </a:bodyPr>
           <a:lstStyle/>
           <a:p>
             <a:pPr marL="342900" indent="-342900">
-              <a:buFont typeface="Wingdings" pitchFamily="2" charset="2"/>
-              <a:buChar char="§"/>
+              <a:buFont typeface="Arial" panose="020B0604020202020204" pitchFamily="34" charset="0"/>
+              <a:buChar char="•"/>
             </a:pPr>
             <a:r>
               <a:rPr lang="en-US" sz="2400" b="1" dirty="0">
                 <a:latin typeface="Calibri" panose="020F0502020204030204" pitchFamily="34" charset="0"/>
                 <a:cs typeface="Calibri" panose="020F0502020204030204" pitchFamily="34" charset="0"/>
               </a:rPr>
-              <a:t>Boom Layer</a:t>
-            </a:r>
-            <a:endParaRPr lang="en-US" sz="2400" dirty="0">
-              <a:latin typeface="Calibri" panose="020F0502020204030204" pitchFamily="34" charset="0"/>
-              <a:cs typeface="Calibri" panose="020F0502020204030204" pitchFamily="34" charset="0"/>
-            </a:endParaRPr>
-          </a:p>
-        </p:txBody>
-      </p:sp>
-      <p:pic>
-        <p:nvPicPr>
-          <p:cNvPr id="4" name="Picture 3">
-            <a:extLst>
-              <a:ext uri="{FF2B5EF4-FFF2-40B4-BE49-F238E27FC236}">
-                <a16:creationId xmlns:a16="http://schemas.microsoft.com/office/drawing/2014/main" id="{C37648F9-7CB8-0A41-831D-BCB3F0DA04B2}"/>
-              </a:ext>
-            </a:extLst>
-          </p:cNvPr>
-          <p:cNvPicPr>
-            <a:picLocks noChangeAspect="1"/>
-          </p:cNvPicPr>
-          <p:nvPr/>
-        </p:nvPicPr>
-        <p:blipFill>
-          <a:blip r:embed="rId4">
-            <a:extLst>
-              <a:ext uri="{28A0092B-C50C-407E-A947-70E740481C1C}">
-                <a14:useLocalDpi xmlns:a14="http://schemas.microsoft.com/office/drawing/2010/main" val="0"/>
-              </a:ext>
-            </a:extLst>
-          </a:blip>
-          <a:stretch>
-            <a:fillRect/>
-          </a:stretch>
-        </p:blipFill>
-        <p:spPr>
-          <a:xfrm>
-            <a:off x="2285999" y="2871040"/>
-            <a:ext cx="6519559" cy="623384"/>
-          </a:xfrm>
-          <a:prstGeom prst="rect">
-            <a:avLst/>
-          </a:prstGeom>
-        </p:spPr>
-      </p:pic>
-      <p:sp>
-        <p:nvSpPr>
-          <p:cNvPr id="11" name="TextBox 10">
-            <a:extLst>
-              <a:ext uri="{FF2B5EF4-FFF2-40B4-BE49-F238E27FC236}">
-                <a16:creationId xmlns:a16="http://schemas.microsoft.com/office/drawing/2014/main" id="{047DF914-B467-334D-87BF-6ED281A9340C}"/>
-              </a:ext>
-            </a:extLst>
-          </p:cNvPr>
-          <p:cNvSpPr txBox="1"/>
-          <p:nvPr/>
-        </p:nvSpPr>
-        <p:spPr>
-          <a:xfrm>
-            <a:off x="1516652" y="3684012"/>
-            <a:ext cx="7578710" cy="461665"/>
-          </a:xfrm>
-          <a:prstGeom prst="rect">
-            <a:avLst/>
-          </a:prstGeom>
-          <a:noFill/>
-        </p:spPr>
-        <p:txBody>
-          <a:bodyPr wrap="square" rtlCol="0">
-            <a:spAutoFit/>
-          </a:bodyPr>
-          <a:lstStyle/>
-          <a:p>
-            <a:pPr marL="342900" indent="-342900">
-              <a:buFont typeface="Wingdings" pitchFamily="2" charset="2"/>
-              <a:buChar char="§"/>
-            </a:pPr>
-            <a:r>
-              <a:rPr lang="en-US" sz="2400" b="1" dirty="0">
-                <a:latin typeface="Calibri" panose="020F0502020204030204" pitchFamily="34" charset="0"/>
-                <a:cs typeface="Calibri" panose="020F0502020204030204" pitchFamily="34" charset="0"/>
-              </a:rPr>
-              <a:t>Activation Function:   </a:t>
-            </a:r>
-            <a:r>
-              <a:rPr lang="en-US" sz="2400" dirty="0">
-                <a:latin typeface="Times New Roman" panose="02020603050405020304" pitchFamily="18" charset="0"/>
-                <a:cs typeface="Times New Roman" panose="02020603050405020304" pitchFamily="18" charset="0"/>
-              </a:rPr>
-              <a:t>Gaussian Linear Unit (</a:t>
-            </a:r>
-            <a:r>
-              <a:rPr lang="en-US" sz="2400" dirty="0" err="1">
-                <a:latin typeface="Times New Roman" panose="02020603050405020304" pitchFamily="18" charset="0"/>
-                <a:cs typeface="Times New Roman" panose="02020603050405020304" pitchFamily="18" charset="0"/>
-              </a:rPr>
-              <a:t>GeLU</a:t>
-            </a:r>
-            <a:r>
-              <a:rPr lang="en-US" sz="2400" dirty="0">
-                <a:latin typeface="Times New Roman" panose="02020603050405020304" pitchFamily="18" charset="0"/>
-                <a:cs typeface="Times New Roman" panose="02020603050405020304" pitchFamily="18" charset="0"/>
-              </a:rPr>
-              <a:t>)</a:t>
-            </a:r>
-          </a:p>
-        </p:txBody>
-      </p:sp>
-      <p:sp>
-        <p:nvSpPr>
-          <p:cNvPr id="12" name="TextBox 11">
-            <a:extLst>
-              <a:ext uri="{FF2B5EF4-FFF2-40B4-BE49-F238E27FC236}">
-                <a16:creationId xmlns:a16="http://schemas.microsoft.com/office/drawing/2014/main" id="{87F6B32E-0BBB-5943-984B-398FF49AE20E}"/>
-              </a:ext>
-            </a:extLst>
-          </p:cNvPr>
-          <p:cNvSpPr txBox="1"/>
-          <p:nvPr/>
-        </p:nvSpPr>
-        <p:spPr>
-          <a:xfrm>
-            <a:off x="952373" y="4390314"/>
-            <a:ext cx="5692392" cy="461665"/>
-          </a:xfrm>
-          <a:prstGeom prst="rect">
-            <a:avLst/>
-          </a:prstGeom>
-          <a:noFill/>
-        </p:spPr>
-        <p:txBody>
-          <a:bodyPr wrap="none" rtlCol="0">
-            <a:spAutoFit/>
-          </a:bodyPr>
-          <a:lstStyle/>
-          <a:p>
-            <a:pPr marL="342900" indent="-342900">
-              <a:buFont typeface="Arial" panose="020B0604020202020204" pitchFamily="34" charset="0"/>
-              <a:buChar char="•"/>
-            </a:pPr>
-            <a:r>
-              <a:rPr lang="en-US" sz="2400" dirty="0">
-                <a:latin typeface="Calibri" panose="020F0502020204030204" pitchFamily="34" charset="0"/>
-                <a:cs typeface="Calibri" panose="020F0502020204030204" pitchFamily="34" charset="0"/>
-              </a:rPr>
-              <a:t>Models: BERT, </a:t>
-            </a:r>
-            <a:r>
-              <a:rPr lang="en-US" sz="2400" dirty="0" err="1">
-                <a:latin typeface="Calibri" panose="020F0502020204030204" pitchFamily="34" charset="0"/>
-                <a:cs typeface="Calibri" panose="020F0502020204030204" pitchFamily="34" charset="0"/>
-              </a:rPr>
-              <a:t>RoBERTa</a:t>
-            </a:r>
-            <a:r>
-              <a:rPr lang="en-US" sz="2400" dirty="0">
-                <a:latin typeface="Calibri" panose="020F0502020204030204" pitchFamily="34" charset="0"/>
-                <a:cs typeface="Calibri" panose="020F0502020204030204" pitchFamily="34" charset="0"/>
-              </a:rPr>
-              <a:t>, </a:t>
-            </a:r>
-            <a:r>
-              <a:rPr lang="en-US" sz="2400" dirty="0" err="1">
-                <a:latin typeface="Calibri" panose="020F0502020204030204" pitchFamily="34" charset="0"/>
-                <a:cs typeface="Calibri" panose="020F0502020204030204" pitchFamily="34" charset="0"/>
-              </a:rPr>
-              <a:t>DistilBERT</a:t>
-            </a:r>
-            <a:r>
-              <a:rPr lang="en-US" sz="2400" dirty="0">
-                <a:latin typeface="Calibri" panose="020F0502020204030204" pitchFamily="34" charset="0"/>
-                <a:cs typeface="Calibri" panose="020F0502020204030204" pitchFamily="34" charset="0"/>
-              </a:rPr>
-              <a:t>, </a:t>
-            </a:r>
-            <a:r>
-              <a:rPr lang="en-US" sz="2400" dirty="0" err="1">
-                <a:latin typeface="Calibri" panose="020F0502020204030204" pitchFamily="34" charset="0"/>
-                <a:cs typeface="Calibri" panose="020F0502020204030204" pitchFamily="34" charset="0"/>
-              </a:rPr>
-              <a:t>XLNet</a:t>
-            </a:r>
-            <a:endParaRPr lang="en-US" sz="2400" dirty="0">
-              <a:latin typeface="Calibri" panose="020F0502020204030204" pitchFamily="34" charset="0"/>
-              <a:cs typeface="Calibri" panose="020F0502020204030204" pitchFamily="34" charset="0"/>
-            </a:endParaRPr>
-          </a:p>
-        </p:txBody>
-      </p:sp>
-      <p:sp>
-        <p:nvSpPr>
-          <p:cNvPr id="13" name="TextBox 12">
-            <a:extLst>
-              <a:ext uri="{FF2B5EF4-FFF2-40B4-BE49-F238E27FC236}">
-                <a16:creationId xmlns:a16="http://schemas.microsoft.com/office/drawing/2014/main" id="{EF565234-AACD-4849-9DD1-72F925B48DE6}"/>
-              </a:ext>
-            </a:extLst>
-          </p:cNvPr>
-          <p:cNvSpPr txBox="1"/>
-          <p:nvPr/>
-        </p:nvSpPr>
-        <p:spPr>
-          <a:xfrm>
-            <a:off x="952373" y="5289466"/>
-            <a:ext cx="10008317" cy="461665"/>
-          </a:xfrm>
-          <a:prstGeom prst="rect">
-            <a:avLst/>
-          </a:prstGeom>
-          <a:noFill/>
-        </p:spPr>
-        <p:txBody>
-          <a:bodyPr wrap="none" rtlCol="0">
-            <a:spAutoFit/>
-          </a:bodyPr>
-          <a:lstStyle/>
-          <a:p>
-            <a:pPr marL="342900" indent="-342900">
-              <a:buFont typeface="Arial" panose="020B0604020202020204" pitchFamily="34" charset="0"/>
-              <a:buChar char="•"/>
-            </a:pPr>
-            <a:r>
-              <a:rPr lang="en-US" sz="2400" b="1" dirty="0">
-                <a:latin typeface="Calibri" panose="020F0502020204030204" pitchFamily="34" charset="0"/>
-                <a:cs typeface="Calibri" panose="020F0502020204030204" pitchFamily="34" charset="0"/>
-              </a:rPr>
-              <a:t>Solving the short-term dependency problem of Transformer-based Models</a:t>
+              <a:t>Self Attention</a:t>
             </a:r>
           </a:p>
         </p:txBody>
@@ -11273,7 +11729,7 @@
     </p:spTree>
     <p:extLst>
       <p:ext uri="{BB962C8B-B14F-4D97-AF65-F5344CB8AC3E}">
-        <p14:creationId xmlns:p14="http://schemas.microsoft.com/office/powerpoint/2010/main" val="1030187098"/>
+        <p14:creationId xmlns:p14="http://schemas.microsoft.com/office/powerpoint/2010/main" val="3683092427"/>
       </p:ext>
     </p:extLst>
   </p:cSld>

</xml_diff>

<commit_message>
Update "Contents of Project"
</commit_message>
<xml_diff>
--- a/Lab/REP.pptx
+++ b/Lab/REP.pptx
@@ -11119,7 +11119,7 @@
         <p:spPr>
           <a:xfrm>
             <a:off x="2090578" y="3712902"/>
-            <a:ext cx="4325671" cy="830997"/>
+            <a:ext cx="5949514" cy="830997"/>
           </a:xfrm>
           <a:prstGeom prst="rect">
             <a:avLst/>
@@ -11141,7 +11141,7 @@
                 <a:latin typeface="Calibri" panose="020F0502020204030204" pitchFamily="34" charset="0"/>
                 <a:cs typeface="Calibri" panose="020F0502020204030204" pitchFamily="34" charset="0"/>
               </a:rPr>
-              <a:t>Training with </a:t>
+              <a:t>Trained on  </a:t>
             </a:r>
             <a:r>
               <a:rPr lang="en-US" sz="2400" b="1" dirty="0">
@@ -11170,7 +11170,27 @@
                 <a:latin typeface="Calibri" panose="020F0502020204030204" pitchFamily="34" charset="0"/>
                 <a:cs typeface="Calibri" panose="020F0502020204030204" pitchFamily="34" charset="0"/>
               </a:rPr>
-              <a:t>	(WikiText103 &amp; </a:t>
+              <a:t>	(WikiText103,  </a:t>
+            </a:r>
+            <a:r>
+              <a:rPr lang="en-US" sz="2400" b="1" dirty="0" err="1">
+                <a:solidFill>
+                  <a:srgbClr val="FF0000"/>
+                </a:solidFill>
+                <a:latin typeface="Calibri" panose="020F0502020204030204" pitchFamily="34" charset="0"/>
+                <a:cs typeface="Calibri" panose="020F0502020204030204" pitchFamily="34" charset="0"/>
+              </a:rPr>
+              <a:t>BookCorpus</a:t>
+            </a:r>
+            <a:r>
+              <a:rPr lang="en-US" sz="2400" b="1" dirty="0">
+                <a:solidFill>
+                  <a:srgbClr val="FF0000"/>
+                </a:solidFill>
+                <a:latin typeface="Calibri" panose="020F0502020204030204" pitchFamily="34" charset="0"/>
+                <a:cs typeface="Calibri" panose="020F0502020204030204" pitchFamily="34" charset="0"/>
+              </a:rPr>
+              <a:t>,  </a:t>
             </a:r>
             <a:r>
               <a:rPr lang="en-US" sz="2400" b="1" dirty="0" err="1">
@@ -11209,8 +11229,8 @@
         </p:nvSpPr>
         <p:spPr>
           <a:xfrm>
-            <a:off x="2048245" y="5008984"/>
-            <a:ext cx="4501232" cy="461665"/>
+            <a:off x="2048245" y="4729584"/>
+            <a:ext cx="4398640" cy="461665"/>
           </a:xfrm>
           <a:prstGeom prst="rect">
             <a:avLst/>
@@ -11232,7 +11252,7 @@
                 <a:latin typeface="Calibri" panose="020F0502020204030204" pitchFamily="34" charset="0"/>
                 <a:cs typeface="Calibri" panose="020F0502020204030204" pitchFamily="34" charset="0"/>
               </a:rPr>
-              <a:t>Training with </a:t>
+              <a:t>Trained with </a:t>
             </a:r>
             <a:r>
               <a:rPr lang="en-US" sz="2400" b="1" dirty="0">
@@ -11261,7 +11281,7 @@
         </p:nvSpPr>
         <p:spPr>
           <a:xfrm>
-            <a:off x="2048245" y="5729332"/>
+            <a:off x="2090578" y="5522930"/>
             <a:ext cx="3747629" cy="461665"/>
           </a:xfrm>
           <a:prstGeom prst="rect">
@@ -11698,7 +11718,7 @@
         </p:nvSpPr>
         <p:spPr>
           <a:xfrm>
-            <a:off x="2382742" y="1633442"/>
+            <a:off x="1806418" y="1709642"/>
             <a:ext cx="2288896" cy="461665"/>
           </a:xfrm>
           <a:prstGeom prst="rect">

</xml_diff>

<commit_message>
Update "Final Project status"
</commit_message>
<xml_diff>
--- a/Lab/REP.pptx
+++ b/Lab/REP.pptx
@@ -11296,7 +11296,7 @@
         <p:spPr>
           <a:xfrm>
             <a:off x="2175226" y="2724542"/>
-            <a:ext cx="3668190" cy="704458"/>
+            <a:ext cx="3949874" cy="758554"/>
           </a:xfrm>
           <a:prstGeom prst="rect">
             <a:avLst/>
@@ -11481,8 +11481,8 @@
         </p:nvSpPr>
         <p:spPr>
           <a:xfrm>
-            <a:off x="2146013" y="3256761"/>
-            <a:ext cx="5458080" cy="830997"/>
+            <a:off x="2146012" y="3256761"/>
+            <a:ext cx="7970753" cy="830997"/>
           </a:xfrm>
           <a:prstGeom prst="rect">
             <a:avLst/>
@@ -11507,7 +11507,7 @@
                 <a:latin typeface="Calibri" panose="020F0502020204030204" pitchFamily="34" charset="0"/>
                 <a:cs typeface="Calibri" panose="020F0502020204030204" pitchFamily="34" charset="0"/>
               </a:rPr>
-              <a:t>Deal with “heads”:</a:t>
+              <a:t>Processing with “Valid heads” problem:</a:t>
             </a:r>
             <a:br>
               <a:rPr lang="en-US" sz="2400" b="1" dirty="0">
@@ -12376,6 +12376,15 @@
 </file>
 
 <file path=customXml/item1.xml><?xml version="1.0" encoding="utf-8"?>
+<p:properties xmlns:p="http://schemas.microsoft.com/office/2006/metadata/properties" xmlns:xsi="http://www.w3.org/2001/XMLSchema-instance" xmlns:pc="http://schemas.microsoft.com/office/infopath/2007/PartnerControls">
+  <documentManagement>
+    <_ip_UnifiedCompliancePolicyUIAction xmlns="http://schemas.microsoft.com/sharepoint/v3" xsi:nil="true"/>
+    <_ip_UnifiedCompliancePolicyProperties xmlns="http://schemas.microsoft.com/sharepoint/v3" xsi:nil="true"/>
+  </documentManagement>
+</p:properties>
+</file>
+
+<file path=customXml/item2.xml><?xml version="1.0" encoding="utf-8"?>
 <ct:contentTypeSchema xmlns:ct="http://schemas.microsoft.com/office/2006/metadata/contentType" xmlns:ma="http://schemas.microsoft.com/office/2006/metadata/properties/metaAttributes" ct:_="" ma:_="" ma:contentTypeName="Document" ma:contentTypeID="0x010100DEEA25CC0A0AC24199CDC46C25B8B0BC" ma:contentTypeVersion="9" ma:contentTypeDescription="Create a new document." ma:contentTypeScope="" ma:versionID="76e25e1730b4532ab1d5e5b131a96a5a">
   <xsd:schema xmlns:xsd="http://www.w3.org/2001/XMLSchema" xmlns:xs="http://www.w3.org/2001/XMLSchema" xmlns:p="http://schemas.microsoft.com/office/2006/metadata/properties" xmlns:ns1="http://schemas.microsoft.com/sharepoint/v3" xmlns:ns2="6dc4bcd6-49db-4c07-9060-8acfc67cef9f" xmlns:ns3="fb0879af-3eba-417a-a55a-ffe6dcd6ca77" targetNamespace="http://schemas.microsoft.com/office/2006/metadata/properties" ma:root="true" ma:fieldsID="ad1e9281a84c4949647088091c718de3" ns1:_="" ns2:_="" ns3:_="">
     <xsd:import namespace="http://schemas.microsoft.com/sharepoint/v3"/>
@@ -12577,16 +12586,25 @@
 </ct:contentTypeSchema>
 </file>
 
-<file path=customXml/item2.xml><?xml version="1.0" encoding="utf-8"?>
-<p:properties xmlns:p="http://schemas.microsoft.com/office/2006/metadata/properties" xmlns:xsi="http://www.w3.org/2001/XMLSchema-instance" xmlns:pc="http://schemas.microsoft.com/office/infopath/2007/PartnerControls">
-  <documentManagement>
-    <_ip_UnifiedCompliancePolicyUIAction xmlns="http://schemas.microsoft.com/sharepoint/v3" xsi:nil="true"/>
-    <_ip_UnifiedCompliancePolicyProperties xmlns="http://schemas.microsoft.com/sharepoint/v3" xsi:nil="true"/>
-  </documentManagement>
-</p:properties>
+<file path=customXml/itemProps1.xml><?xml version="1.0" encoding="utf-8"?>
+<ds:datastoreItem xmlns:ds="http://schemas.openxmlformats.org/officeDocument/2006/customXml" ds:itemID="{8FB61CFE-D4DA-4753-A9A5-D482B9609A35}">
+  <ds:schemaRefs>
+    <ds:schemaRef ds:uri="http://schemas.microsoft.com/office/2006/metadata/properties"/>
+    <ds:schemaRef ds:uri="http://schemas.openxmlformats.org/package/2006/metadata/core-properties"/>
+    <ds:schemaRef ds:uri="http://purl.org/dc/elements/1.1/"/>
+    <ds:schemaRef ds:uri="http://schemas.microsoft.com/office/2006/documentManagement/types"/>
+    <ds:schemaRef ds:uri="http://schemas.microsoft.com/sharepoint/v3"/>
+    <ds:schemaRef ds:uri="http://purl.org/dc/terms/"/>
+    <ds:schemaRef ds:uri="http://schemas.microsoft.com/office/infopath/2007/PartnerControls"/>
+    <ds:schemaRef ds:uri="http://www.w3.org/XML/1998/namespace"/>
+    <ds:schemaRef ds:uri="fb0879af-3eba-417a-a55a-ffe6dcd6ca77"/>
+    <ds:schemaRef ds:uri="6dc4bcd6-49db-4c07-9060-8acfc67cef9f"/>
+    <ds:schemaRef ds:uri="http://purl.org/dc/dcmitype/"/>
+  </ds:schemaRefs>
+</ds:datastoreItem>
 </file>
 
-<file path=customXml/itemProps1.xml><?xml version="1.0" encoding="utf-8"?>
+<file path=customXml/itemProps2.xml><?xml version="1.0" encoding="utf-8"?>
 <ds:datastoreItem xmlns:ds="http://schemas.openxmlformats.org/officeDocument/2006/customXml" ds:itemID="{58A784AD-7888-482C-A72A-80D3063962ED}">
   <ds:schemaRefs>
     <ds:schemaRef ds:uri="http://schemas.microsoft.com/office/2006/metadata/contentType"/>
@@ -12604,22 +12622,4 @@
     <ds:schemaRef ds:uri="http://schemas.microsoft.com/internal/obd"/>
   </ds:schemaRefs>
 </ds:datastoreItem>
-</file>
-
-<file path=customXml/itemProps2.xml><?xml version="1.0" encoding="utf-8"?>
-<ds:datastoreItem xmlns:ds="http://schemas.openxmlformats.org/officeDocument/2006/customXml" ds:itemID="{8FB61CFE-D4DA-4753-A9A5-D482B9609A35}">
-  <ds:schemaRefs>
-    <ds:schemaRef ds:uri="http://schemas.microsoft.com/office/2006/metadata/properties"/>
-    <ds:schemaRef ds:uri="http://schemas.openxmlformats.org/package/2006/metadata/core-properties"/>
-    <ds:schemaRef ds:uri="http://purl.org/dc/elements/1.1/"/>
-    <ds:schemaRef ds:uri="http://schemas.microsoft.com/office/2006/documentManagement/types"/>
-    <ds:schemaRef ds:uri="http://schemas.microsoft.com/sharepoint/v3"/>
-    <ds:schemaRef ds:uri="http://purl.org/dc/terms/"/>
-    <ds:schemaRef ds:uri="http://schemas.microsoft.com/office/infopath/2007/PartnerControls"/>
-    <ds:schemaRef ds:uri="http://www.w3.org/XML/1998/namespace"/>
-    <ds:schemaRef ds:uri="fb0879af-3eba-417a-a55a-ffe6dcd6ca77"/>
-    <ds:schemaRef ds:uri="6dc4bcd6-49db-4c07-9060-8acfc67cef9f"/>
-    <ds:schemaRef ds:uri="http://purl.org/dc/dcmitype/"/>
-  </ds:schemaRefs>
-</ds:datastoreItem>
 </file>
</xml_diff>

<commit_message>
Update "Current Progress: 20201230
</commit_message>
<xml_diff>
--- a/Lab/REP.pptx
+++ b/Lab/REP.pptx
@@ -249,7 +249,7 @@
                 <a:ea typeface="Microsoft JhengHei UI" panose="020B0604030504040204" pitchFamily="34" charset="-120"/>
                 <a:sym typeface="Microsoft JhengHei UI" panose="020B0604030504040204" pitchFamily="34" charset="-120"/>
               </a:rPr>
-              <a:t>2020/12/29</a:t>
+              <a:t>2020/12/30</a:t>
             </a:fld>
             <a:endParaRPr lang="en-US" altLang="zh-TW" dirty="0">
               <a:latin typeface="Microsoft JhengHei UI" panose="020B0604030504040204" pitchFamily="34" charset="-120"/>
@@ -458,7 +458,7 @@
             <a:fld id="{AA006804-164C-4CDA-8F38-2D5258C292C6}" type="datetime1">
               <a:rPr lang="zh-TW" altLang="en-US" smtClean="0"/>
               <a:pPr/>
-              <a:t>2020/12/29</a:t>
+              <a:t>2020/12/30</a:t>
             </a:fld>
             <a:endParaRPr lang="zh-TW" altLang="en-US" dirty="0"/>
           </a:p>
@@ -8781,7 +8781,7 @@
         <p:spPr>
           <a:xfrm>
             <a:off x="1407138" y="1797784"/>
-            <a:ext cx="7824578" cy="1631216"/>
+            <a:ext cx="8047256" cy="1631216"/>
           </a:xfrm>
           <a:prstGeom prst="rect">
             <a:avLst/>
@@ -8789,7 +8789,7 @@
           <a:noFill/>
         </p:spPr>
         <p:txBody>
-          <a:bodyPr wrap="none" rtlCol="0">
+          <a:bodyPr wrap="square" rtlCol="0">
             <a:spAutoFit/>
           </a:bodyPr>
           <a:lstStyle/>
@@ -9050,7 +9050,7 @@
                 <a:latin typeface="+mn-lt"/>
                 <a:ea typeface="DFKai-SB" panose="03000509000000000000" pitchFamily="65" charset="-120"/>
               </a:rPr>
-              <a:t>        張炎清 教授</a:t>
+              <a:t>         張炎清 教授</a:t>
             </a:r>
             <a:endParaRPr lang="en-US" altLang="zh-TW" sz="2200" b="1" i="0" dirty="0">
               <a:latin typeface="+mn-lt"/>
@@ -11650,7 +11650,7 @@
             </a:r>
             <a:r>
               <a:rPr lang="en-US" sz="2400" dirty="0"/>
-              <a:t> Pre-train and fine-tune the language model.</a:t>
+              <a:t>  Pre-train and fine-tune the language model.</a:t>
             </a:r>
           </a:p>
         </p:txBody>
@@ -14630,15 +14630,6 @@
 </file>
 
 <file path=customXml/item1.xml><?xml version="1.0" encoding="utf-8"?>
-<p:properties xmlns:p="http://schemas.microsoft.com/office/2006/metadata/properties" xmlns:xsi="http://www.w3.org/2001/XMLSchema-instance" xmlns:pc="http://schemas.microsoft.com/office/infopath/2007/PartnerControls">
-  <documentManagement>
-    <_ip_UnifiedCompliancePolicyUIAction xmlns="http://schemas.microsoft.com/sharepoint/v3" xsi:nil="true"/>
-    <_ip_UnifiedCompliancePolicyProperties xmlns="http://schemas.microsoft.com/sharepoint/v3" xsi:nil="true"/>
-  </documentManagement>
-</p:properties>
-</file>
-
-<file path=customXml/item2.xml><?xml version="1.0" encoding="utf-8"?>
 <ct:contentTypeSchema xmlns:ct="http://schemas.microsoft.com/office/2006/metadata/contentType" xmlns:ma="http://schemas.microsoft.com/office/2006/metadata/properties/metaAttributes" ct:_="" ma:_="" ma:contentTypeName="Document" ma:contentTypeID="0x010100DEEA25CC0A0AC24199CDC46C25B8B0BC" ma:contentTypeVersion="9" ma:contentTypeDescription="Create a new document." ma:contentTypeScope="" ma:versionID="76e25e1730b4532ab1d5e5b131a96a5a">
   <xsd:schema xmlns:xsd="http://www.w3.org/2001/XMLSchema" xmlns:xs="http://www.w3.org/2001/XMLSchema" xmlns:p="http://schemas.microsoft.com/office/2006/metadata/properties" xmlns:ns1="http://schemas.microsoft.com/sharepoint/v3" xmlns:ns2="6dc4bcd6-49db-4c07-9060-8acfc67cef9f" xmlns:ns3="fb0879af-3eba-417a-a55a-ffe6dcd6ca77" targetNamespace="http://schemas.microsoft.com/office/2006/metadata/properties" ma:root="true" ma:fieldsID="ad1e9281a84c4949647088091c718de3" ns1:_="" ns2:_="" ns3:_="">
     <xsd:import namespace="http://schemas.microsoft.com/sharepoint/v3"/>
@@ -14840,25 +14831,16 @@
 </ct:contentTypeSchema>
 </file>
 
-<file path=customXml/itemProps1.xml><?xml version="1.0" encoding="utf-8"?>
-<ds:datastoreItem xmlns:ds="http://schemas.openxmlformats.org/officeDocument/2006/customXml" ds:itemID="{8FB61CFE-D4DA-4753-A9A5-D482B9609A35}">
-  <ds:schemaRefs>
-    <ds:schemaRef ds:uri="http://schemas.microsoft.com/office/2006/metadata/properties"/>
-    <ds:schemaRef ds:uri="http://schemas.openxmlformats.org/package/2006/metadata/core-properties"/>
-    <ds:schemaRef ds:uri="http://purl.org/dc/elements/1.1/"/>
-    <ds:schemaRef ds:uri="http://schemas.microsoft.com/office/2006/documentManagement/types"/>
-    <ds:schemaRef ds:uri="http://schemas.microsoft.com/sharepoint/v3"/>
-    <ds:schemaRef ds:uri="http://purl.org/dc/terms/"/>
-    <ds:schemaRef ds:uri="http://schemas.microsoft.com/office/infopath/2007/PartnerControls"/>
-    <ds:schemaRef ds:uri="http://www.w3.org/XML/1998/namespace"/>
-    <ds:schemaRef ds:uri="fb0879af-3eba-417a-a55a-ffe6dcd6ca77"/>
-    <ds:schemaRef ds:uri="6dc4bcd6-49db-4c07-9060-8acfc67cef9f"/>
-    <ds:schemaRef ds:uri="http://purl.org/dc/dcmitype/"/>
-  </ds:schemaRefs>
-</ds:datastoreItem>
+<file path=customXml/item2.xml><?xml version="1.0" encoding="utf-8"?>
+<p:properties xmlns:p="http://schemas.microsoft.com/office/2006/metadata/properties" xmlns:xsi="http://www.w3.org/2001/XMLSchema-instance" xmlns:pc="http://schemas.microsoft.com/office/infopath/2007/PartnerControls">
+  <documentManagement>
+    <_ip_UnifiedCompliancePolicyUIAction xmlns="http://schemas.microsoft.com/sharepoint/v3" xsi:nil="true"/>
+    <_ip_UnifiedCompliancePolicyProperties xmlns="http://schemas.microsoft.com/sharepoint/v3" xsi:nil="true"/>
+  </documentManagement>
+</p:properties>
 </file>
 
-<file path=customXml/itemProps2.xml><?xml version="1.0" encoding="utf-8"?>
+<file path=customXml/itemProps1.xml><?xml version="1.0" encoding="utf-8"?>
 <ds:datastoreItem xmlns:ds="http://schemas.openxmlformats.org/officeDocument/2006/customXml" ds:itemID="{58A784AD-7888-482C-A72A-80D3063962ED}">
   <ds:schemaRefs>
     <ds:schemaRef ds:uri="http://schemas.microsoft.com/office/2006/metadata/contentType"/>
@@ -14876,4 +14858,22 @@
     <ds:schemaRef ds:uri="http://schemas.microsoft.com/internal/obd"/>
   </ds:schemaRefs>
 </ds:datastoreItem>
+</file>
+
+<file path=customXml/itemProps2.xml><?xml version="1.0" encoding="utf-8"?>
+<ds:datastoreItem xmlns:ds="http://schemas.openxmlformats.org/officeDocument/2006/customXml" ds:itemID="{8FB61CFE-D4DA-4753-A9A5-D482B9609A35}">
+  <ds:schemaRefs>
+    <ds:schemaRef ds:uri="http://schemas.microsoft.com/office/2006/metadata/properties"/>
+    <ds:schemaRef ds:uri="http://schemas.openxmlformats.org/package/2006/metadata/core-properties"/>
+    <ds:schemaRef ds:uri="http://purl.org/dc/elements/1.1/"/>
+    <ds:schemaRef ds:uri="http://schemas.microsoft.com/office/2006/documentManagement/types"/>
+    <ds:schemaRef ds:uri="http://schemas.microsoft.com/sharepoint/v3"/>
+    <ds:schemaRef ds:uri="http://purl.org/dc/terms/"/>
+    <ds:schemaRef ds:uri="http://schemas.microsoft.com/office/infopath/2007/PartnerControls"/>
+    <ds:schemaRef ds:uri="http://www.w3.org/XML/1998/namespace"/>
+    <ds:schemaRef ds:uri="fb0879af-3eba-417a-a55a-ffe6dcd6ca77"/>
+    <ds:schemaRef ds:uri="6dc4bcd6-49db-4c07-9060-8acfc67cef9f"/>
+    <ds:schemaRef ds:uri="http://purl.org/dc/dcmitype/"/>
+  </ds:schemaRefs>
+</ds:datastoreItem>
 </file>
</xml_diff>

<commit_message>
Update "Current Progress: Update REP"
</commit_message>
<xml_diff>
--- a/Lab/REP.pptx
+++ b/Lab/REP.pptx
@@ -249,7 +249,7 @@
                 <a:ea typeface="Microsoft JhengHei UI" panose="020B0604030504040204" pitchFamily="34" charset="-120"/>
                 <a:sym typeface="Microsoft JhengHei UI" panose="020B0604030504040204" pitchFamily="34" charset="-120"/>
               </a:rPr>
-              <a:t>2020/12/30</a:t>
+              <a:t>2020/12/31</a:t>
             </a:fld>
             <a:endParaRPr lang="en-US" altLang="zh-TW" dirty="0">
               <a:latin typeface="Microsoft JhengHei UI" panose="020B0604030504040204" pitchFamily="34" charset="-120"/>
@@ -458,7 +458,7 @@
             <a:fld id="{AA006804-164C-4CDA-8F38-2D5258C292C6}" type="datetime1">
               <a:rPr lang="zh-TW" altLang="en-US" smtClean="0"/>
               <a:pPr/>
-              <a:t>2020/12/30</a:t>
+              <a:t>2020/12/31</a:t>
             </a:fld>
             <a:endParaRPr lang="zh-TW" altLang="en-US" dirty="0"/>
           </a:p>
@@ -8780,8 +8780,8 @@
         </p:nvSpPr>
         <p:spPr>
           <a:xfrm>
-            <a:off x="1407138" y="1797784"/>
-            <a:ext cx="8047256" cy="1631216"/>
+            <a:off x="1319067" y="1797784"/>
+            <a:ext cx="8775150" cy="1631216"/>
           </a:xfrm>
           <a:prstGeom prst="rect">
             <a:avLst/>
@@ -9146,7 +9146,7 @@
         </p:nvSpPr>
         <p:spPr>
           <a:xfrm>
-            <a:off x="1575830" y="1640863"/>
+            <a:off x="1272901" y="1621886"/>
             <a:ext cx="3588931" cy="461665"/>
           </a:xfrm>
           <a:prstGeom prst="rect">
@@ -9188,7 +9188,7 @@
         </p:nvSpPr>
         <p:spPr>
           <a:xfrm>
-            <a:off x="2154803" y="2456953"/>
+            <a:off x="1773335" y="2428904"/>
             <a:ext cx="9500541" cy="461665"/>
           </a:xfrm>
           <a:prstGeom prst="rect">
@@ -9227,7 +9227,7 @@
         </p:nvSpPr>
         <p:spPr>
           <a:xfrm>
-            <a:off x="2154802" y="3169363"/>
+            <a:off x="1773334" y="3141314"/>
             <a:ext cx="9500541" cy="461665"/>
           </a:xfrm>
           <a:prstGeom prst="rect">
@@ -9247,7 +9247,7 @@
             </a:pPr>
             <a:r>
               <a:rPr lang="en-US" sz="2400" dirty="0"/>
-              <a:t>Each layers uses different linear transformations.</a:t>
+              <a:t>Each layer uses different linear transformations.</a:t>
             </a:r>
           </a:p>
         </p:txBody>
@@ -9266,7 +9266,7 @@
         </p:nvSpPr>
         <p:spPr>
           <a:xfrm>
-            <a:off x="2154802" y="3881773"/>
+            <a:off x="1773334" y="3853724"/>
             <a:ext cx="9500541" cy="461665"/>
           </a:xfrm>
           <a:prstGeom prst="rect">
@@ -9305,7 +9305,7 @@
           </p:cNvPicPr>
           <p:nvPr/>
         </p:nvPicPr>
-        <p:blipFill>
+        <p:blipFill rotWithShape="1">
           <a:blip r:embed="rId3" cstate="print">
             <a:extLst>
               <a:ext uri="{28A0092B-C50C-407E-A947-70E740481C1C}">
@@ -9313,14 +9313,13 @@
               </a:ext>
             </a:extLst>
           </a:blip>
-          <a:stretch>
-            <a:fillRect/>
-          </a:stretch>
+          <a:srcRect t="30505"/>
+          <a:stretch/>
         </p:blipFill>
         <p:spPr>
           <a:xfrm>
-            <a:off x="7569640" y="4703970"/>
-            <a:ext cx="3962401" cy="1584186"/>
+            <a:off x="7721105" y="4712245"/>
+            <a:ext cx="3962401" cy="1099076"/>
           </a:xfrm>
           <a:prstGeom prst="rect">
             <a:avLst/>
@@ -9829,12 +9828,219 @@
           </a:p>
         </p:txBody>
       </p:sp>
+      <p:sp>
+        <p:nvSpPr>
+          <p:cNvPr id="11" name="TextBox 10">
+            <a:extLst>
+              <a:ext uri="{FF2B5EF4-FFF2-40B4-BE49-F238E27FC236}">
+                <a16:creationId xmlns:a16="http://schemas.microsoft.com/office/drawing/2014/main" id="{047DF914-B467-334D-87BF-6ED281A9340C}"/>
+              </a:ext>
+            </a:extLst>
+          </p:cNvPr>
+          <p:cNvSpPr txBox="1"/>
+          <p:nvPr/>
+        </p:nvSpPr>
+        <p:spPr>
+          <a:xfrm>
+            <a:off x="1516651" y="3684012"/>
+            <a:ext cx="9561079" cy="461665"/>
+          </a:xfrm>
+          <a:prstGeom prst="rect">
+            <a:avLst/>
+          </a:prstGeom>
+          <a:noFill/>
+        </p:spPr>
+        <p:txBody>
+          <a:bodyPr wrap="square" rtlCol="0">
+            <a:spAutoFit/>
+          </a:bodyPr>
+          <a:lstStyle/>
+          <a:p>
+            <a:pPr marL="342900" indent="-342900">
+              <a:buFont typeface="Wingdings" pitchFamily="2" charset="2"/>
+              <a:buChar char="§"/>
+            </a:pPr>
+            <a:r>
+              <a:rPr lang="en-US" sz="2400" b="1" dirty="0">
+                <a:latin typeface="Calibri" panose="020F0502020204030204" pitchFamily="34" charset="0"/>
+                <a:cs typeface="Calibri" panose="020F0502020204030204" pitchFamily="34" charset="0"/>
+              </a:rPr>
+              <a:t>Activation Function:   </a:t>
+            </a:r>
+            <a:r>
+              <a:rPr lang="en-US" sz="2400" dirty="0">
+                <a:latin typeface="Times New Roman" panose="02020603050405020304" pitchFamily="18" charset="0"/>
+                <a:cs typeface="Times New Roman" panose="02020603050405020304" pitchFamily="18" charset="0"/>
+              </a:rPr>
+              <a:t>Gaussian Error Linear Unit (GELU)</a:t>
+            </a:r>
+          </a:p>
+        </p:txBody>
+      </p:sp>
+      <p:sp>
+        <p:nvSpPr>
+          <p:cNvPr id="12" name="TextBox 11">
+            <a:extLst>
+              <a:ext uri="{FF2B5EF4-FFF2-40B4-BE49-F238E27FC236}">
+                <a16:creationId xmlns:a16="http://schemas.microsoft.com/office/drawing/2014/main" id="{87F6B32E-0BBB-5943-984B-398FF49AE20E}"/>
+              </a:ext>
+            </a:extLst>
+          </p:cNvPr>
+          <p:cNvSpPr txBox="1"/>
+          <p:nvPr/>
+        </p:nvSpPr>
+        <p:spPr>
+          <a:xfrm>
+            <a:off x="952373" y="4496984"/>
+            <a:ext cx="5692392" cy="461665"/>
+          </a:xfrm>
+          <a:prstGeom prst="rect">
+            <a:avLst/>
+          </a:prstGeom>
+          <a:noFill/>
+        </p:spPr>
+        <p:txBody>
+          <a:bodyPr wrap="none" rtlCol="0">
+            <a:spAutoFit/>
+          </a:bodyPr>
+          <a:lstStyle/>
+          <a:p>
+            <a:pPr marL="342900" indent="-342900">
+              <a:buFont typeface="Arial" panose="020B0604020202020204" pitchFamily="34" charset="0"/>
+              <a:buChar char="•"/>
+            </a:pPr>
+            <a:r>
+              <a:rPr lang="en-US" sz="2400" dirty="0">
+                <a:latin typeface="Calibri" panose="020F0502020204030204" pitchFamily="34" charset="0"/>
+                <a:cs typeface="Calibri" panose="020F0502020204030204" pitchFamily="34" charset="0"/>
+              </a:rPr>
+              <a:t>Models: BERT, </a:t>
+            </a:r>
+            <a:r>
+              <a:rPr lang="en-US" sz="2400" dirty="0" err="1">
+                <a:latin typeface="Calibri" panose="020F0502020204030204" pitchFamily="34" charset="0"/>
+                <a:cs typeface="Calibri" panose="020F0502020204030204" pitchFamily="34" charset="0"/>
+              </a:rPr>
+              <a:t>RoBERTa</a:t>
+            </a:r>
+            <a:r>
+              <a:rPr lang="en-US" sz="2400" dirty="0">
+                <a:latin typeface="Calibri" panose="020F0502020204030204" pitchFamily="34" charset="0"/>
+                <a:cs typeface="Calibri" panose="020F0502020204030204" pitchFamily="34" charset="0"/>
+              </a:rPr>
+              <a:t>, </a:t>
+            </a:r>
+            <a:r>
+              <a:rPr lang="en-US" sz="2400" dirty="0" err="1">
+                <a:latin typeface="Calibri" panose="020F0502020204030204" pitchFamily="34" charset="0"/>
+                <a:cs typeface="Calibri" panose="020F0502020204030204" pitchFamily="34" charset="0"/>
+              </a:rPr>
+              <a:t>DistilBERT</a:t>
+            </a:r>
+            <a:r>
+              <a:rPr lang="en-US" sz="2400" dirty="0">
+                <a:latin typeface="Calibri" panose="020F0502020204030204" pitchFamily="34" charset="0"/>
+                <a:cs typeface="Calibri" panose="020F0502020204030204" pitchFamily="34" charset="0"/>
+              </a:rPr>
+              <a:t>, </a:t>
+            </a:r>
+            <a:r>
+              <a:rPr lang="en-US" sz="2400" dirty="0" err="1">
+                <a:latin typeface="Calibri" panose="020F0502020204030204" pitchFamily="34" charset="0"/>
+                <a:cs typeface="Calibri" panose="020F0502020204030204" pitchFamily="34" charset="0"/>
+              </a:rPr>
+              <a:t>XLNet</a:t>
+            </a:r>
+            <a:endParaRPr lang="en-US" sz="2400" dirty="0">
+              <a:latin typeface="Calibri" panose="020F0502020204030204" pitchFamily="34" charset="0"/>
+              <a:cs typeface="Calibri" panose="020F0502020204030204" pitchFamily="34" charset="0"/>
+            </a:endParaRPr>
+          </a:p>
+        </p:txBody>
+      </p:sp>
+      <p:sp>
+        <p:nvSpPr>
+          <p:cNvPr id="13" name="TextBox 12">
+            <a:extLst>
+              <a:ext uri="{FF2B5EF4-FFF2-40B4-BE49-F238E27FC236}">
+                <a16:creationId xmlns:a16="http://schemas.microsoft.com/office/drawing/2014/main" id="{EF565234-AACD-4849-9DD1-72F925B48DE6}"/>
+              </a:ext>
+            </a:extLst>
+          </p:cNvPr>
+          <p:cNvSpPr txBox="1"/>
+          <p:nvPr/>
+        </p:nvSpPr>
+        <p:spPr>
+          <a:xfrm>
+            <a:off x="952373" y="5289466"/>
+            <a:ext cx="10008317" cy="461665"/>
+          </a:xfrm>
+          <a:prstGeom prst="rect">
+            <a:avLst/>
+          </a:prstGeom>
+          <a:noFill/>
+        </p:spPr>
+        <p:txBody>
+          <a:bodyPr wrap="none" rtlCol="0">
+            <a:spAutoFit/>
+          </a:bodyPr>
+          <a:lstStyle/>
+          <a:p>
+            <a:pPr marL="342900" indent="-342900">
+              <a:buFont typeface="Arial" panose="020B0604020202020204" pitchFamily="34" charset="0"/>
+              <a:buChar char="•"/>
+            </a:pPr>
+            <a:r>
+              <a:rPr lang="en-US" sz="2400" b="1" dirty="0">
+                <a:latin typeface="Calibri" panose="020F0502020204030204" pitchFamily="34" charset="0"/>
+                <a:cs typeface="Calibri" panose="020F0502020204030204" pitchFamily="34" charset="0"/>
+              </a:rPr>
+              <a:t>Solving the short-term dependency problem of Transformer-based Models</a:t>
+            </a:r>
+          </a:p>
+        </p:txBody>
+      </p:sp>
+      <p:sp>
+        <p:nvSpPr>
+          <p:cNvPr id="9" name="文字方塊 8">
+            <a:extLst>
+              <a:ext uri="{FF2B5EF4-FFF2-40B4-BE49-F238E27FC236}">
+                <a16:creationId xmlns:a16="http://schemas.microsoft.com/office/drawing/2014/main" id="{AE73553F-4114-411F-A6A1-3291FA4B6CF8}"/>
+              </a:ext>
+            </a:extLst>
+          </p:cNvPr>
+          <p:cNvSpPr txBox="1"/>
+          <p:nvPr/>
+        </p:nvSpPr>
+        <p:spPr>
+          <a:xfrm>
+            <a:off x="11484528" y="6493241"/>
+            <a:ext cx="805343" cy="276999"/>
+          </a:xfrm>
+          <a:prstGeom prst="rect">
+            <a:avLst/>
+          </a:prstGeom>
+          <a:noFill/>
+        </p:spPr>
+        <p:txBody>
+          <a:bodyPr wrap="square" rtlCol="0">
+            <a:spAutoFit/>
+          </a:bodyPr>
+          <a:lstStyle/>
+          <a:p>
+            <a:r>
+              <a:rPr lang="en-US" sz="1200" dirty="0"/>
+              <a:t>11</a:t>
+            </a:r>
+          </a:p>
+        </p:txBody>
+      </p:sp>
       <p:pic>
         <p:nvPicPr>
-          <p:cNvPr id="4" name="Picture 3">
-            <a:extLst>
-              <a:ext uri="{FF2B5EF4-FFF2-40B4-BE49-F238E27FC236}">
-                <a16:creationId xmlns:a16="http://schemas.microsoft.com/office/drawing/2014/main" id="{C37648F9-7CB8-0A41-831D-BCB3F0DA04B2}"/>
+          <p:cNvPr id="10" name="Picture 9">
+            <a:extLst>
+              <a:ext uri="{FF2B5EF4-FFF2-40B4-BE49-F238E27FC236}">
+                <a16:creationId xmlns:a16="http://schemas.microsoft.com/office/drawing/2014/main" id="{73845E70-9BCF-3D4A-B14D-AAD9645A1F20}"/>
               </a:ext>
             </a:extLst>
           </p:cNvPr>
@@ -9844,7 +10050,7 @@
           <p:nvPr/>
         </p:nvPicPr>
         <p:blipFill>
-          <a:blip r:embed="rId3" cstate="print">
+          <a:blip r:embed="rId3">
             <a:extLst>
               <a:ext uri="{28A0092B-C50C-407E-A947-70E740481C1C}">
                 <a14:useLocalDpi xmlns:a14="http://schemas.microsoft.com/office/drawing/2010/main" val="0"/>
@@ -9857,221 +10063,14 @@
         </p:blipFill>
         <p:spPr>
           <a:xfrm>
-            <a:off x="2973545" y="2871040"/>
-            <a:ext cx="5783152" cy="552971"/>
+            <a:off x="2545805" y="2921395"/>
+            <a:ext cx="4991100" cy="431800"/>
           </a:xfrm>
           <a:prstGeom prst="rect">
             <a:avLst/>
           </a:prstGeom>
         </p:spPr>
       </p:pic>
-      <p:sp>
-        <p:nvSpPr>
-          <p:cNvPr id="11" name="TextBox 10">
-            <a:extLst>
-              <a:ext uri="{FF2B5EF4-FFF2-40B4-BE49-F238E27FC236}">
-                <a16:creationId xmlns:a16="http://schemas.microsoft.com/office/drawing/2014/main" id="{047DF914-B467-334D-87BF-6ED281A9340C}"/>
-              </a:ext>
-            </a:extLst>
-          </p:cNvPr>
-          <p:cNvSpPr txBox="1"/>
-          <p:nvPr/>
-        </p:nvSpPr>
-        <p:spPr>
-          <a:xfrm>
-            <a:off x="1516651" y="3684012"/>
-            <a:ext cx="9561079" cy="461665"/>
-          </a:xfrm>
-          <a:prstGeom prst="rect">
-            <a:avLst/>
-          </a:prstGeom>
-          <a:noFill/>
-        </p:spPr>
-        <p:txBody>
-          <a:bodyPr wrap="square" rtlCol="0">
-            <a:spAutoFit/>
-          </a:bodyPr>
-          <a:lstStyle/>
-          <a:p>
-            <a:pPr marL="342900" indent="-342900">
-              <a:buFont typeface="Wingdings" pitchFamily="2" charset="2"/>
-              <a:buChar char="§"/>
-            </a:pPr>
-            <a:r>
-              <a:rPr lang="en-US" sz="2400" b="1" dirty="0">
-                <a:latin typeface="Calibri" panose="020F0502020204030204" pitchFamily="34" charset="0"/>
-                <a:cs typeface="Calibri" panose="020F0502020204030204" pitchFamily="34" charset="0"/>
-              </a:rPr>
-              <a:t>Activation Function:   </a:t>
-            </a:r>
-            <a:r>
-              <a:rPr lang="en-US" sz="2400" dirty="0">
-                <a:latin typeface="Times New Roman" panose="02020603050405020304" pitchFamily="18" charset="0"/>
-                <a:cs typeface="Times New Roman" panose="02020603050405020304" pitchFamily="18" charset="0"/>
-              </a:rPr>
-              <a:t>Gaussian Error Linear Unit (GELU)</a:t>
-            </a:r>
-          </a:p>
-        </p:txBody>
-      </p:sp>
-      <p:sp>
-        <p:nvSpPr>
-          <p:cNvPr id="12" name="TextBox 11">
-            <a:extLst>
-              <a:ext uri="{FF2B5EF4-FFF2-40B4-BE49-F238E27FC236}">
-                <a16:creationId xmlns:a16="http://schemas.microsoft.com/office/drawing/2014/main" id="{87F6B32E-0BBB-5943-984B-398FF49AE20E}"/>
-              </a:ext>
-            </a:extLst>
-          </p:cNvPr>
-          <p:cNvSpPr txBox="1"/>
-          <p:nvPr/>
-        </p:nvSpPr>
-        <p:spPr>
-          <a:xfrm>
-            <a:off x="952373" y="4496984"/>
-            <a:ext cx="5692392" cy="461665"/>
-          </a:xfrm>
-          <a:prstGeom prst="rect">
-            <a:avLst/>
-          </a:prstGeom>
-          <a:noFill/>
-        </p:spPr>
-        <p:txBody>
-          <a:bodyPr wrap="none" rtlCol="0">
-            <a:spAutoFit/>
-          </a:bodyPr>
-          <a:lstStyle/>
-          <a:p>
-            <a:pPr marL="342900" indent="-342900">
-              <a:buFont typeface="Arial" panose="020B0604020202020204" pitchFamily="34" charset="0"/>
-              <a:buChar char="•"/>
-            </a:pPr>
-            <a:r>
-              <a:rPr lang="en-US" sz="2400" dirty="0">
-                <a:latin typeface="Calibri" panose="020F0502020204030204" pitchFamily="34" charset="0"/>
-                <a:cs typeface="Calibri" panose="020F0502020204030204" pitchFamily="34" charset="0"/>
-              </a:rPr>
-              <a:t>Models: BERT, </a:t>
-            </a:r>
-            <a:r>
-              <a:rPr lang="en-US" sz="2400" dirty="0" err="1">
-                <a:latin typeface="Calibri" panose="020F0502020204030204" pitchFamily="34" charset="0"/>
-                <a:cs typeface="Calibri" panose="020F0502020204030204" pitchFamily="34" charset="0"/>
-              </a:rPr>
-              <a:t>RoBERTa</a:t>
-            </a:r>
-            <a:r>
-              <a:rPr lang="en-US" sz="2400" dirty="0">
-                <a:latin typeface="Calibri" panose="020F0502020204030204" pitchFamily="34" charset="0"/>
-                <a:cs typeface="Calibri" panose="020F0502020204030204" pitchFamily="34" charset="0"/>
-              </a:rPr>
-              <a:t>, </a:t>
-            </a:r>
-            <a:r>
-              <a:rPr lang="en-US" sz="2400" dirty="0" err="1">
-                <a:latin typeface="Calibri" panose="020F0502020204030204" pitchFamily="34" charset="0"/>
-                <a:cs typeface="Calibri" panose="020F0502020204030204" pitchFamily="34" charset="0"/>
-              </a:rPr>
-              <a:t>DistilBERT</a:t>
-            </a:r>
-            <a:r>
-              <a:rPr lang="en-US" sz="2400" dirty="0">
-                <a:latin typeface="Calibri" panose="020F0502020204030204" pitchFamily="34" charset="0"/>
-                <a:cs typeface="Calibri" panose="020F0502020204030204" pitchFamily="34" charset="0"/>
-              </a:rPr>
-              <a:t>, </a:t>
-            </a:r>
-            <a:r>
-              <a:rPr lang="en-US" sz="2400" dirty="0" err="1">
-                <a:latin typeface="Calibri" panose="020F0502020204030204" pitchFamily="34" charset="0"/>
-                <a:cs typeface="Calibri" panose="020F0502020204030204" pitchFamily="34" charset="0"/>
-              </a:rPr>
-              <a:t>XLNet</a:t>
-            </a:r>
-            <a:endParaRPr lang="en-US" sz="2400" dirty="0">
-              <a:latin typeface="Calibri" panose="020F0502020204030204" pitchFamily="34" charset="0"/>
-              <a:cs typeface="Calibri" panose="020F0502020204030204" pitchFamily="34" charset="0"/>
-            </a:endParaRPr>
-          </a:p>
-        </p:txBody>
-      </p:sp>
-      <p:sp>
-        <p:nvSpPr>
-          <p:cNvPr id="13" name="TextBox 12">
-            <a:extLst>
-              <a:ext uri="{FF2B5EF4-FFF2-40B4-BE49-F238E27FC236}">
-                <a16:creationId xmlns:a16="http://schemas.microsoft.com/office/drawing/2014/main" id="{EF565234-AACD-4849-9DD1-72F925B48DE6}"/>
-              </a:ext>
-            </a:extLst>
-          </p:cNvPr>
-          <p:cNvSpPr txBox="1"/>
-          <p:nvPr/>
-        </p:nvSpPr>
-        <p:spPr>
-          <a:xfrm>
-            <a:off x="952373" y="5289466"/>
-            <a:ext cx="10008317" cy="461665"/>
-          </a:xfrm>
-          <a:prstGeom prst="rect">
-            <a:avLst/>
-          </a:prstGeom>
-          <a:noFill/>
-        </p:spPr>
-        <p:txBody>
-          <a:bodyPr wrap="none" rtlCol="0">
-            <a:spAutoFit/>
-          </a:bodyPr>
-          <a:lstStyle/>
-          <a:p>
-            <a:pPr marL="342900" indent="-342900">
-              <a:buFont typeface="Arial" panose="020B0604020202020204" pitchFamily="34" charset="0"/>
-              <a:buChar char="•"/>
-            </a:pPr>
-            <a:r>
-              <a:rPr lang="en-US" sz="2400" b="1" dirty="0">
-                <a:latin typeface="Calibri" panose="020F0502020204030204" pitchFamily="34" charset="0"/>
-                <a:cs typeface="Calibri" panose="020F0502020204030204" pitchFamily="34" charset="0"/>
-              </a:rPr>
-              <a:t>Solving the short-term dependency problem of Transformer-based Models</a:t>
-            </a:r>
-          </a:p>
-        </p:txBody>
-      </p:sp>
-      <p:sp>
-        <p:nvSpPr>
-          <p:cNvPr id="9" name="文字方塊 8">
-            <a:extLst>
-              <a:ext uri="{FF2B5EF4-FFF2-40B4-BE49-F238E27FC236}">
-                <a16:creationId xmlns:a16="http://schemas.microsoft.com/office/drawing/2014/main" id="{AE73553F-4114-411F-A6A1-3291FA4B6CF8}"/>
-              </a:ext>
-            </a:extLst>
-          </p:cNvPr>
-          <p:cNvSpPr txBox="1"/>
-          <p:nvPr/>
-        </p:nvSpPr>
-        <p:spPr>
-          <a:xfrm>
-            <a:off x="11484528" y="6493241"/>
-            <a:ext cx="805343" cy="276999"/>
-          </a:xfrm>
-          <a:prstGeom prst="rect">
-            <a:avLst/>
-          </a:prstGeom>
-          <a:noFill/>
-        </p:spPr>
-        <p:txBody>
-          <a:bodyPr wrap="square" rtlCol="0">
-            <a:spAutoFit/>
-          </a:bodyPr>
-          <a:lstStyle/>
-          <a:p>
-            <a:r>
-              <a:rPr lang="en-US" sz="1200" dirty="0"/>
-              <a:t>11</a:t>
-            </a:r>
-          </a:p>
-        </p:txBody>
-      </p:sp>
     </p:spTree>
     <p:extLst>
       <p:ext uri="{BB962C8B-B14F-4D97-AF65-F5344CB8AC3E}">
@@ -10869,7 +10868,7 @@
         <p:spPr>
           <a:xfrm>
             <a:off x="1065604" y="1549929"/>
-            <a:ext cx="10109569" cy="3758141"/>
+            <a:ext cx="10287472" cy="3824275"/>
           </a:xfrm>
           <a:prstGeom prst="rect">
             <a:avLst/>
@@ -10998,7 +10997,7 @@
         </p:nvSpPr>
         <p:spPr>
           <a:xfrm>
-            <a:off x="1110517" y="1639362"/>
+            <a:off x="985534" y="1650581"/>
             <a:ext cx="8310608" cy="430887"/>
           </a:xfrm>
           <a:prstGeom prst="rect">
@@ -11050,7 +11049,7 @@
         </p:nvSpPr>
         <p:spPr>
           <a:xfrm>
-            <a:off x="1110517" y="2693535"/>
+            <a:off x="985534" y="2704754"/>
             <a:ext cx="10927800" cy="769441"/>
           </a:xfrm>
           <a:prstGeom prst="rect">
@@ -11111,7 +11110,7 @@
         </p:nvSpPr>
         <p:spPr>
           <a:xfrm>
-            <a:off x="1110517" y="4002140"/>
+            <a:off x="985534" y="4013359"/>
             <a:ext cx="10661060" cy="769441"/>
           </a:xfrm>
           <a:prstGeom prst="rect">
@@ -11158,7 +11157,7 @@
         </p:nvSpPr>
         <p:spPr>
           <a:xfrm>
-            <a:off x="1110517" y="5112989"/>
+            <a:off x="985534" y="5124208"/>
             <a:ext cx="11206466" cy="769441"/>
           </a:xfrm>
           <a:prstGeom prst="rect">
@@ -12322,7 +12321,7 @@
         </p:nvSpPr>
         <p:spPr>
           <a:xfrm>
-            <a:off x="1194713" y="1428041"/>
+            <a:off x="1194713" y="1546994"/>
             <a:ext cx="6652527" cy="461665"/>
           </a:xfrm>
           <a:prstGeom prst="rect">
@@ -12413,7 +12412,7 @@
         </p:nvSpPr>
         <p:spPr>
           <a:xfrm>
-            <a:off x="1194713" y="2877113"/>
+            <a:off x="1194713" y="3015472"/>
             <a:ext cx="3864007" cy="461665"/>
           </a:xfrm>
           <a:prstGeom prst="rect">
@@ -12436,7 +12435,7 @@
                 <a:latin typeface="Calibri" panose="020F0502020204030204" pitchFamily="34" charset="0"/>
                 <a:cs typeface="Calibri" panose="020F0502020204030204" pitchFamily="34" charset="0"/>
               </a:rPr>
-              <a:t>Task: </a:t>
+              <a:t>Task:   </a:t>
             </a:r>
             <a:r>
               <a:rPr lang="en-US" sz="2400" b="1" dirty="0">
@@ -12465,7 +12464,7 @@
         </p:nvSpPr>
         <p:spPr>
           <a:xfrm>
-            <a:off x="1194713" y="3369277"/>
+            <a:off x="1194713" y="3629648"/>
             <a:ext cx="3238387" cy="461665"/>
           </a:xfrm>
           <a:prstGeom prst="rect">
@@ -12514,7 +12513,7 @@
         </p:nvSpPr>
         <p:spPr>
           <a:xfrm>
-            <a:off x="1752850" y="3922389"/>
+            <a:off x="1589387" y="4243824"/>
             <a:ext cx="5001690" cy="461665"/>
           </a:xfrm>
           <a:prstGeom prst="rect">
@@ -12556,7 +12555,7 @@
         </p:nvSpPr>
         <p:spPr>
           <a:xfrm>
-            <a:off x="1752848" y="4535656"/>
+            <a:off x="1589385" y="4857091"/>
             <a:ext cx="10907922" cy="461665"/>
           </a:xfrm>
           <a:prstGeom prst="rect">
@@ -12598,7 +12597,7 @@
         </p:nvSpPr>
         <p:spPr>
           <a:xfrm>
-            <a:off x="1752849" y="5058203"/>
+            <a:off x="1589386" y="5379638"/>
             <a:ext cx="4111960" cy="461665"/>
           </a:xfrm>
           <a:prstGeom prst="rect">
@@ -12640,7 +12639,7 @@
         </p:nvSpPr>
         <p:spPr>
           <a:xfrm>
-            <a:off x="1752848" y="5672379"/>
+            <a:off x="1589385" y="5993814"/>
             <a:ext cx="5536259" cy="461665"/>
           </a:xfrm>
           <a:prstGeom prst="rect">
@@ -12717,7 +12716,7 @@
         </p:nvSpPr>
         <p:spPr>
           <a:xfrm>
-            <a:off x="2737871" y="1996388"/>
+            <a:off x="3282620" y="2169775"/>
             <a:ext cx="10450286" cy="769441"/>
           </a:xfrm>
           <a:prstGeom prst="rect">
@@ -13544,7 +13543,7 @@
         </p:nvSpPr>
         <p:spPr>
           <a:xfrm>
-            <a:off x="1806418" y="4185280"/>
+            <a:off x="1908823" y="3954447"/>
             <a:ext cx="3588931" cy="461665"/>
           </a:xfrm>
           <a:prstGeom prst="rect">
@@ -13572,12 +13571,124 @@
           </a:p>
         </p:txBody>
       </p:sp>
+      <p:sp>
+        <p:nvSpPr>
+          <p:cNvPr id="12" name="TextBox 11">
+            <a:extLst>
+              <a:ext uri="{FF2B5EF4-FFF2-40B4-BE49-F238E27FC236}">
+                <a16:creationId xmlns:a16="http://schemas.microsoft.com/office/drawing/2014/main" id="{BADF6B0D-70A2-C543-A968-7B986D74325C}"/>
+              </a:ext>
+            </a:extLst>
+          </p:cNvPr>
+          <p:cNvSpPr txBox="1"/>
+          <p:nvPr/>
+        </p:nvSpPr>
+        <p:spPr>
+          <a:xfrm>
+            <a:off x="1806418" y="1669873"/>
+            <a:ext cx="4257127" cy="461665"/>
+          </a:xfrm>
+          <a:prstGeom prst="rect">
+            <a:avLst/>
+          </a:prstGeom>
+          <a:noFill/>
+        </p:spPr>
+        <p:txBody>
+          <a:bodyPr wrap="none" rtlCol="0">
+            <a:spAutoFit/>
+          </a:bodyPr>
+          <a:lstStyle/>
+          <a:p>
+            <a:pPr marL="342900" indent="-342900">
+              <a:buFont typeface="Arial" panose="020B0604020202020204" pitchFamily="34" charset="0"/>
+              <a:buChar char="•"/>
+            </a:pPr>
+            <a:r>
+              <a:rPr lang="en-US" sz="2400" b="1" dirty="0">
+                <a:latin typeface="Calibri" panose="020F0502020204030204" pitchFamily="34" charset="0"/>
+                <a:cs typeface="Calibri" panose="020F0502020204030204" pitchFamily="34" charset="0"/>
+              </a:rPr>
+              <a:t>Scaled Dot-Product Attention</a:t>
+            </a:r>
+          </a:p>
+        </p:txBody>
+      </p:sp>
       <p:pic>
         <p:nvPicPr>
-          <p:cNvPr id="8" name="Graphic 7">
-            <a:extLst>
-              <a:ext uri="{FF2B5EF4-FFF2-40B4-BE49-F238E27FC236}">
-                <a16:creationId xmlns:a16="http://schemas.microsoft.com/office/drawing/2014/main" id="{ED9A1A52-F217-754E-A733-83DA33FECBD7}"/>
+          <p:cNvPr id="4" name="圖片 3">
+            <a:extLst>
+              <a:ext uri="{FF2B5EF4-FFF2-40B4-BE49-F238E27FC236}">
+                <a16:creationId xmlns:a16="http://schemas.microsoft.com/office/drawing/2014/main" id="{E4E23801-30FF-482F-98A2-6E26DDF23DC6}"/>
+              </a:ext>
+            </a:extLst>
+          </p:cNvPr>
+          <p:cNvPicPr>
+            <a:picLocks noChangeAspect="1"/>
+          </p:cNvPicPr>
+          <p:nvPr/>
+        </p:nvPicPr>
+        <p:blipFill rotWithShape="1">
+          <a:blip r:embed="rId3">
+            <a:extLst>
+              <a:ext uri="{28A0092B-C50C-407E-A947-70E740481C1C}">
+                <a14:useLocalDpi xmlns:a14="http://schemas.microsoft.com/office/drawing/2010/main" val="0"/>
+              </a:ext>
+            </a:extLst>
+          </a:blip>
+          <a:srcRect l="-1" r="38337"/>
+          <a:stretch/>
+        </p:blipFill>
+        <p:spPr>
+          <a:xfrm>
+            <a:off x="2175226" y="2724542"/>
+            <a:ext cx="3949874" cy="758554"/>
+          </a:xfrm>
+          <a:prstGeom prst="rect">
+            <a:avLst/>
+          </a:prstGeom>
+        </p:spPr>
+      </p:pic>
+      <p:sp>
+        <p:nvSpPr>
+          <p:cNvPr id="9" name="文字方塊 8">
+            <a:extLst>
+              <a:ext uri="{FF2B5EF4-FFF2-40B4-BE49-F238E27FC236}">
+                <a16:creationId xmlns:a16="http://schemas.microsoft.com/office/drawing/2014/main" id="{3D5ACCB8-6422-4619-B5BC-16878077F822}"/>
+              </a:ext>
+            </a:extLst>
+          </p:cNvPr>
+          <p:cNvSpPr txBox="1"/>
+          <p:nvPr/>
+        </p:nvSpPr>
+        <p:spPr>
+          <a:xfrm>
+            <a:off x="11484528" y="6493241"/>
+            <a:ext cx="805343" cy="276999"/>
+          </a:xfrm>
+          <a:prstGeom prst="rect">
+            <a:avLst/>
+          </a:prstGeom>
+          <a:noFill/>
+        </p:spPr>
+        <p:txBody>
+          <a:bodyPr wrap="square" rtlCol="0">
+            <a:spAutoFit/>
+          </a:bodyPr>
+          <a:lstStyle/>
+          <a:p>
+            <a:r>
+              <a:rPr lang="en-US" sz="1200" dirty="0"/>
+              <a:t>8</a:t>
+            </a:r>
+          </a:p>
+        </p:txBody>
+      </p:sp>
+      <p:pic>
+        <p:nvPicPr>
+          <p:cNvPr id="13" name="Picture 12">
+            <a:extLst>
+              <a:ext uri="{FF2B5EF4-FFF2-40B4-BE49-F238E27FC236}">
+                <a16:creationId xmlns:a16="http://schemas.microsoft.com/office/drawing/2014/main" id="{97B67585-F312-3A45-A82A-C36F1F2B97CA}"/>
               </a:ext>
             </a:extLst>
           </p:cNvPr>
@@ -13587,13 +13698,10 @@
           <p:nvPr/>
         </p:nvPicPr>
         <p:blipFill>
-          <a:blip r:embed="rId3" cstate="print">
+          <a:blip r:embed="rId4">
             <a:extLst>
               <a:ext uri="{28A0092B-C50C-407E-A947-70E740481C1C}">
                 <a14:useLocalDpi xmlns:a14="http://schemas.microsoft.com/office/drawing/2010/main" val="0"/>
-              </a:ext>
-              <a:ext uri="{96DAC541-7B7A-43D3-8B79-37D633B846F1}">
-                <asvg:svgBlip xmlns:asvg="http://schemas.microsoft.com/office/drawing/2016/SVG/main" r:embed="rId4"/>
               </a:ext>
             </a:extLst>
           </a:blip>
@@ -13603,8 +13711,8 @@
         </p:blipFill>
         <p:spPr>
           <a:xfrm>
-            <a:off x="6805581" y="1669873"/>
-            <a:ext cx="4791583" cy="2224663"/>
+            <a:off x="6664460" y="1495094"/>
+            <a:ext cx="4893239" cy="2355252"/>
           </a:xfrm>
           <a:prstGeom prst="rect">
             <a:avLst/>
@@ -13613,10 +13721,10 @@
       </p:pic>
       <p:pic>
         <p:nvPicPr>
-          <p:cNvPr id="11" name="Graphic 10">
-            <a:extLst>
-              <a:ext uri="{FF2B5EF4-FFF2-40B4-BE49-F238E27FC236}">
-                <a16:creationId xmlns:a16="http://schemas.microsoft.com/office/drawing/2014/main" id="{556628F3-2664-9F45-9E3D-A5F441A60F44}"/>
+          <p:cNvPr id="15" name="Picture 14">
+            <a:extLst>
+              <a:ext uri="{FF2B5EF4-FFF2-40B4-BE49-F238E27FC236}">
+                <a16:creationId xmlns:a16="http://schemas.microsoft.com/office/drawing/2014/main" id="{5FF01190-8416-FB49-8361-20930620B806}"/>
               </a:ext>
             </a:extLst>
           </p:cNvPr>
@@ -13626,13 +13734,10 @@
           <p:nvPr/>
         </p:nvPicPr>
         <p:blipFill>
-          <a:blip r:embed="rId5" cstate="print">
+          <a:blip r:embed="rId5">
             <a:extLst>
               <a:ext uri="{28A0092B-C50C-407E-A947-70E740481C1C}">
                 <a14:useLocalDpi xmlns:a14="http://schemas.microsoft.com/office/drawing/2010/main" val="0"/>
-              </a:ext>
-              <a:ext uri="{96DAC541-7B7A-43D3-8B79-37D633B846F1}">
-                <asvg:svgBlip xmlns:asvg="http://schemas.microsoft.com/office/drawing/2016/SVG/main" r:embed="rId6"/>
               </a:ext>
             </a:extLst>
           </a:blip>
@@ -13642,156 +13747,14 @@
         </p:blipFill>
         <p:spPr>
           <a:xfrm>
-            <a:off x="7084422" y="4263571"/>
-            <a:ext cx="4712474" cy="2381438"/>
+            <a:off x="5800550" y="4185280"/>
+            <a:ext cx="6159577" cy="2441242"/>
           </a:xfrm>
           <a:prstGeom prst="rect">
             <a:avLst/>
           </a:prstGeom>
         </p:spPr>
       </p:pic>
-      <p:sp>
-        <p:nvSpPr>
-          <p:cNvPr id="12" name="TextBox 11">
-            <a:extLst>
-              <a:ext uri="{FF2B5EF4-FFF2-40B4-BE49-F238E27FC236}">
-                <a16:creationId xmlns:a16="http://schemas.microsoft.com/office/drawing/2014/main" id="{BADF6B0D-70A2-C543-A968-7B986D74325C}"/>
-              </a:ext>
-            </a:extLst>
-          </p:cNvPr>
-          <p:cNvSpPr txBox="1"/>
-          <p:nvPr/>
-        </p:nvSpPr>
-        <p:spPr>
-          <a:xfrm>
-            <a:off x="1806418" y="1669873"/>
-            <a:ext cx="4257127" cy="461665"/>
-          </a:xfrm>
-          <a:prstGeom prst="rect">
-            <a:avLst/>
-          </a:prstGeom>
-          <a:noFill/>
-        </p:spPr>
-        <p:txBody>
-          <a:bodyPr wrap="none" rtlCol="0">
-            <a:spAutoFit/>
-          </a:bodyPr>
-          <a:lstStyle/>
-          <a:p>
-            <a:pPr marL="342900" indent="-342900">
-              <a:buFont typeface="Arial" panose="020B0604020202020204" pitchFamily="34" charset="0"/>
-              <a:buChar char="•"/>
-            </a:pPr>
-            <a:r>
-              <a:rPr lang="en-US" sz="2400" b="1" dirty="0">
-                <a:latin typeface="Calibri" panose="020F0502020204030204" pitchFamily="34" charset="0"/>
-                <a:cs typeface="Calibri" panose="020F0502020204030204" pitchFamily="34" charset="0"/>
-              </a:rPr>
-              <a:t>Scaled Dot-Product Attention</a:t>
-            </a:r>
-          </a:p>
-        </p:txBody>
-      </p:sp>
-      <p:pic>
-        <p:nvPicPr>
-          <p:cNvPr id="4" name="圖片 3">
-            <a:extLst>
-              <a:ext uri="{FF2B5EF4-FFF2-40B4-BE49-F238E27FC236}">
-                <a16:creationId xmlns:a16="http://schemas.microsoft.com/office/drawing/2014/main" id="{E4E23801-30FF-482F-98A2-6E26DDF23DC6}"/>
-              </a:ext>
-            </a:extLst>
-          </p:cNvPr>
-          <p:cNvPicPr>
-            <a:picLocks noChangeAspect="1"/>
-          </p:cNvPicPr>
-          <p:nvPr/>
-        </p:nvPicPr>
-        <p:blipFill rotWithShape="1">
-          <a:blip r:embed="rId7">
-            <a:extLst>
-              <a:ext uri="{28A0092B-C50C-407E-A947-70E740481C1C}">
-                <a14:useLocalDpi xmlns:a14="http://schemas.microsoft.com/office/drawing/2010/main" val="0"/>
-              </a:ext>
-            </a:extLst>
-          </a:blip>
-          <a:srcRect l="-1" r="38337"/>
-          <a:stretch/>
-        </p:blipFill>
-        <p:spPr>
-          <a:xfrm>
-            <a:off x="2175226" y="2724542"/>
-            <a:ext cx="3949874" cy="758554"/>
-          </a:xfrm>
-          <a:prstGeom prst="rect">
-            <a:avLst/>
-          </a:prstGeom>
-        </p:spPr>
-      </p:pic>
-      <p:sp>
-        <p:nvSpPr>
-          <p:cNvPr id="3" name="文字方塊 2"/>
-          <p:cNvSpPr txBox="1"/>
-          <p:nvPr/>
-        </p:nvSpPr>
-        <p:spPr>
-          <a:xfrm>
-            <a:off x="4407108" y="3483096"/>
-            <a:ext cx="869430" cy="369332"/>
-          </a:xfrm>
-          <a:prstGeom prst="rect">
-            <a:avLst/>
-          </a:prstGeom>
-          <a:noFill/>
-        </p:spPr>
-        <p:txBody>
-          <a:bodyPr wrap="square" rtlCol="0">
-            <a:spAutoFit/>
-          </a:bodyPr>
-          <a:lstStyle/>
-          <a:p>
-            <a:r>
-              <a:rPr lang="en-US" altLang="zh-TW" dirty="0"/>
-              <a:t>W</a:t>
-            </a:r>
-            <a:endParaRPr lang="zh-TW" altLang="en-US" dirty="0"/>
-          </a:p>
-        </p:txBody>
-      </p:sp>
-      <p:sp>
-        <p:nvSpPr>
-          <p:cNvPr id="9" name="文字方塊 8">
-            <a:extLst>
-              <a:ext uri="{FF2B5EF4-FFF2-40B4-BE49-F238E27FC236}">
-                <a16:creationId xmlns:a16="http://schemas.microsoft.com/office/drawing/2014/main" id="{3D5ACCB8-6422-4619-B5BC-16878077F822}"/>
-              </a:ext>
-            </a:extLst>
-          </p:cNvPr>
-          <p:cNvSpPr txBox="1"/>
-          <p:nvPr/>
-        </p:nvSpPr>
-        <p:spPr>
-          <a:xfrm>
-            <a:off x="11484528" y="6493241"/>
-            <a:ext cx="805343" cy="276999"/>
-          </a:xfrm>
-          <a:prstGeom prst="rect">
-            <a:avLst/>
-          </a:prstGeom>
-          <a:noFill/>
-        </p:spPr>
-        <p:txBody>
-          <a:bodyPr wrap="square" rtlCol="0">
-            <a:spAutoFit/>
-          </a:bodyPr>
-          <a:lstStyle/>
-          <a:p>
-            <a:r>
-              <a:rPr lang="en-US" sz="1200" dirty="0"/>
-              <a:t>8</a:t>
-            </a:r>
-          </a:p>
-        </p:txBody>
-      </p:sp>
     </p:spTree>
     <p:extLst>
       <p:ext uri="{BB962C8B-B14F-4D97-AF65-F5344CB8AC3E}">

</xml_diff>

<commit_message>
Update "2021010: Current Progress: REP with graphs"
</commit_message>
<xml_diff>
--- a/Lab/REP.pptx
+++ b/Lab/REP.pptx
@@ -5,10 +5,10 @@
     <p:sldMasterId id="2147483648" r:id="rId3"/>
   </p:sldMasterIdLst>
   <p:notesMasterIdLst>
-    <p:notesMasterId r:id="rId24"/>
+    <p:notesMasterId r:id="rId25"/>
   </p:notesMasterIdLst>
   <p:handoutMasterIdLst>
-    <p:handoutMasterId r:id="rId25"/>
+    <p:handoutMasterId r:id="rId26"/>
   </p:handoutMasterIdLst>
   <p:sldIdLst>
     <p:sldId id="282" r:id="rId4"/>
@@ -26,11 +26,12 @@
     <p:sldId id="313" r:id="rId16"/>
     <p:sldId id="311" r:id="rId17"/>
     <p:sldId id="305" r:id="rId18"/>
-    <p:sldId id="307" r:id="rId19"/>
-    <p:sldId id="306" r:id="rId20"/>
-    <p:sldId id="308" r:id="rId21"/>
-    <p:sldId id="309" r:id="rId22"/>
-    <p:sldId id="310" r:id="rId23"/>
+    <p:sldId id="318" r:id="rId19"/>
+    <p:sldId id="307" r:id="rId20"/>
+    <p:sldId id="306" r:id="rId21"/>
+    <p:sldId id="308" r:id="rId22"/>
+    <p:sldId id="309" r:id="rId23"/>
+    <p:sldId id="310" r:id="rId24"/>
   </p:sldIdLst>
   <p:sldSz cx="12192000" cy="6858000"/>
   <p:notesSz cx="6858000" cy="9144000"/>
@@ -1620,7 +1621,7 @@
           <p:cNvPr id="5" name="頁首版面配置區 4">
             <a:extLst>
               <a:ext uri="{FF2B5EF4-FFF2-40B4-BE49-F238E27FC236}">
-                <a16:creationId xmlns:a16="http://schemas.microsoft.com/office/drawing/2014/main" id="{395663F1-EC29-4F7E-B7B3-C47C3BAA9D0F}"/>
+                <a16:creationId xmlns:a16="http://schemas.microsoft.com/office/drawing/2014/main" id="{FF80F06F-3710-4263-9F80-0D2A92DDD819}"/>
               </a:ext>
             </a:extLst>
           </p:cNvPr>
@@ -1647,7 +1648,7 @@
     </p:spTree>
     <p:extLst>
       <p:ext uri="{BB962C8B-B14F-4D97-AF65-F5344CB8AC3E}">
-        <p14:creationId xmlns:p14="http://schemas.microsoft.com/office/powerpoint/2010/main" val="2701519937"/>
+        <p14:creationId xmlns:p14="http://schemas.microsoft.com/office/powerpoint/2010/main" val="1798000473"/>
       </p:ext>
     </p:extLst>
   </p:cSld>
@@ -1734,7 +1735,7 @@
           <p:cNvPr id="5" name="頁首版面配置區 4">
             <a:extLst>
               <a:ext uri="{FF2B5EF4-FFF2-40B4-BE49-F238E27FC236}">
-                <a16:creationId xmlns:a16="http://schemas.microsoft.com/office/drawing/2014/main" id="{6E8C5AB6-E61C-4B97-8238-2D971E93E5C6}"/>
+                <a16:creationId xmlns:a16="http://schemas.microsoft.com/office/drawing/2014/main" id="{395663F1-EC29-4F7E-B7B3-C47C3BAA9D0F}"/>
               </a:ext>
             </a:extLst>
           </p:cNvPr>
@@ -1761,7 +1762,7 @@
     </p:spTree>
     <p:extLst>
       <p:ext uri="{BB962C8B-B14F-4D97-AF65-F5344CB8AC3E}">
-        <p14:creationId xmlns:p14="http://schemas.microsoft.com/office/powerpoint/2010/main" val="3565233456"/>
+        <p14:creationId xmlns:p14="http://schemas.microsoft.com/office/powerpoint/2010/main" val="2701519937"/>
       </p:ext>
     </p:extLst>
   </p:cSld>
@@ -1848,7 +1849,7 @@
           <p:cNvPr id="5" name="頁首版面配置區 4">
             <a:extLst>
               <a:ext uri="{FF2B5EF4-FFF2-40B4-BE49-F238E27FC236}">
-                <a16:creationId xmlns:a16="http://schemas.microsoft.com/office/drawing/2014/main" id="{8FD7EE22-8F34-425B-82D2-EC0C0E66DD50}"/>
+                <a16:creationId xmlns:a16="http://schemas.microsoft.com/office/drawing/2014/main" id="{6E8C5AB6-E61C-4B97-8238-2D971E93E5C6}"/>
               </a:ext>
             </a:extLst>
           </p:cNvPr>
@@ -1875,7 +1876,7 @@
     </p:spTree>
     <p:extLst>
       <p:ext uri="{BB962C8B-B14F-4D97-AF65-F5344CB8AC3E}">
-        <p14:creationId xmlns:p14="http://schemas.microsoft.com/office/powerpoint/2010/main" val="2220057016"/>
+        <p14:creationId xmlns:p14="http://schemas.microsoft.com/office/powerpoint/2010/main" val="3565233456"/>
       </p:ext>
     </p:extLst>
   </p:cSld>
@@ -1962,7 +1963,7 @@
           <p:cNvPr id="5" name="頁首版面配置區 4">
             <a:extLst>
               <a:ext uri="{FF2B5EF4-FFF2-40B4-BE49-F238E27FC236}">
-                <a16:creationId xmlns:a16="http://schemas.microsoft.com/office/drawing/2014/main" id="{B0ED961B-B77E-4128-9A1E-997B6008F2D5}"/>
+                <a16:creationId xmlns:a16="http://schemas.microsoft.com/office/drawing/2014/main" id="{8FD7EE22-8F34-425B-82D2-EC0C0E66DD50}"/>
               </a:ext>
             </a:extLst>
           </p:cNvPr>
@@ -1989,7 +1990,7 @@
     </p:spTree>
     <p:extLst>
       <p:ext uri="{BB962C8B-B14F-4D97-AF65-F5344CB8AC3E}">
-        <p14:creationId xmlns:p14="http://schemas.microsoft.com/office/powerpoint/2010/main" val="2333112210"/>
+        <p14:creationId xmlns:p14="http://schemas.microsoft.com/office/powerpoint/2010/main" val="2220057016"/>
       </p:ext>
     </p:extLst>
   </p:cSld>
@@ -2180,6 +2181,120 @@
               <a:rPr lang="en-ZA" smtClean="0"/>
               <a:pPr/>
               <a:t>20</a:t>
+            </a:fld>
+            <a:endParaRPr lang="en-ZA"/>
+          </a:p>
+        </p:txBody>
+      </p:sp>
+      <p:sp>
+        <p:nvSpPr>
+          <p:cNvPr id="5" name="頁首版面配置區 4">
+            <a:extLst>
+              <a:ext uri="{FF2B5EF4-FFF2-40B4-BE49-F238E27FC236}">
+                <a16:creationId xmlns:a16="http://schemas.microsoft.com/office/drawing/2014/main" id="{B0ED961B-B77E-4128-9A1E-997B6008F2D5}"/>
+              </a:ext>
+            </a:extLst>
+          </p:cNvPr>
+          <p:cNvSpPr>
+            <a:spLocks noGrp="1"/>
+          </p:cNvSpPr>
+          <p:nvPr>
+            <p:ph type="hdr" sz="quarter"/>
+          </p:nvPr>
+        </p:nvSpPr>
+        <p:spPr/>
+        <p:txBody>
+          <a:bodyPr/>
+          <a:lstStyle/>
+          <a:p>
+            <a:r>
+              <a:rPr lang="en-US" altLang="zh-TW"/>
+              <a:t>1</a:t>
+            </a:r>
+            <a:endParaRPr lang="zh-TW" altLang="en-US" dirty="0"/>
+          </a:p>
+        </p:txBody>
+      </p:sp>
+    </p:spTree>
+    <p:extLst>
+      <p:ext uri="{BB962C8B-B14F-4D97-AF65-F5344CB8AC3E}">
+        <p14:creationId xmlns:p14="http://schemas.microsoft.com/office/powerpoint/2010/main" val="2333112210"/>
+      </p:ext>
+    </p:extLst>
+  </p:cSld>
+  <p:clrMapOvr>
+    <a:masterClrMapping/>
+  </p:clrMapOvr>
+</p:notes>
+</file>
+
+<file path=ppt/notesSlides/notesSlide21.xml><?xml version="1.0" encoding="utf-8"?>
+<p:notes xmlns:a="http://schemas.openxmlformats.org/drawingml/2006/main" xmlns:r="http://schemas.openxmlformats.org/officeDocument/2006/relationships" xmlns:p="http://schemas.openxmlformats.org/presentationml/2006/main">
+  <p:cSld>
+    <p:spTree>
+      <p:nvGrpSpPr>
+        <p:cNvPr id="1" name=""/>
+        <p:cNvGrpSpPr/>
+        <p:nvPr/>
+      </p:nvGrpSpPr>
+      <p:grpSpPr>
+        <a:xfrm>
+          <a:off x="0" y="0"/>
+          <a:ext cx="0" cy="0"/>
+          <a:chOff x="0" y="0"/>
+          <a:chExt cx="0" cy="0"/>
+        </a:xfrm>
+      </p:grpSpPr>
+      <p:sp>
+        <p:nvSpPr>
+          <p:cNvPr id="2" name="投影片影像版面配置區 1"/>
+          <p:cNvSpPr>
+            <a:spLocks noGrp="1" noRot="1" noChangeAspect="1"/>
+          </p:cNvSpPr>
+          <p:nvPr>
+            <p:ph type="sldImg"/>
+          </p:nvPr>
+        </p:nvSpPr>
+        <p:spPr/>
+      </p:sp>
+      <p:sp>
+        <p:nvSpPr>
+          <p:cNvPr id="3" name="備忘稿版面配置區 2"/>
+          <p:cNvSpPr>
+            <a:spLocks noGrp="1"/>
+          </p:cNvSpPr>
+          <p:nvPr>
+            <p:ph type="body" idx="1"/>
+          </p:nvPr>
+        </p:nvSpPr>
+        <p:spPr/>
+        <p:txBody>
+          <a:bodyPr/>
+          <a:lstStyle/>
+          <a:p>
+            <a:endParaRPr lang="zh-TW" altLang="en-US" dirty="0"/>
+          </a:p>
+        </p:txBody>
+      </p:sp>
+      <p:sp>
+        <p:nvSpPr>
+          <p:cNvPr id="4" name="投影片編號版面配置區 3"/>
+          <p:cNvSpPr>
+            <a:spLocks noGrp="1"/>
+          </p:cNvSpPr>
+          <p:nvPr>
+            <p:ph type="sldNum" sz="quarter" idx="10"/>
+          </p:nvPr>
+        </p:nvSpPr>
+        <p:spPr/>
+        <p:txBody>
+          <a:bodyPr/>
+          <a:lstStyle/>
+          <a:p>
+            <a:fld id="{8530193B-564F-4854-8A52-728F3FB19C85}" type="slidenum">
+              <a:rPr lang="en-ZA" smtClean="0"/>
+              <a:pPr/>
+              <a:t>21</a:t>
             </a:fld>
             <a:endParaRPr lang="en-ZA"/>
           </a:p>
@@ -9708,10 +9823,10 @@
       </p:sp>
       <p:pic>
         <p:nvPicPr>
-          <p:cNvPr id="4" name="圖片 3">
-            <a:extLst>
-              <a:ext uri="{FF2B5EF4-FFF2-40B4-BE49-F238E27FC236}">
-                <a16:creationId xmlns:a16="http://schemas.microsoft.com/office/drawing/2014/main" id="{E4E23801-30FF-482F-98A2-6E26DDF23DC6}"/>
+          <p:cNvPr id="6" name="Picture 5">
+            <a:extLst>
+              <a:ext uri="{FF2B5EF4-FFF2-40B4-BE49-F238E27FC236}">
+                <a16:creationId xmlns:a16="http://schemas.microsoft.com/office/drawing/2014/main" id="{B8E806E6-B826-3B46-B210-8D486570DE5E}"/>
               </a:ext>
             </a:extLst>
           </p:cNvPr>
@@ -9720,7 +9835,7 @@
           </p:cNvPicPr>
           <p:nvPr/>
         </p:nvPicPr>
-        <p:blipFill rotWithShape="1">
+        <p:blipFill>
           <a:blip r:embed="rId3">
             <a:extLst>
               <a:ext uri="{28A0092B-C50C-407E-A947-70E740481C1C}">
@@ -9728,25 +9843,61 @@
               </a:ext>
             </a:extLst>
           </a:blip>
-          <a:srcRect l="-1" r="38337"/>
-          <a:stretch/>
+          <a:stretch>
+            <a:fillRect/>
+          </a:stretch>
         </p:blipFill>
         <p:spPr>
           <a:xfrm>
-            <a:off x="1081364" y="3178660"/>
-            <a:ext cx="4216087" cy="809679"/>
+            <a:off x="5648527" y="2959904"/>
+            <a:ext cx="6095998" cy="2947642"/>
           </a:xfrm>
           <a:prstGeom prst="rect">
             <a:avLst/>
           </a:prstGeom>
         </p:spPr>
       </p:pic>
+      <p:sp>
+        <p:nvSpPr>
+          <p:cNvPr id="7" name="文字方塊 6">
+            <a:extLst>
+              <a:ext uri="{FF2B5EF4-FFF2-40B4-BE49-F238E27FC236}">
+                <a16:creationId xmlns:a16="http://schemas.microsoft.com/office/drawing/2014/main" id="{7886FB91-0482-40E5-9FBB-F504CBB62D77}"/>
+              </a:ext>
+            </a:extLst>
+          </p:cNvPr>
+          <p:cNvSpPr txBox="1"/>
+          <p:nvPr/>
+        </p:nvSpPr>
+        <p:spPr>
+          <a:xfrm>
+            <a:off x="11484528" y="6493241"/>
+            <a:ext cx="805343" cy="276999"/>
+          </a:xfrm>
+          <a:prstGeom prst="rect">
+            <a:avLst/>
+          </a:prstGeom>
+          <a:noFill/>
+        </p:spPr>
+        <p:txBody>
+          <a:bodyPr wrap="square" rtlCol="0">
+            <a:spAutoFit/>
+          </a:bodyPr>
+          <a:lstStyle/>
+          <a:p>
+            <a:r>
+              <a:rPr lang="en-US" sz="1200" dirty="0"/>
+              <a:t>7</a:t>
+            </a:r>
+          </a:p>
+        </p:txBody>
+      </p:sp>
       <p:pic>
         <p:nvPicPr>
-          <p:cNvPr id="6" name="Picture 5">
-            <a:extLst>
-              <a:ext uri="{FF2B5EF4-FFF2-40B4-BE49-F238E27FC236}">
-                <a16:creationId xmlns:a16="http://schemas.microsoft.com/office/drawing/2014/main" id="{B8E806E6-B826-3B46-B210-8D486570DE5E}"/>
+          <p:cNvPr id="5" name="圖片 4">
+            <a:extLst>
+              <a:ext uri="{FF2B5EF4-FFF2-40B4-BE49-F238E27FC236}">
+                <a16:creationId xmlns:a16="http://schemas.microsoft.com/office/drawing/2014/main" id="{2AEDD248-D649-460F-B2EB-2B052352F7A1}"/>
               </a:ext>
             </a:extLst>
           </p:cNvPr>
@@ -9769,49 +9920,14 @@
         </p:blipFill>
         <p:spPr>
           <a:xfrm>
-            <a:off x="5648527" y="2959904"/>
-            <a:ext cx="6095998" cy="2947642"/>
+            <a:off x="940203" y="2977359"/>
+            <a:ext cx="5554393" cy="903282"/>
           </a:xfrm>
           <a:prstGeom prst="rect">
             <a:avLst/>
           </a:prstGeom>
         </p:spPr>
       </p:pic>
-      <p:sp>
-        <p:nvSpPr>
-          <p:cNvPr id="7" name="文字方塊 6">
-            <a:extLst>
-              <a:ext uri="{FF2B5EF4-FFF2-40B4-BE49-F238E27FC236}">
-                <a16:creationId xmlns:a16="http://schemas.microsoft.com/office/drawing/2014/main" id="{7886FB91-0482-40E5-9FBB-F504CBB62D77}"/>
-              </a:ext>
-            </a:extLst>
-          </p:cNvPr>
-          <p:cNvSpPr txBox="1"/>
-          <p:nvPr/>
-        </p:nvSpPr>
-        <p:spPr>
-          <a:xfrm>
-            <a:off x="11484528" y="6493241"/>
-            <a:ext cx="805343" cy="276999"/>
-          </a:xfrm>
-          <a:prstGeom prst="rect">
-            <a:avLst/>
-          </a:prstGeom>
-          <a:noFill/>
-        </p:spPr>
-        <p:txBody>
-          <a:bodyPr wrap="square" rtlCol="0">
-            <a:spAutoFit/>
-          </a:bodyPr>
-          <a:lstStyle/>
-          <a:p>
-            <a:r>
-              <a:rPr lang="en-US" sz="1200" dirty="0"/>
-              <a:t>7</a:t>
-            </a:r>
-          </a:p>
-        </p:txBody>
-      </p:sp>
     </p:spTree>
     <p:extLst>
       <p:ext uri="{BB962C8B-B14F-4D97-AF65-F5344CB8AC3E}">
@@ -9969,12 +10085,47 @@
           </a:p>
         </p:txBody>
       </p:sp>
+      <p:sp>
+        <p:nvSpPr>
+          <p:cNvPr id="9" name="文字方塊 8">
+            <a:extLst>
+              <a:ext uri="{FF2B5EF4-FFF2-40B4-BE49-F238E27FC236}">
+                <a16:creationId xmlns:a16="http://schemas.microsoft.com/office/drawing/2014/main" id="{3D5ACCB8-6422-4619-B5BC-16878077F822}"/>
+              </a:ext>
+            </a:extLst>
+          </p:cNvPr>
+          <p:cNvSpPr txBox="1"/>
+          <p:nvPr/>
+        </p:nvSpPr>
+        <p:spPr>
+          <a:xfrm>
+            <a:off x="11484528" y="6493241"/>
+            <a:ext cx="805343" cy="276999"/>
+          </a:xfrm>
+          <a:prstGeom prst="rect">
+            <a:avLst/>
+          </a:prstGeom>
+          <a:noFill/>
+        </p:spPr>
+        <p:txBody>
+          <a:bodyPr wrap="square" rtlCol="0">
+            <a:spAutoFit/>
+          </a:bodyPr>
+          <a:lstStyle/>
+          <a:p>
+            <a:r>
+              <a:rPr lang="en-US" sz="1200" dirty="0"/>
+              <a:t>8</a:t>
+            </a:r>
+          </a:p>
+        </p:txBody>
+      </p:sp>
       <p:pic>
         <p:nvPicPr>
-          <p:cNvPr id="4" name="圖片 3">
-            <a:extLst>
-              <a:ext uri="{FF2B5EF4-FFF2-40B4-BE49-F238E27FC236}">
-                <a16:creationId xmlns:a16="http://schemas.microsoft.com/office/drawing/2014/main" id="{E4E23801-30FF-482F-98A2-6E26DDF23DC6}"/>
+          <p:cNvPr id="13" name="Picture 12">
+            <a:extLst>
+              <a:ext uri="{FF2B5EF4-FFF2-40B4-BE49-F238E27FC236}">
+                <a16:creationId xmlns:a16="http://schemas.microsoft.com/office/drawing/2014/main" id="{97B67585-F312-3A45-A82A-C36F1F2B97CA}"/>
               </a:ext>
             </a:extLst>
           </p:cNvPr>
@@ -9983,7 +10134,7 @@
           </p:cNvPicPr>
           <p:nvPr/>
         </p:nvPicPr>
-        <p:blipFill rotWithShape="1">
+        <p:blipFill>
           <a:blip r:embed="rId3">
             <a:extLst>
               <a:ext uri="{28A0092B-C50C-407E-A947-70E740481C1C}">
@@ -9991,60 +10142,26 @@
               </a:ext>
             </a:extLst>
           </a:blip>
-          <a:srcRect l="-1" r="38337"/>
-          <a:stretch/>
+          <a:stretch>
+            <a:fillRect/>
+          </a:stretch>
         </p:blipFill>
         <p:spPr>
           <a:xfrm>
-            <a:off x="2146126" y="2293443"/>
-            <a:ext cx="3949874" cy="758554"/>
+            <a:off x="6654297" y="1332130"/>
+            <a:ext cx="4921509" cy="2368859"/>
           </a:xfrm>
           <a:prstGeom prst="rect">
             <a:avLst/>
           </a:prstGeom>
         </p:spPr>
       </p:pic>
-      <p:sp>
-        <p:nvSpPr>
-          <p:cNvPr id="9" name="文字方塊 8">
-            <a:extLst>
-              <a:ext uri="{FF2B5EF4-FFF2-40B4-BE49-F238E27FC236}">
-                <a16:creationId xmlns:a16="http://schemas.microsoft.com/office/drawing/2014/main" id="{3D5ACCB8-6422-4619-B5BC-16878077F822}"/>
-              </a:ext>
-            </a:extLst>
-          </p:cNvPr>
-          <p:cNvSpPr txBox="1"/>
-          <p:nvPr/>
-        </p:nvSpPr>
-        <p:spPr>
-          <a:xfrm>
-            <a:off x="11484528" y="6493241"/>
-            <a:ext cx="805343" cy="276999"/>
-          </a:xfrm>
-          <a:prstGeom prst="rect">
-            <a:avLst/>
-          </a:prstGeom>
-          <a:noFill/>
-        </p:spPr>
-        <p:txBody>
-          <a:bodyPr wrap="square" rtlCol="0">
-            <a:spAutoFit/>
-          </a:bodyPr>
-          <a:lstStyle/>
-          <a:p>
-            <a:r>
-              <a:rPr lang="en-US" sz="1200" dirty="0"/>
-              <a:t>8</a:t>
-            </a:r>
-          </a:p>
-        </p:txBody>
-      </p:sp>
       <p:pic>
         <p:nvPicPr>
-          <p:cNvPr id="13" name="Picture 12">
-            <a:extLst>
-              <a:ext uri="{FF2B5EF4-FFF2-40B4-BE49-F238E27FC236}">
-                <a16:creationId xmlns:a16="http://schemas.microsoft.com/office/drawing/2014/main" id="{97B67585-F312-3A45-A82A-C36F1F2B97CA}"/>
+          <p:cNvPr id="15" name="Picture 14">
+            <a:extLst>
+              <a:ext uri="{FF2B5EF4-FFF2-40B4-BE49-F238E27FC236}">
+                <a16:creationId xmlns:a16="http://schemas.microsoft.com/office/drawing/2014/main" id="{5FF01190-8416-FB49-8361-20930620B806}"/>
               </a:ext>
             </a:extLst>
           </p:cNvPr>
@@ -10067,8 +10184,8 @@
         </p:blipFill>
         <p:spPr>
           <a:xfrm>
-            <a:off x="6654297" y="1332130"/>
-            <a:ext cx="4921509" cy="2368859"/>
+            <a:off x="5504507" y="3954446"/>
+            <a:ext cx="6599976" cy="2615787"/>
           </a:xfrm>
           <a:prstGeom prst="rect">
             <a:avLst/>
@@ -10077,10 +10194,10 @@
       </p:pic>
       <p:pic>
         <p:nvPicPr>
-          <p:cNvPr id="15" name="Picture 14">
-            <a:extLst>
-              <a:ext uri="{FF2B5EF4-FFF2-40B4-BE49-F238E27FC236}">
-                <a16:creationId xmlns:a16="http://schemas.microsoft.com/office/drawing/2014/main" id="{5FF01190-8416-FB49-8361-20930620B806}"/>
+          <p:cNvPr id="8" name="圖片 4">
+            <a:extLst>
+              <a:ext uri="{FF2B5EF4-FFF2-40B4-BE49-F238E27FC236}">
+                <a16:creationId xmlns:a16="http://schemas.microsoft.com/office/drawing/2014/main" id="{2745ECBE-B8E6-A648-9983-11ADD7E7F410}"/>
               </a:ext>
             </a:extLst>
           </p:cNvPr>
@@ -10103,8 +10220,8 @@
         </p:blipFill>
         <p:spPr>
           <a:xfrm>
-            <a:off x="5504507" y="3954446"/>
-            <a:ext cx="6599976" cy="2615787"/>
+            <a:off x="1409221" y="2394863"/>
+            <a:ext cx="4770210" cy="775754"/>
           </a:xfrm>
           <a:prstGeom prst="rect">
             <a:avLst/>
@@ -10501,7 +10618,7 @@
         <p:spPr>
           <a:xfrm>
             <a:off x="1699490" y="1896283"/>
-            <a:ext cx="9047605" cy="830997"/>
+            <a:ext cx="9335248" cy="830997"/>
           </a:xfrm>
           <a:prstGeom prst="rect">
             <a:avLst/>
@@ -10520,8 +10637,8 @@
             </a:pPr>
             <a:r>
               <a:rPr lang="en-US" sz="2400" b="1" dirty="0">
-                <a:latin typeface="Calibri" panose="020F0502020204030204" pitchFamily="34" charset="0"/>
-                <a:cs typeface="Calibri" panose="020F0502020204030204" pitchFamily="34" charset="0"/>
+                <a:latin typeface="Times New Roman" panose="02020603050405020304" pitchFamily="18" charset="0"/>
+                <a:cs typeface="Times New Roman" panose="02020603050405020304" pitchFamily="18" charset="0"/>
               </a:rPr>
               <a:t>Too many heads -&gt; Hard to process queries from multiple positions</a:t>
             </a:r>
@@ -10530,14 +10647,14 @@
             <a:pPr lvl="6"/>
             <a:r>
               <a:rPr lang="en-US" sz="2400" b="1" dirty="0">
-                <a:latin typeface="Calibri" panose="020F0502020204030204" pitchFamily="34" charset="0"/>
-                <a:cs typeface="Calibri" panose="020F0502020204030204" pitchFamily="34" charset="0"/>
+                <a:latin typeface="Times New Roman" panose="02020603050405020304" pitchFamily="18" charset="0"/>
+                <a:cs typeface="Times New Roman" panose="02020603050405020304" pitchFamily="18" charset="0"/>
               </a:rPr>
               <a:t>in parallel.</a:t>
             </a:r>
             <a:endParaRPr lang="en-US" sz="2400" dirty="0">
-              <a:latin typeface="Calibri" panose="020F0502020204030204" pitchFamily="34" charset="0"/>
-              <a:cs typeface="Calibri" panose="020F0502020204030204" pitchFamily="34" charset="0"/>
+              <a:latin typeface="Times New Roman" panose="02020603050405020304" pitchFamily="18" charset="0"/>
+              <a:cs typeface="Times New Roman" panose="02020603050405020304" pitchFamily="18" charset="0"/>
             </a:endParaRPr>
           </a:p>
         </p:txBody>
@@ -10557,7 +10674,7 @@
         <p:spPr>
           <a:xfrm>
             <a:off x="1699491" y="2727280"/>
-            <a:ext cx="3747949" cy="461665"/>
+            <a:ext cx="3860159" cy="461665"/>
           </a:xfrm>
           <a:prstGeom prst="rect">
             <a:avLst/>
@@ -10579,8 +10696,8 @@
                 <a:solidFill>
                   <a:srgbClr val="FF0000"/>
                 </a:solidFill>
-                <a:latin typeface="Calibri" panose="020F0502020204030204" pitchFamily="34" charset="0"/>
-                <a:cs typeface="Calibri" panose="020F0502020204030204" pitchFamily="34" charset="0"/>
+                <a:latin typeface="Times New Roman" panose="02020603050405020304" pitchFamily="18" charset="0"/>
+                <a:cs typeface="Times New Roman" panose="02020603050405020304" pitchFamily="18" charset="0"/>
               </a:rPr>
               <a:t>Valid heads are unknown</a:t>
             </a:r>
@@ -10621,15 +10738,15 @@
             </a:pPr>
             <a:r>
               <a:rPr lang="en-US" sz="2400" b="1" dirty="0">
-                <a:latin typeface="Calibri" panose="020F0502020204030204" pitchFamily="34" charset="0"/>
-                <a:cs typeface="Calibri" panose="020F0502020204030204" pitchFamily="34" charset="0"/>
+                <a:latin typeface="Times New Roman" panose="02020603050405020304" pitchFamily="18" charset="0"/>
+                <a:cs typeface="Times New Roman" panose="02020603050405020304" pitchFamily="18" charset="0"/>
               </a:rPr>
               <a:t>Processing with “Valid heads” problem:</a:t>
             </a:r>
             <a:br>
               <a:rPr lang="en-US" sz="2400" b="1" dirty="0">
-                <a:latin typeface="Calibri" panose="020F0502020204030204" pitchFamily="34" charset="0"/>
-                <a:cs typeface="Calibri" panose="020F0502020204030204" pitchFamily="34" charset="0"/>
+                <a:latin typeface="Times New Roman" panose="02020603050405020304" pitchFamily="18" charset="0"/>
+                <a:cs typeface="Times New Roman" panose="02020603050405020304" pitchFamily="18" charset="0"/>
               </a:rPr>
             </a:br>
             <a:r>
@@ -10637,8 +10754,8 @@
                 <a:solidFill>
                   <a:srgbClr val="FF0000"/>
                 </a:solidFill>
-                <a:latin typeface="Calibri" panose="020F0502020204030204" pitchFamily="34" charset="0"/>
-                <a:cs typeface="Calibri" panose="020F0502020204030204" pitchFamily="34" charset="0"/>
+                <a:latin typeface="Times New Roman" panose="02020603050405020304" pitchFamily="18" charset="0"/>
+                <a:cs typeface="Times New Roman" panose="02020603050405020304" pitchFamily="18" charset="0"/>
               </a:rPr>
               <a:t>	</a:t>
             </a:r>
@@ -10647,8 +10764,8 @@
                 <a:solidFill>
                   <a:srgbClr val="FF0000"/>
                 </a:solidFill>
-                <a:latin typeface="Calibri" panose="020F0502020204030204" pitchFamily="34" charset="0"/>
-                <a:cs typeface="Calibri" panose="020F0502020204030204" pitchFamily="34" charset="0"/>
+                <a:latin typeface="Times New Roman" panose="02020603050405020304" pitchFamily="18" charset="0"/>
+                <a:cs typeface="Times New Roman" panose="02020603050405020304" pitchFamily="18" charset="0"/>
               </a:rPr>
             </a:br>
             <a:r>
@@ -10656,8 +10773,8 @@
                 <a:solidFill>
                   <a:srgbClr val="FF0000"/>
                 </a:solidFill>
-                <a:latin typeface="Calibri" panose="020F0502020204030204" pitchFamily="34" charset="0"/>
-                <a:cs typeface="Calibri" panose="020F0502020204030204" pitchFamily="34" charset="0"/>
+                <a:latin typeface="Times New Roman" panose="02020603050405020304" pitchFamily="18" charset="0"/>
+                <a:cs typeface="Times New Roman" panose="02020603050405020304" pitchFamily="18" charset="0"/>
               </a:rPr>
               <a:t>	We propose EDM-</a:t>
             </a:r>
@@ -10666,8 +10783,8 @@
                 <a:solidFill>
                   <a:srgbClr val="FF0000"/>
                 </a:solidFill>
-                <a:latin typeface="Calibri" panose="020F0502020204030204" pitchFamily="34" charset="0"/>
-                <a:cs typeface="Calibri" panose="020F0502020204030204" pitchFamily="34" charset="0"/>
+                <a:latin typeface="Times New Roman" panose="02020603050405020304" pitchFamily="18" charset="0"/>
+                <a:cs typeface="Times New Roman" panose="02020603050405020304" pitchFamily="18" charset="0"/>
               </a:rPr>
               <a:t>RoBERTa</a:t>
             </a:r>
@@ -10676,8 +10793,8 @@
                 <a:solidFill>
                   <a:srgbClr val="FF0000"/>
                 </a:solidFill>
-                <a:latin typeface="Calibri" panose="020F0502020204030204" pitchFamily="34" charset="0"/>
-                <a:cs typeface="Calibri" panose="020F0502020204030204" pitchFamily="34" charset="0"/>
+                <a:latin typeface="Times New Roman" panose="02020603050405020304" pitchFamily="18" charset="0"/>
+                <a:cs typeface="Times New Roman" panose="02020603050405020304" pitchFamily="18" charset="0"/>
               </a:rPr>
               <a:t> to optimize the attention process</a:t>
             </a:r>
@@ -10924,7 +11041,7 @@
                 <a:latin typeface="Times New Roman" panose="02020603050405020304" pitchFamily="18" charset="0"/>
                 <a:cs typeface="Times New Roman" panose="02020603050405020304" pitchFamily="18" charset="0"/>
               </a:rPr>
-              <a:t>Gaussian Error Linear Unit (GELU)</a:t>
+              <a:t>Gaussian Error Linear Units (GELUs)</a:t>
             </a:r>
           </a:p>
         </p:txBody>
@@ -11089,10 +11206,10 @@
       </p:sp>
       <p:pic>
         <p:nvPicPr>
-          <p:cNvPr id="10" name="Picture 9">
-            <a:extLst>
-              <a:ext uri="{FF2B5EF4-FFF2-40B4-BE49-F238E27FC236}">
-                <a16:creationId xmlns:a16="http://schemas.microsoft.com/office/drawing/2014/main" id="{73845E70-9BCF-3D4A-B14D-AAD9645A1F20}"/>
+          <p:cNvPr id="4" name="Picture 3">
+            <a:extLst>
+              <a:ext uri="{FF2B5EF4-FFF2-40B4-BE49-F238E27FC236}">
+                <a16:creationId xmlns:a16="http://schemas.microsoft.com/office/drawing/2014/main" id="{7C742139-6B31-3A45-AB98-FB2FDEC77E93}"/>
               </a:ext>
             </a:extLst>
           </p:cNvPr>
@@ -11115,8 +11232,8 @@
         </p:blipFill>
         <p:spPr>
           <a:xfrm>
-            <a:off x="2545805" y="2921395"/>
-            <a:ext cx="4991100" cy="431800"/>
+            <a:off x="2775695" y="2844490"/>
+            <a:ext cx="5707858" cy="461665"/>
           </a:xfrm>
           <a:prstGeom prst="rect">
             <a:avLst/>
@@ -11191,13 +11308,8 @@
           <a:p>
             <a:r>
               <a:rPr lang="en-US" sz="2800" b="1" dirty="0"/>
-              <a:t>Improved Learning Model:  EDM-</a:t>
-            </a:r>
-            <a:r>
-              <a:rPr lang="en-US" sz="2800" b="1" dirty="0" err="1"/>
-              <a:t>RoBERTa</a:t>
-            </a:r>
-            <a:endParaRPr lang="en-US" sz="2800" b="1" dirty="0"/>
+              <a:t>Optimization</a:t>
+            </a:r>
           </a:p>
         </p:txBody>
       </p:sp>
@@ -11216,7 +11328,7 @@
         <p:spPr>
           <a:xfrm>
             <a:off x="952373" y="1568534"/>
-            <a:ext cx="6384248" cy="461665"/>
+            <a:ext cx="11102783" cy="830997"/>
           </a:xfrm>
           <a:prstGeom prst="rect">
             <a:avLst/>
@@ -11235,13 +11347,22 @@
             </a:pPr>
             <a:r>
               <a:rPr lang="en-US" sz="2400" dirty="0">
-                <a:latin typeface="Calibri" panose="020F0502020204030204" pitchFamily="34" charset="0"/>
-                <a:cs typeface="Calibri" panose="020F0502020204030204" pitchFamily="34" charset="0"/>
+                <a:latin typeface="Times New Roman" panose="02020603050405020304" pitchFamily="18" charset="0"/>
+                <a:cs typeface="Times New Roman" panose="02020603050405020304" pitchFamily="18" charset="0"/>
               </a:rPr>
-              <a:t>Choose the best-performed model: </a:t>
-            </a:r>
-            <a:r>
-              <a:rPr lang="en-US" sz="2400" b="1" dirty="0" err="1">
+              <a:t>Why using both two-dimensional and multi-dimensional sentiment analysis datasets </a:t>
+            </a:r>
+          </a:p>
+          <a:p>
+            <a:r>
+              <a:rPr lang="en-US" sz="2400" dirty="0">
+                <a:latin typeface="Times New Roman" panose="02020603050405020304" pitchFamily="18" charset="0"/>
+                <a:cs typeface="Times New Roman" panose="02020603050405020304" pitchFamily="18" charset="0"/>
+              </a:rPr>
+              <a:t>      to train EDM-</a:t>
+            </a:r>
+            <a:r>
+              <a:rPr lang="en-US" sz="2400" dirty="0" err="1">
                 <a:latin typeface="Times New Roman" panose="02020603050405020304" pitchFamily="18" charset="0"/>
                 <a:cs typeface="Times New Roman" panose="02020603050405020304" pitchFamily="18" charset="0"/>
               </a:rPr>
@@ -11249,10 +11370,10 @@
             </a:r>
             <a:r>
               <a:rPr lang="en-US" sz="2400" dirty="0">
-                <a:latin typeface="Calibri" panose="020F0502020204030204" pitchFamily="34" charset="0"/>
-                <a:cs typeface="Calibri" panose="020F0502020204030204" pitchFamily="34" charset="0"/>
+                <a:latin typeface="Times New Roman" panose="02020603050405020304" pitchFamily="18" charset="0"/>
+                <a:cs typeface="Times New Roman" panose="02020603050405020304" pitchFamily="18" charset="0"/>
               </a:rPr>
-              <a:t> </a:t>
+              <a:t> ?</a:t>
             </a:r>
           </a:p>
         </p:txBody>
@@ -11271,8 +11392,8 @@
         </p:nvSpPr>
         <p:spPr>
           <a:xfrm>
-            <a:off x="952373" y="2376449"/>
-            <a:ext cx="6661566" cy="461665"/>
+            <a:off x="1629842" y="2644168"/>
+            <a:ext cx="9422471" cy="461665"/>
           </a:xfrm>
           <a:prstGeom prst="rect">
             <a:avLst/>
@@ -11286,29 +11407,15 @@
           <a:lstStyle/>
           <a:p>
             <a:pPr marL="342900" indent="-342900">
-              <a:buFont typeface="Arial" panose="020B0604020202020204" pitchFamily="34" charset="0"/>
-              <a:buChar char="•"/>
+              <a:buFont typeface="Wingdings" pitchFamily="2" charset="2"/>
+              <a:buChar char="§"/>
             </a:pPr>
             <a:r>
               <a:rPr lang="en-US" sz="2400" b="1" dirty="0">
                 <a:latin typeface="Calibri" panose="020F0502020204030204" pitchFamily="34" charset="0"/>
                 <a:cs typeface="Calibri" panose="020F0502020204030204" pitchFamily="34" charset="0"/>
               </a:rPr>
-              <a:t>Optimize the </a:t>
-            </a:r>
-            <a:r>
-              <a:rPr lang="en-US" sz="2400" b="1" dirty="0" err="1">
-                <a:latin typeface="Calibri" panose="020F0502020204030204" pitchFamily="34" charset="0"/>
-                <a:cs typeface="Calibri" panose="020F0502020204030204" pitchFamily="34" charset="0"/>
-              </a:rPr>
-              <a:t>RoBERTa</a:t>
-            </a:r>
-            <a:r>
-              <a:rPr lang="en-US" sz="2400" b="1" dirty="0">
-                <a:latin typeface="Calibri" panose="020F0502020204030204" pitchFamily="34" charset="0"/>
-                <a:cs typeface="Calibri" panose="020F0502020204030204" pitchFamily="34" charset="0"/>
-              </a:rPr>
-              <a:t> model with Boom Layer</a:t>
+              <a:t>Deal with the sentences with sentimental ambiguity</a:t>
             </a:r>
             <a:endParaRPr lang="en-US" sz="2400" dirty="0">
               <a:latin typeface="Calibri" panose="020F0502020204030204" pitchFamily="34" charset="0"/>
@@ -11317,12 +11424,47 @@
           </a:p>
         </p:txBody>
       </p:sp>
+      <p:sp>
+        <p:nvSpPr>
+          <p:cNvPr id="9" name="文字方塊 8">
+            <a:extLst>
+              <a:ext uri="{FF2B5EF4-FFF2-40B4-BE49-F238E27FC236}">
+                <a16:creationId xmlns:a16="http://schemas.microsoft.com/office/drawing/2014/main" id="{AE73553F-4114-411F-A6A1-3291FA4B6CF8}"/>
+              </a:ext>
+            </a:extLst>
+          </p:cNvPr>
+          <p:cNvSpPr txBox="1"/>
+          <p:nvPr/>
+        </p:nvSpPr>
+        <p:spPr>
+          <a:xfrm>
+            <a:off x="11484528" y="6493241"/>
+            <a:ext cx="805343" cy="276999"/>
+          </a:xfrm>
+          <a:prstGeom prst="rect">
+            <a:avLst/>
+          </a:prstGeom>
+          <a:noFill/>
+        </p:spPr>
+        <p:txBody>
+          <a:bodyPr wrap="square" rtlCol="0">
+            <a:spAutoFit/>
+          </a:bodyPr>
+          <a:lstStyle/>
+          <a:p>
+            <a:r>
+              <a:rPr lang="en-US" sz="1200" dirty="0"/>
+              <a:t>11</a:t>
+            </a:r>
+          </a:p>
+        </p:txBody>
+      </p:sp>
       <p:pic>
         <p:nvPicPr>
           <p:cNvPr id="7" name="Picture 6">
             <a:extLst>
               <a:ext uri="{FF2B5EF4-FFF2-40B4-BE49-F238E27FC236}">
-                <a16:creationId xmlns:a16="http://schemas.microsoft.com/office/drawing/2014/main" id="{03DD16DF-6DDD-1440-BEC6-E2C893E34BBD}"/>
+                <a16:creationId xmlns:a16="http://schemas.microsoft.com/office/drawing/2014/main" id="{C93D3C89-0C3D-1D41-9BAC-E72071BBCA8E}"/>
               </a:ext>
             </a:extLst>
           </p:cNvPr>
@@ -11345,102 +11487,18 @@
         </p:blipFill>
         <p:spPr>
           <a:xfrm>
-            <a:off x="9091898" y="138352"/>
-            <a:ext cx="2483877" cy="6690442"/>
+            <a:off x="1377377" y="3634580"/>
+            <a:ext cx="9437245" cy="1623612"/>
           </a:xfrm>
           <a:prstGeom prst="rect">
             <a:avLst/>
           </a:prstGeom>
         </p:spPr>
       </p:pic>
-      <p:sp>
-        <p:nvSpPr>
-          <p:cNvPr id="14" name="TextBox 13">
-            <a:extLst>
-              <a:ext uri="{FF2B5EF4-FFF2-40B4-BE49-F238E27FC236}">
-                <a16:creationId xmlns:a16="http://schemas.microsoft.com/office/drawing/2014/main" id="{8A847973-0319-9B4F-B5CD-4F522B13162B}"/>
-              </a:ext>
-            </a:extLst>
-          </p:cNvPr>
-          <p:cNvSpPr txBox="1"/>
-          <p:nvPr/>
-        </p:nvSpPr>
-        <p:spPr>
-          <a:xfrm>
-            <a:off x="1154104" y="3882972"/>
-            <a:ext cx="8424781" cy="477054"/>
-          </a:xfrm>
-          <a:prstGeom prst="rect">
-            <a:avLst/>
-          </a:prstGeom>
-          <a:noFill/>
-        </p:spPr>
-        <p:txBody>
-          <a:bodyPr wrap="square" rtlCol="0">
-            <a:spAutoFit/>
-          </a:bodyPr>
-          <a:lstStyle/>
-          <a:p>
-            <a:r>
-              <a:rPr lang="en-US" sz="2500" b="1" dirty="0">
-                <a:latin typeface="Times New Roman" panose="02020603050405020304" pitchFamily="18" charset="0"/>
-                <a:cs typeface="Times New Roman" panose="02020603050405020304" pitchFamily="18" charset="0"/>
-              </a:rPr>
-              <a:t>Enhancing the Dependency Mechanism of </a:t>
-            </a:r>
-            <a:r>
-              <a:rPr lang="en-US" sz="2500" b="1" dirty="0" err="1">
-                <a:latin typeface="Times New Roman" panose="02020603050405020304" pitchFamily="18" charset="0"/>
-                <a:cs typeface="Times New Roman" panose="02020603050405020304" pitchFamily="18" charset="0"/>
-              </a:rPr>
-              <a:t>RoBERTa</a:t>
-            </a:r>
-            <a:endParaRPr lang="en-US" sz="2500" dirty="0">
-              <a:latin typeface="Times New Roman" panose="02020603050405020304" pitchFamily="18" charset="0"/>
-              <a:cs typeface="Times New Roman" panose="02020603050405020304" pitchFamily="18" charset="0"/>
-            </a:endParaRPr>
-          </a:p>
-        </p:txBody>
-      </p:sp>
-      <p:sp>
-        <p:nvSpPr>
-          <p:cNvPr id="8" name="文字方塊 7">
-            <a:extLst>
-              <a:ext uri="{FF2B5EF4-FFF2-40B4-BE49-F238E27FC236}">
-                <a16:creationId xmlns:a16="http://schemas.microsoft.com/office/drawing/2014/main" id="{CA9DE776-E94C-47BA-B7C4-BC7427DC5373}"/>
-              </a:ext>
-            </a:extLst>
-          </p:cNvPr>
-          <p:cNvSpPr txBox="1"/>
-          <p:nvPr/>
-        </p:nvSpPr>
-        <p:spPr>
-          <a:xfrm>
-            <a:off x="11484528" y="6493241"/>
-            <a:ext cx="805343" cy="276999"/>
-          </a:xfrm>
-          <a:prstGeom prst="rect">
-            <a:avLst/>
-          </a:prstGeom>
-          <a:noFill/>
-        </p:spPr>
-        <p:txBody>
-          <a:bodyPr wrap="square" rtlCol="0">
-            <a:spAutoFit/>
-          </a:bodyPr>
-          <a:lstStyle/>
-          <a:p>
-            <a:r>
-              <a:rPr lang="en-US" sz="1200" dirty="0"/>
-              <a:t>12</a:t>
-            </a:r>
-          </a:p>
-        </p:txBody>
-      </p:sp>
     </p:spTree>
     <p:extLst>
       <p:ext uri="{BB962C8B-B14F-4D97-AF65-F5344CB8AC3E}">
-        <p14:creationId xmlns:p14="http://schemas.microsoft.com/office/powerpoint/2010/main" val="2301789250"/>
+        <p14:creationId xmlns:p14="http://schemas.microsoft.com/office/powerpoint/2010/main" val="3234856110"/>
       </p:ext>
     </p:extLst>
   </p:cSld>
@@ -11505,8 +11563,129 @@
           <a:p>
             <a:r>
               <a:rPr lang="en-US" sz="2800" b="1" dirty="0"/>
-              <a:t>Optimization: Statistics</a:t>
-            </a:r>
+              <a:t>Improved Learning Model:  EDM-</a:t>
+            </a:r>
+            <a:r>
+              <a:rPr lang="en-US" sz="2800" b="1" dirty="0" err="1"/>
+              <a:t>RoBERTa</a:t>
+            </a:r>
+            <a:endParaRPr lang="en-US" sz="2800" b="1" dirty="0"/>
+          </a:p>
+        </p:txBody>
+      </p:sp>
+      <p:sp>
+        <p:nvSpPr>
+          <p:cNvPr id="5" name="TextBox 4">
+            <a:extLst>
+              <a:ext uri="{FF2B5EF4-FFF2-40B4-BE49-F238E27FC236}">
+                <a16:creationId xmlns:a16="http://schemas.microsoft.com/office/drawing/2014/main" id="{0F0A5022-A9F2-4143-B927-A449071B04E6}"/>
+              </a:ext>
+            </a:extLst>
+          </p:cNvPr>
+          <p:cNvSpPr txBox="1"/>
+          <p:nvPr/>
+        </p:nvSpPr>
+        <p:spPr>
+          <a:xfrm>
+            <a:off x="952373" y="1568534"/>
+            <a:ext cx="6384248" cy="461665"/>
+          </a:xfrm>
+          <a:prstGeom prst="rect">
+            <a:avLst/>
+          </a:prstGeom>
+          <a:noFill/>
+        </p:spPr>
+        <p:txBody>
+          <a:bodyPr wrap="none" rtlCol="0">
+            <a:spAutoFit/>
+          </a:bodyPr>
+          <a:lstStyle/>
+          <a:p>
+            <a:pPr marL="342900" indent="-342900">
+              <a:buFont typeface="Arial" panose="020B0604020202020204" pitchFamily="34" charset="0"/>
+              <a:buChar char="•"/>
+            </a:pPr>
+            <a:r>
+              <a:rPr lang="en-US" sz="2400" dirty="0">
+                <a:latin typeface="Calibri" panose="020F0502020204030204" pitchFamily="34" charset="0"/>
+                <a:cs typeface="Calibri" panose="020F0502020204030204" pitchFamily="34" charset="0"/>
+              </a:rPr>
+              <a:t>Choose the best-performed model: </a:t>
+            </a:r>
+            <a:r>
+              <a:rPr lang="en-US" sz="2400" b="1" dirty="0" err="1">
+                <a:latin typeface="Times New Roman" panose="02020603050405020304" pitchFamily="18" charset="0"/>
+                <a:cs typeface="Times New Roman" panose="02020603050405020304" pitchFamily="18" charset="0"/>
+              </a:rPr>
+              <a:t>RoBERTa</a:t>
+            </a:r>
+            <a:r>
+              <a:rPr lang="en-US" sz="2400" dirty="0">
+                <a:latin typeface="Calibri" panose="020F0502020204030204" pitchFamily="34" charset="0"/>
+                <a:cs typeface="Calibri" panose="020F0502020204030204" pitchFamily="34" charset="0"/>
+              </a:rPr>
+              <a:t> </a:t>
+            </a:r>
+          </a:p>
+        </p:txBody>
+      </p:sp>
+      <p:sp>
+        <p:nvSpPr>
+          <p:cNvPr id="6" name="TextBox 5">
+            <a:extLst>
+              <a:ext uri="{FF2B5EF4-FFF2-40B4-BE49-F238E27FC236}">
+                <a16:creationId xmlns:a16="http://schemas.microsoft.com/office/drawing/2014/main" id="{F0562E0E-EEBC-9146-9A8A-71CE457A66D7}"/>
+              </a:ext>
+            </a:extLst>
+          </p:cNvPr>
+          <p:cNvSpPr txBox="1"/>
+          <p:nvPr/>
+        </p:nvSpPr>
+        <p:spPr>
+          <a:xfrm>
+            <a:off x="952373" y="2376449"/>
+            <a:ext cx="6661566" cy="461665"/>
+          </a:xfrm>
+          <a:prstGeom prst="rect">
+            <a:avLst/>
+          </a:prstGeom>
+          <a:noFill/>
+        </p:spPr>
+        <p:txBody>
+          <a:bodyPr wrap="square" rtlCol="0">
+            <a:spAutoFit/>
+          </a:bodyPr>
+          <a:lstStyle/>
+          <a:p>
+            <a:pPr marL="342900" indent="-342900">
+              <a:buFont typeface="Arial" panose="020B0604020202020204" pitchFamily="34" charset="0"/>
+              <a:buChar char="•"/>
+            </a:pPr>
+            <a:r>
+              <a:rPr lang="en-US" sz="2400" b="1" dirty="0">
+                <a:latin typeface="Calibri" panose="020F0502020204030204" pitchFamily="34" charset="0"/>
+                <a:cs typeface="Calibri" panose="020F0502020204030204" pitchFamily="34" charset="0"/>
+              </a:rPr>
+              <a:t>Optimize the </a:t>
+            </a:r>
+            <a:r>
+              <a:rPr lang="en-US" sz="2400" b="1" dirty="0" err="1">
+                <a:latin typeface="Calibri" panose="020F0502020204030204" pitchFamily="34" charset="0"/>
+                <a:cs typeface="Calibri" panose="020F0502020204030204" pitchFamily="34" charset="0"/>
+              </a:rPr>
+              <a:t>RoBERTa</a:t>
+            </a:r>
+            <a:r>
+              <a:rPr lang="en-US" sz="2400" b="1" dirty="0">
+                <a:latin typeface="Calibri" panose="020F0502020204030204" pitchFamily="34" charset="0"/>
+                <a:cs typeface="Calibri" panose="020F0502020204030204" pitchFamily="34" charset="0"/>
+              </a:rPr>
+              <a:t> model with Boom Layer</a:t>
+            </a:r>
+            <a:endParaRPr lang="en-US" sz="2400" dirty="0">
+              <a:latin typeface="Calibri" panose="020F0502020204030204" pitchFamily="34" charset="0"/>
+              <a:cs typeface="Calibri" panose="020F0502020204030204" pitchFamily="34" charset="0"/>
+            </a:endParaRPr>
           </a:p>
         </p:txBody>
       </p:sp>
@@ -11515,7 +11694,7 @@
           <p:cNvPr id="7" name="Picture 6">
             <a:extLst>
               <a:ext uri="{FF2B5EF4-FFF2-40B4-BE49-F238E27FC236}">
-                <a16:creationId xmlns:a16="http://schemas.microsoft.com/office/drawing/2014/main" id="{3EA49A00-B665-BB4E-8414-F14A25C37FAF}"/>
+                <a16:creationId xmlns:a16="http://schemas.microsoft.com/office/drawing/2014/main" id="{03DD16DF-6DDD-1440-BEC6-E2C893E34BBD}"/>
               </a:ext>
             </a:extLst>
           </p:cNvPr>
@@ -11538,56 +11717,20 @@
         </p:blipFill>
         <p:spPr>
           <a:xfrm>
-            <a:off x="817123" y="1479649"/>
-            <a:ext cx="8716836" cy="2237989"/>
+            <a:off x="8858536" y="28820"/>
+            <a:ext cx="2516459" cy="6778202"/>
           </a:xfrm>
           <a:prstGeom prst="rect">
             <a:avLst/>
           </a:prstGeom>
         </p:spPr>
       </p:pic>
-      <p:pic>
-        <p:nvPicPr>
-          <p:cNvPr id="9" name="Picture 8">
-            <a:extLst>
-              <a:ext uri="{FF2B5EF4-FFF2-40B4-BE49-F238E27FC236}">
-                <a16:creationId xmlns:a16="http://schemas.microsoft.com/office/drawing/2014/main" id="{039B4765-42F5-9541-BC34-8ACF710B3366}"/>
-              </a:ext>
-            </a:extLst>
-          </p:cNvPr>
-          <p:cNvPicPr>
-            <a:picLocks noChangeAspect="1"/>
-          </p:cNvPicPr>
-          <p:nvPr/>
-        </p:nvPicPr>
-        <p:blipFill>
-          <a:blip r:embed="rId4">
-            <a:extLst>
-              <a:ext uri="{28A0092B-C50C-407E-A947-70E740481C1C}">
-                <a14:useLocalDpi xmlns:a14="http://schemas.microsoft.com/office/drawing/2010/main" val="0"/>
-              </a:ext>
-            </a:extLst>
-          </a:blip>
-          <a:stretch>
-            <a:fillRect/>
-          </a:stretch>
-        </p:blipFill>
-        <p:spPr>
-          <a:xfrm>
-            <a:off x="2869660" y="4330567"/>
-            <a:ext cx="9015380" cy="2237989"/>
-          </a:xfrm>
-          <a:prstGeom prst="rect">
-            <a:avLst/>
-          </a:prstGeom>
-        </p:spPr>
-      </p:pic>
-      <p:sp>
-        <p:nvSpPr>
-          <p:cNvPr id="5" name="文字方塊 4">
-            <a:extLst>
-              <a:ext uri="{FF2B5EF4-FFF2-40B4-BE49-F238E27FC236}">
-                <a16:creationId xmlns:a16="http://schemas.microsoft.com/office/drawing/2014/main" id="{41506C6F-93EE-49C5-88F9-1B83EB3738F0}"/>
+      <p:sp>
+        <p:nvSpPr>
+          <p:cNvPr id="14" name="TextBox 13">
+            <a:extLst>
+              <a:ext uri="{FF2B5EF4-FFF2-40B4-BE49-F238E27FC236}">
+                <a16:creationId xmlns:a16="http://schemas.microsoft.com/office/drawing/2014/main" id="{8A847973-0319-9B4F-B5CD-4F522B13162B}"/>
               </a:ext>
             </a:extLst>
           </p:cNvPr>
@@ -11596,8 +11739,8 @@
         </p:nvSpPr>
         <p:spPr>
           <a:xfrm>
-            <a:off x="11484528" y="6493241"/>
-            <a:ext cx="805343" cy="276999"/>
+            <a:off x="1154104" y="3882972"/>
+            <a:ext cx="8424781" cy="477054"/>
           </a:xfrm>
           <a:prstGeom prst="rect">
             <a:avLst/>
@@ -11611,8 +11754,57 @@
           <a:lstStyle/>
           <a:p>
             <a:r>
+              <a:rPr lang="en-US" sz="2500" b="1" dirty="0">
+                <a:latin typeface="Times New Roman" panose="02020603050405020304" pitchFamily="18" charset="0"/>
+                <a:cs typeface="Times New Roman" panose="02020603050405020304" pitchFamily="18" charset="0"/>
+              </a:rPr>
+              <a:t>Enhancing the Dependency Mechanism of </a:t>
+            </a:r>
+            <a:r>
+              <a:rPr lang="en-US" sz="2500" b="1" dirty="0" err="1">
+                <a:latin typeface="Times New Roman" panose="02020603050405020304" pitchFamily="18" charset="0"/>
+                <a:cs typeface="Times New Roman" panose="02020603050405020304" pitchFamily="18" charset="0"/>
+              </a:rPr>
+              <a:t>RoBERTa</a:t>
+            </a:r>
+            <a:endParaRPr lang="en-US" sz="2500" dirty="0">
+              <a:latin typeface="Times New Roman" panose="02020603050405020304" pitchFamily="18" charset="0"/>
+              <a:cs typeface="Times New Roman" panose="02020603050405020304" pitchFamily="18" charset="0"/>
+            </a:endParaRPr>
+          </a:p>
+        </p:txBody>
+      </p:sp>
+      <p:sp>
+        <p:nvSpPr>
+          <p:cNvPr id="8" name="文字方塊 7">
+            <a:extLst>
+              <a:ext uri="{FF2B5EF4-FFF2-40B4-BE49-F238E27FC236}">
+                <a16:creationId xmlns:a16="http://schemas.microsoft.com/office/drawing/2014/main" id="{CA9DE776-E94C-47BA-B7C4-BC7427DC5373}"/>
+              </a:ext>
+            </a:extLst>
+          </p:cNvPr>
+          <p:cNvSpPr txBox="1"/>
+          <p:nvPr/>
+        </p:nvSpPr>
+        <p:spPr>
+          <a:xfrm>
+            <a:off x="11484528" y="6493241"/>
+            <a:ext cx="805343" cy="276999"/>
+          </a:xfrm>
+          <a:prstGeom prst="rect">
+            <a:avLst/>
+          </a:prstGeom>
+          <a:noFill/>
+        </p:spPr>
+        <p:txBody>
+          <a:bodyPr wrap="square" rtlCol="0">
+            <a:spAutoFit/>
+          </a:bodyPr>
+          <a:lstStyle/>
+          <a:p>
+            <a:r>
               <a:rPr lang="en-US" sz="1200" dirty="0"/>
-              <a:t>13</a:t>
+              <a:t>12</a:t>
             </a:r>
           </a:p>
         </p:txBody>
@@ -11620,7 +11812,7 @@
     </p:spTree>
     <p:extLst>
       <p:ext uri="{BB962C8B-B14F-4D97-AF65-F5344CB8AC3E}">
-        <p14:creationId xmlns:p14="http://schemas.microsoft.com/office/powerpoint/2010/main" val="1987724706"/>
+        <p14:creationId xmlns:p14="http://schemas.microsoft.com/office/powerpoint/2010/main" val="2301789250"/>
       </p:ext>
     </p:extLst>
   </p:cSld>
@@ -11670,7 +11862,7 @@
         <p:spPr>
           <a:xfrm>
             <a:off x="616225" y="569844"/>
-            <a:ext cx="11008328" cy="523220"/>
+            <a:ext cx="9500541" cy="523220"/>
           </a:xfrm>
           <a:prstGeom prst="rect">
             <a:avLst/>
@@ -11685,30 +11877,17 @@
           <a:p>
             <a:r>
               <a:rPr lang="en-US" sz="2800" b="1" dirty="0"/>
-              <a:t>EDM-</a:t>
-            </a:r>
-            <a:r>
-              <a:rPr lang="en-US" sz="2800" b="1" dirty="0" err="1"/>
-              <a:t>RoBERTa</a:t>
-            </a:r>
-            <a:r>
-              <a:rPr lang="en-US" sz="2800" b="1" dirty="0"/>
-              <a:t>: Enhancing the Dependency Structure of </a:t>
-            </a:r>
-            <a:r>
-              <a:rPr lang="en-US" sz="2800" b="1" dirty="0" err="1"/>
-              <a:t>RoBERTa</a:t>
-            </a:r>
-            <a:endParaRPr lang="en-US" sz="2800" b="1" dirty="0"/>
+              <a:t>Optimization: Statistics</a:t>
+            </a:r>
           </a:p>
         </p:txBody>
       </p:sp>
       <p:pic>
         <p:nvPicPr>
-          <p:cNvPr id="4" name="Picture 3">
-            <a:extLst>
-              <a:ext uri="{FF2B5EF4-FFF2-40B4-BE49-F238E27FC236}">
-                <a16:creationId xmlns:a16="http://schemas.microsoft.com/office/drawing/2014/main" id="{01A05A17-4134-CB42-BA18-D7A967D0F2DB}"/>
+          <p:cNvPr id="7" name="Picture 6">
+            <a:extLst>
+              <a:ext uri="{FF2B5EF4-FFF2-40B4-BE49-F238E27FC236}">
+                <a16:creationId xmlns:a16="http://schemas.microsoft.com/office/drawing/2014/main" id="{3EA49A00-B665-BB4E-8414-F14A25C37FAF}"/>
               </a:ext>
             </a:extLst>
           </p:cNvPr>
@@ -11731,20 +11910,56 @@
         </p:blipFill>
         <p:spPr>
           <a:xfrm>
-            <a:off x="1589975" y="2907884"/>
-            <a:ext cx="9012050" cy="1757124"/>
+            <a:off x="817123" y="1479649"/>
+            <a:ext cx="8716836" cy="2237989"/>
           </a:xfrm>
           <a:prstGeom prst="rect">
             <a:avLst/>
           </a:prstGeom>
         </p:spPr>
       </p:pic>
-      <p:sp>
-        <p:nvSpPr>
-          <p:cNvPr id="5" name="TextBox 4">
-            <a:extLst>
-              <a:ext uri="{FF2B5EF4-FFF2-40B4-BE49-F238E27FC236}">
-                <a16:creationId xmlns:a16="http://schemas.microsoft.com/office/drawing/2014/main" id="{7143B78D-B6B3-474D-B531-66EC4DED1CA1}"/>
+      <p:pic>
+        <p:nvPicPr>
+          <p:cNvPr id="9" name="Picture 8">
+            <a:extLst>
+              <a:ext uri="{FF2B5EF4-FFF2-40B4-BE49-F238E27FC236}">
+                <a16:creationId xmlns:a16="http://schemas.microsoft.com/office/drawing/2014/main" id="{039B4765-42F5-9541-BC34-8ACF710B3366}"/>
+              </a:ext>
+            </a:extLst>
+          </p:cNvPr>
+          <p:cNvPicPr>
+            <a:picLocks noChangeAspect="1"/>
+          </p:cNvPicPr>
+          <p:nvPr/>
+        </p:nvPicPr>
+        <p:blipFill>
+          <a:blip r:embed="rId4">
+            <a:extLst>
+              <a:ext uri="{28A0092B-C50C-407E-A947-70E740481C1C}">
+                <a14:useLocalDpi xmlns:a14="http://schemas.microsoft.com/office/drawing/2010/main" val="0"/>
+              </a:ext>
+            </a:extLst>
+          </a:blip>
+          <a:stretch>
+            <a:fillRect/>
+          </a:stretch>
+        </p:blipFill>
+        <p:spPr>
+          <a:xfrm>
+            <a:off x="2869660" y="4330567"/>
+            <a:ext cx="9015380" cy="2237989"/>
+          </a:xfrm>
+          <a:prstGeom prst="rect">
+            <a:avLst/>
+          </a:prstGeom>
+        </p:spPr>
+      </p:pic>
+      <p:sp>
+        <p:nvSpPr>
+          <p:cNvPr id="5" name="文字方塊 4">
+            <a:extLst>
+              <a:ext uri="{FF2B5EF4-FFF2-40B4-BE49-F238E27FC236}">
+                <a16:creationId xmlns:a16="http://schemas.microsoft.com/office/drawing/2014/main" id="{41506C6F-93EE-49C5-88F9-1B83EB3738F0}"/>
               </a:ext>
             </a:extLst>
           </p:cNvPr>
@@ -11753,8 +11968,8 @@
         </p:nvSpPr>
         <p:spPr>
           <a:xfrm>
-            <a:off x="1322962" y="1780162"/>
-            <a:ext cx="5985293" cy="477054"/>
+            <a:off x="11484528" y="6493241"/>
+            <a:ext cx="805343" cy="276999"/>
           </a:xfrm>
           <a:prstGeom prst="rect">
             <a:avLst/>
@@ -11762,50 +11977,6 @@
           <a:noFill/>
         </p:spPr>
         <p:txBody>
-          <a:bodyPr wrap="none" rtlCol="0">
-            <a:spAutoFit/>
-          </a:bodyPr>
-          <a:lstStyle/>
-          <a:p>
-            <a:pPr marL="342900" indent="-342900">
-              <a:buFont typeface="Arial" panose="020B0604020202020204" pitchFamily="34" charset="0"/>
-              <a:buChar char="•"/>
-            </a:pPr>
-            <a:r>
-              <a:rPr lang="en-US" sz="2500" b="1" dirty="0"/>
-              <a:t>Detailed parameters of EDM-</a:t>
-            </a:r>
-            <a:r>
-              <a:rPr lang="en-US" sz="2500" b="1" dirty="0" err="1"/>
-              <a:t>RoBERTa</a:t>
-            </a:r>
-            <a:endParaRPr lang="en-US" sz="2500" b="1" dirty="0"/>
-          </a:p>
-        </p:txBody>
-      </p:sp>
-      <p:sp>
-        <p:nvSpPr>
-          <p:cNvPr id="6" name="文字方塊 5">
-            <a:extLst>
-              <a:ext uri="{FF2B5EF4-FFF2-40B4-BE49-F238E27FC236}">
-                <a16:creationId xmlns:a16="http://schemas.microsoft.com/office/drawing/2014/main" id="{F1369C88-80E7-407E-80FA-2D871FE3345B}"/>
-              </a:ext>
-            </a:extLst>
-          </p:cNvPr>
-          <p:cNvSpPr txBox="1"/>
-          <p:nvPr/>
-        </p:nvSpPr>
-        <p:spPr>
-          <a:xfrm>
-            <a:off x="11484528" y="6493241"/>
-            <a:ext cx="805343" cy="276999"/>
-          </a:xfrm>
-          <a:prstGeom prst="rect">
-            <a:avLst/>
-          </a:prstGeom>
-          <a:noFill/>
-        </p:spPr>
-        <p:txBody>
           <a:bodyPr wrap="square" rtlCol="0">
             <a:spAutoFit/>
           </a:bodyPr>
@@ -11813,7 +11984,7 @@
           <a:p>
             <a:r>
               <a:rPr lang="en-US" sz="1200" dirty="0"/>
-              <a:t>14</a:t>
+              <a:t>13</a:t>
             </a:r>
           </a:p>
         </p:txBody>
@@ -11821,7 +11992,7 @@
     </p:spTree>
     <p:extLst>
       <p:ext uri="{BB962C8B-B14F-4D97-AF65-F5344CB8AC3E}">
-        <p14:creationId xmlns:p14="http://schemas.microsoft.com/office/powerpoint/2010/main" val="266460702"/>
+        <p14:creationId xmlns:p14="http://schemas.microsoft.com/office/powerpoint/2010/main" val="1987724706"/>
       </p:ext>
     </p:extLst>
   </p:cSld>
@@ -11886,8 +12057,21 @@
           <a:p>
             <a:r>
               <a:rPr lang="en-US" sz="2800" b="1" dirty="0"/>
-              <a:t>Runtimes &amp; Environments</a:t>
-            </a:r>
+              <a:t>EDM-</a:t>
+            </a:r>
+            <a:r>
+              <a:rPr lang="en-US" sz="2800" b="1" dirty="0" err="1"/>
+              <a:t>RoBERTa</a:t>
+            </a:r>
+            <a:r>
+              <a:rPr lang="en-US" sz="2800" b="1" dirty="0"/>
+              <a:t>: Enhancing the Dependency Structure of </a:t>
+            </a:r>
+            <a:r>
+              <a:rPr lang="en-US" sz="2800" b="1" dirty="0" err="1"/>
+              <a:t>RoBERTa</a:t>
+            </a:r>
+            <a:endParaRPr lang="en-US" sz="2800" b="1" dirty="0"/>
           </a:p>
         </p:txBody>
       </p:sp>
@@ -11896,7 +12080,7 @@
           <p:cNvPr id="4" name="Picture 3">
             <a:extLst>
               <a:ext uri="{FF2B5EF4-FFF2-40B4-BE49-F238E27FC236}">
-                <a16:creationId xmlns:a16="http://schemas.microsoft.com/office/drawing/2014/main" id="{C4D9BF90-F101-B548-82AE-FAC79A08ABF4}"/>
+                <a16:creationId xmlns:a16="http://schemas.microsoft.com/office/drawing/2014/main" id="{01A05A17-4134-CB42-BA18-D7A967D0F2DB}"/>
               </a:ext>
             </a:extLst>
           </p:cNvPr>
@@ -11919,8 +12103,8 @@
         </p:blipFill>
         <p:spPr>
           <a:xfrm>
-            <a:off x="1065604" y="1549929"/>
-            <a:ext cx="10287472" cy="3824275"/>
+            <a:off x="1589975" y="2907884"/>
+            <a:ext cx="9012050" cy="1757124"/>
           </a:xfrm>
           <a:prstGeom prst="rect">
             <a:avLst/>
@@ -11929,10 +12113,10 @@
       </p:pic>
       <p:sp>
         <p:nvSpPr>
-          <p:cNvPr id="5" name="文字方塊 4">
-            <a:extLst>
-              <a:ext uri="{FF2B5EF4-FFF2-40B4-BE49-F238E27FC236}">
-                <a16:creationId xmlns:a16="http://schemas.microsoft.com/office/drawing/2014/main" id="{181B9430-086A-4BD7-9B44-D493315FC3AE}"/>
+          <p:cNvPr id="5" name="TextBox 4">
+            <a:extLst>
+              <a:ext uri="{FF2B5EF4-FFF2-40B4-BE49-F238E27FC236}">
+                <a16:creationId xmlns:a16="http://schemas.microsoft.com/office/drawing/2014/main" id="{7143B78D-B6B3-474D-B531-66EC4DED1CA1}"/>
               </a:ext>
             </a:extLst>
           </p:cNvPr>
@@ -11941,8 +12125,8 @@
         </p:nvSpPr>
         <p:spPr>
           <a:xfrm>
-            <a:off x="11484528" y="6493241"/>
-            <a:ext cx="805343" cy="276999"/>
+            <a:off x="1322962" y="1780162"/>
+            <a:ext cx="5985293" cy="477054"/>
           </a:xfrm>
           <a:prstGeom prst="rect">
             <a:avLst/>
@@ -11950,6 +12134,50 @@
           <a:noFill/>
         </p:spPr>
         <p:txBody>
+          <a:bodyPr wrap="none" rtlCol="0">
+            <a:spAutoFit/>
+          </a:bodyPr>
+          <a:lstStyle/>
+          <a:p>
+            <a:pPr marL="342900" indent="-342900">
+              <a:buFont typeface="Arial" panose="020B0604020202020204" pitchFamily="34" charset="0"/>
+              <a:buChar char="•"/>
+            </a:pPr>
+            <a:r>
+              <a:rPr lang="en-US" sz="2500" b="1" dirty="0"/>
+              <a:t>Detailed parameters of EDM-</a:t>
+            </a:r>
+            <a:r>
+              <a:rPr lang="en-US" sz="2500" b="1" dirty="0" err="1"/>
+              <a:t>RoBERTa</a:t>
+            </a:r>
+            <a:endParaRPr lang="en-US" sz="2500" b="1" dirty="0"/>
+          </a:p>
+        </p:txBody>
+      </p:sp>
+      <p:sp>
+        <p:nvSpPr>
+          <p:cNvPr id="6" name="文字方塊 5">
+            <a:extLst>
+              <a:ext uri="{FF2B5EF4-FFF2-40B4-BE49-F238E27FC236}">
+                <a16:creationId xmlns:a16="http://schemas.microsoft.com/office/drawing/2014/main" id="{F1369C88-80E7-407E-80FA-2D871FE3345B}"/>
+              </a:ext>
+            </a:extLst>
+          </p:cNvPr>
+          <p:cNvSpPr txBox="1"/>
+          <p:nvPr/>
+        </p:nvSpPr>
+        <p:spPr>
+          <a:xfrm>
+            <a:off x="11484528" y="6493241"/>
+            <a:ext cx="805343" cy="276999"/>
+          </a:xfrm>
+          <a:prstGeom prst="rect">
+            <a:avLst/>
+          </a:prstGeom>
+          <a:noFill/>
+        </p:spPr>
+        <p:txBody>
           <a:bodyPr wrap="square" rtlCol="0">
             <a:spAutoFit/>
           </a:bodyPr>
@@ -11957,7 +12185,7 @@
           <a:p>
             <a:r>
               <a:rPr lang="en-US" sz="1200" dirty="0"/>
-              <a:t>15</a:t>
+              <a:t>14</a:t>
             </a:r>
           </a:p>
         </p:txBody>
@@ -11965,7 +12193,7 @@
     </p:spTree>
     <p:extLst>
       <p:ext uri="{BB962C8B-B14F-4D97-AF65-F5344CB8AC3E}">
-        <p14:creationId xmlns:p14="http://schemas.microsoft.com/office/powerpoint/2010/main" val="1320879586"/>
+        <p14:creationId xmlns:p14="http://schemas.microsoft.com/office/powerpoint/2010/main" val="266460702"/>
       </p:ext>
     </p:extLst>
   </p:cSld>
@@ -12218,17 +12446,53 @@
           <a:p>
             <a:r>
               <a:rPr lang="en-US" sz="2800" b="1" dirty="0"/>
-              <a:t>Conclusions</a:t>
-            </a:r>
-          </a:p>
-        </p:txBody>
-      </p:sp>
-      <p:sp>
-        <p:nvSpPr>
-          <p:cNvPr id="3" name="文字方塊 2">
-            <a:extLst>
-              <a:ext uri="{FF2B5EF4-FFF2-40B4-BE49-F238E27FC236}">
-                <a16:creationId xmlns:a16="http://schemas.microsoft.com/office/drawing/2014/main" id="{F40C8BBC-9339-4C5C-A66C-50E9ED01322F}"/>
+              <a:t>Runtimes &amp; Environments</a:t>
+            </a:r>
+          </a:p>
+        </p:txBody>
+      </p:sp>
+      <p:pic>
+        <p:nvPicPr>
+          <p:cNvPr id="4" name="Picture 3">
+            <a:extLst>
+              <a:ext uri="{FF2B5EF4-FFF2-40B4-BE49-F238E27FC236}">
+                <a16:creationId xmlns:a16="http://schemas.microsoft.com/office/drawing/2014/main" id="{C4D9BF90-F101-B548-82AE-FAC79A08ABF4}"/>
+              </a:ext>
+            </a:extLst>
+          </p:cNvPr>
+          <p:cNvPicPr>
+            <a:picLocks noChangeAspect="1"/>
+          </p:cNvPicPr>
+          <p:nvPr/>
+        </p:nvPicPr>
+        <p:blipFill>
+          <a:blip r:embed="rId3">
+            <a:extLst>
+              <a:ext uri="{28A0092B-C50C-407E-A947-70E740481C1C}">
+                <a14:useLocalDpi xmlns:a14="http://schemas.microsoft.com/office/drawing/2010/main" val="0"/>
+              </a:ext>
+            </a:extLst>
+          </a:blip>
+          <a:stretch>
+            <a:fillRect/>
+          </a:stretch>
+        </p:blipFill>
+        <p:spPr>
+          <a:xfrm>
+            <a:off x="927457" y="1581734"/>
+            <a:ext cx="10888735" cy="4047789"/>
+          </a:xfrm>
+          <a:prstGeom prst="rect">
+            <a:avLst/>
+          </a:prstGeom>
+        </p:spPr>
+      </p:pic>
+      <p:sp>
+        <p:nvSpPr>
+          <p:cNvPr id="5" name="文字方塊 4">
+            <a:extLst>
+              <a:ext uri="{FF2B5EF4-FFF2-40B4-BE49-F238E27FC236}">
+                <a16:creationId xmlns:a16="http://schemas.microsoft.com/office/drawing/2014/main" id="{181B9430-086A-4BD7-9B44-D493315FC3AE}"/>
               </a:ext>
             </a:extLst>
           </p:cNvPr>
@@ -12237,8 +12501,8 @@
         </p:nvSpPr>
         <p:spPr>
           <a:xfrm>
-            <a:off x="985534" y="1650581"/>
-            <a:ext cx="8310608" cy="430887"/>
+            <a:off x="11484528" y="6493241"/>
+            <a:ext cx="805343" cy="276999"/>
           </a:xfrm>
           <a:prstGeom prst="rect">
             <a:avLst/>
@@ -12246,41 +12510,62 @@
           <a:noFill/>
         </p:spPr>
         <p:txBody>
-          <a:bodyPr wrap="none" rtlCol="0">
+          <a:bodyPr wrap="square" rtlCol="0">
             <a:spAutoFit/>
           </a:bodyPr>
           <a:lstStyle/>
           <a:p>
             <a:r>
-              <a:rPr lang="en-US" sz="2200" dirty="0">
-                <a:latin typeface="Calibri" panose="020F0502020204030204" pitchFamily="34" charset="0"/>
-                <a:cs typeface="Calibri" panose="020F0502020204030204" pitchFamily="34" charset="0"/>
-              </a:rPr>
-              <a:t>We introduced a language representation model called EDM-</a:t>
-            </a:r>
-            <a:r>
-              <a:rPr lang="en-US" sz="2200" dirty="0" err="1">
-                <a:latin typeface="Calibri" panose="020F0502020204030204" pitchFamily="34" charset="0"/>
-                <a:cs typeface="Calibri" panose="020F0502020204030204" pitchFamily="34" charset="0"/>
-              </a:rPr>
-              <a:t>RoBERTa</a:t>
-            </a:r>
-            <a:r>
-              <a:rPr lang="en-US" sz="2200" dirty="0">
-                <a:latin typeface="Calibri" panose="020F0502020204030204" pitchFamily="34" charset="0"/>
-                <a:cs typeface="Calibri" panose="020F0502020204030204" pitchFamily="34" charset="0"/>
-              </a:rPr>
-              <a:t>.</a:t>
-            </a:r>
-          </a:p>
-        </p:txBody>
-      </p:sp>
-      <p:sp>
-        <p:nvSpPr>
-          <p:cNvPr id="4" name="文字方塊 3">
-            <a:extLst>
-              <a:ext uri="{FF2B5EF4-FFF2-40B4-BE49-F238E27FC236}">
-                <a16:creationId xmlns:a16="http://schemas.microsoft.com/office/drawing/2014/main" id="{535C972E-20D5-4DCB-AFBB-E1252A03BA81}"/>
+              <a:rPr lang="en-US" sz="1200" dirty="0"/>
+              <a:t>15</a:t>
+            </a:r>
+          </a:p>
+        </p:txBody>
+      </p:sp>
+    </p:spTree>
+    <p:extLst>
+      <p:ext uri="{BB962C8B-B14F-4D97-AF65-F5344CB8AC3E}">
+        <p14:creationId xmlns:p14="http://schemas.microsoft.com/office/powerpoint/2010/main" val="1320879586"/>
+      </p:ext>
+    </p:extLst>
+  </p:cSld>
+  <p:clrMapOvr>
+    <a:masterClrMapping/>
+  </p:clrMapOvr>
+</p:sld>
+</file>
+
+<file path=ppt/slides/slide21.xml><?xml version="1.0" encoding="utf-8"?>
+<p:sld xmlns:a="http://schemas.openxmlformats.org/drawingml/2006/main" xmlns:r="http://schemas.openxmlformats.org/officeDocument/2006/relationships" xmlns:p="http://schemas.openxmlformats.org/presentationml/2006/main">
+  <p:cSld>
+    <p:bg>
+      <p:bgPr>
+        <a:solidFill>
+          <a:schemeClr val="bg1"/>
+        </a:solidFill>
+        <a:effectLst/>
+      </p:bgPr>
+    </p:bg>
+    <p:spTree>
+      <p:nvGrpSpPr>
+        <p:cNvPr id="1" name=""/>
+        <p:cNvGrpSpPr/>
+        <p:nvPr/>
+      </p:nvGrpSpPr>
+      <p:grpSpPr>
+        <a:xfrm>
+          <a:off x="0" y="0"/>
+          <a:ext cx="0" cy="0"/>
+          <a:chOff x="0" y="0"/>
+          <a:chExt cx="0" cy="0"/>
+        </a:xfrm>
+      </p:grpSpPr>
+      <p:sp>
+        <p:nvSpPr>
+          <p:cNvPr id="2" name="文字方塊 9">
+            <a:extLst>
+              <a:ext uri="{FF2B5EF4-FFF2-40B4-BE49-F238E27FC236}">
+                <a16:creationId xmlns:a16="http://schemas.microsoft.com/office/drawing/2014/main" id="{1472181F-E1C9-5B4B-AC5F-B6ABF9C576B7}"/>
               </a:ext>
             </a:extLst>
           </p:cNvPr>
@@ -12289,8 +12574,8 @@
         </p:nvSpPr>
         <p:spPr>
           <a:xfrm>
-            <a:off x="985534" y="2704754"/>
-            <a:ext cx="10927800" cy="769441"/>
+            <a:off x="616225" y="569844"/>
+            <a:ext cx="11008328" cy="523220"/>
           </a:xfrm>
           <a:prstGeom prst="rect">
             <a:avLst/>
@@ -12298,50 +12583,24 @@
           <a:noFill/>
         </p:spPr>
         <p:txBody>
-          <a:bodyPr wrap="none" rtlCol="0">
+          <a:bodyPr wrap="square" rtlCol="0">
             <a:spAutoFit/>
           </a:bodyPr>
           <a:lstStyle/>
           <a:p>
             <a:r>
-              <a:rPr lang="en-US" sz="2200" dirty="0">
-                <a:latin typeface="Calibri" panose="020F0502020204030204" pitchFamily="34" charset="0"/>
-                <a:cs typeface="Calibri" panose="020F0502020204030204" pitchFamily="34" charset="0"/>
-              </a:rPr>
-              <a:t>EDM-</a:t>
-            </a:r>
-            <a:r>
-              <a:rPr lang="en-US" sz="2200" dirty="0" err="1">
-                <a:latin typeface="Calibri" panose="020F0502020204030204" pitchFamily="34" charset="0"/>
-                <a:cs typeface="Calibri" panose="020F0502020204030204" pitchFamily="34" charset="0"/>
-              </a:rPr>
-              <a:t>RoBERTa</a:t>
-            </a:r>
-            <a:r>
-              <a:rPr lang="en-US" sz="2200" dirty="0">
-                <a:latin typeface="Calibri" panose="020F0502020204030204" pitchFamily="34" charset="0"/>
-                <a:cs typeface="Calibri" panose="020F0502020204030204" pitchFamily="34" charset="0"/>
-              </a:rPr>
-              <a:t> is designed to improve the dependency mechanism, and fine-tune the whole </a:t>
-            </a:r>
-          </a:p>
-          <a:p>
-            <a:r>
-              <a:rPr lang="en-US" sz="2200" dirty="0">
-                <a:latin typeface="Calibri" panose="020F0502020204030204" pitchFamily="34" charset="0"/>
-                <a:cs typeface="Calibri" panose="020F0502020204030204" pitchFamily="34" charset="0"/>
-              </a:rPr>
-              <a:t>model with sentiment analysis datasets.</a:t>
-            </a:r>
-          </a:p>
-        </p:txBody>
-      </p:sp>
-      <p:sp>
-        <p:nvSpPr>
-          <p:cNvPr id="5" name="文字方塊 4">
-            <a:extLst>
-              <a:ext uri="{FF2B5EF4-FFF2-40B4-BE49-F238E27FC236}">
-                <a16:creationId xmlns:a16="http://schemas.microsoft.com/office/drawing/2014/main" id="{1ED8058D-F274-4F85-8FE0-141F54DE55C1}"/>
+              <a:rPr lang="en-US" sz="2800" b="1" dirty="0"/>
+              <a:t>Conclusions</a:t>
+            </a:r>
+          </a:p>
+        </p:txBody>
+      </p:sp>
+      <p:sp>
+        <p:nvSpPr>
+          <p:cNvPr id="3" name="文字方塊 2">
+            <a:extLst>
+              <a:ext uri="{FF2B5EF4-FFF2-40B4-BE49-F238E27FC236}">
+                <a16:creationId xmlns:a16="http://schemas.microsoft.com/office/drawing/2014/main" id="{F40C8BBC-9339-4C5C-A66C-50E9ED01322F}"/>
               </a:ext>
             </a:extLst>
           </p:cNvPr>
@@ -12350,8 +12609,8 @@
         </p:nvSpPr>
         <p:spPr>
           <a:xfrm>
-            <a:off x="985534" y="4013359"/>
-            <a:ext cx="10661060" cy="769441"/>
+            <a:off x="985534" y="1650581"/>
+            <a:ext cx="8310608" cy="430887"/>
           </a:xfrm>
           <a:prstGeom prst="rect">
             <a:avLst/>
@@ -12366,29 +12625,34 @@
           <a:p>
             <a:r>
               <a:rPr lang="en-US" sz="2200" dirty="0">
-                <a:latin typeface="Calibri" panose="020F0502020204030204" pitchFamily="34" charset="0"/>
-                <a:cs typeface="Calibri" panose="020F0502020204030204" pitchFamily="34" charset="0"/>
+                <a:latin typeface="Times New Roman" panose="02020603050405020304" pitchFamily="18" charset="0"/>
+                <a:cs typeface="Times New Roman" panose="02020603050405020304" pitchFamily="18" charset="0"/>
               </a:rPr>
-              <a:t>Experiments and statistics show our proposed model successfully enhance the dependency </a:t>
-            </a:r>
-          </a:p>
-          <a:p>
+              <a:t>We introduced a language representation model called EDM-</a:t>
+            </a:r>
+            <a:r>
+              <a:rPr lang="en-US" sz="2200" dirty="0" err="1">
+                <a:latin typeface="Times New Roman" panose="02020603050405020304" pitchFamily="18" charset="0"/>
+                <a:cs typeface="Times New Roman" panose="02020603050405020304" pitchFamily="18" charset="0"/>
+              </a:rPr>
+              <a:t>RoBERTa</a:t>
+            </a:r>
             <a:r>
               <a:rPr lang="en-US" sz="2200" dirty="0">
-                <a:latin typeface="Calibri" panose="020F0502020204030204" pitchFamily="34" charset="0"/>
-                <a:cs typeface="Calibri" panose="020F0502020204030204" pitchFamily="34" charset="0"/>
+                <a:latin typeface="Times New Roman" panose="02020603050405020304" pitchFamily="18" charset="0"/>
+                <a:cs typeface="Times New Roman" panose="02020603050405020304" pitchFamily="18" charset="0"/>
               </a:rPr>
-              <a:t>mechanism on local context.</a:t>
-            </a:r>
-          </a:p>
-        </p:txBody>
-      </p:sp>
-      <p:sp>
-        <p:nvSpPr>
-          <p:cNvPr id="6" name="文字方塊 5">
-            <a:extLst>
-              <a:ext uri="{FF2B5EF4-FFF2-40B4-BE49-F238E27FC236}">
-                <a16:creationId xmlns:a16="http://schemas.microsoft.com/office/drawing/2014/main" id="{4F61AFF0-1A69-4A7E-B1DF-D76B12F32D41}"/>
+              <a:t>.</a:t>
+            </a:r>
+          </a:p>
+        </p:txBody>
+      </p:sp>
+      <p:sp>
+        <p:nvSpPr>
+          <p:cNvPr id="4" name="文字方塊 3">
+            <a:extLst>
+              <a:ext uri="{FF2B5EF4-FFF2-40B4-BE49-F238E27FC236}">
+                <a16:creationId xmlns:a16="http://schemas.microsoft.com/office/drawing/2014/main" id="{535C972E-20D5-4DCB-AFBB-E1252A03BA81}"/>
               </a:ext>
             </a:extLst>
           </p:cNvPr>
@@ -12397,8 +12661,8 @@
         </p:nvSpPr>
         <p:spPr>
           <a:xfrm>
-            <a:off x="985534" y="5124208"/>
-            <a:ext cx="11206466" cy="769441"/>
+            <a:off x="985534" y="2638985"/>
+            <a:ext cx="10927800" cy="769441"/>
           </a:xfrm>
           <a:prstGeom prst="rect">
             <a:avLst/>
@@ -12413,70 +12677,178 @@
           <a:p>
             <a:r>
               <a:rPr lang="en-US" sz="2200" dirty="0">
-                <a:latin typeface="Calibri" panose="020F0502020204030204" pitchFamily="34" charset="0"/>
-                <a:cs typeface="Calibri" panose="020F0502020204030204" pitchFamily="34" charset="0"/>
+                <a:latin typeface="Times New Roman" panose="02020603050405020304" pitchFamily="18" charset="0"/>
+                <a:cs typeface="Times New Roman" panose="02020603050405020304" pitchFamily="18" charset="0"/>
               </a:rPr>
               <a:t>EDM-</a:t>
             </a:r>
             <a:r>
               <a:rPr lang="en-US" sz="2200" dirty="0" err="1">
-                <a:latin typeface="Calibri" panose="020F0502020204030204" pitchFamily="34" charset="0"/>
-                <a:cs typeface="Calibri" panose="020F0502020204030204" pitchFamily="34" charset="0"/>
+                <a:latin typeface="Times New Roman" panose="02020603050405020304" pitchFamily="18" charset="0"/>
+                <a:cs typeface="Times New Roman" panose="02020603050405020304" pitchFamily="18" charset="0"/>
               </a:rPr>
               <a:t>RoBERTa</a:t>
             </a:r>
             <a:r>
               <a:rPr lang="en-US" sz="2200" dirty="0">
-                <a:latin typeface="Calibri" panose="020F0502020204030204" pitchFamily="34" charset="0"/>
-                <a:cs typeface="Calibri" panose="020F0502020204030204" pitchFamily="34" charset="0"/>
+                <a:latin typeface="Times New Roman" panose="02020603050405020304" pitchFamily="18" charset="0"/>
+                <a:cs typeface="Times New Roman" panose="02020603050405020304" pitchFamily="18" charset="0"/>
+              </a:rPr>
+              <a:t> is designed to improve the dependency mechanism, and fine-tune the whole </a:t>
+            </a:r>
+          </a:p>
+          <a:p>
+            <a:r>
+              <a:rPr lang="en-US" sz="2200" dirty="0">
+                <a:latin typeface="Times New Roman" panose="02020603050405020304" pitchFamily="18" charset="0"/>
+                <a:cs typeface="Times New Roman" panose="02020603050405020304" pitchFamily="18" charset="0"/>
+              </a:rPr>
+              <a:t>model with sentiment analysis datasets.</a:t>
+            </a:r>
+          </a:p>
+        </p:txBody>
+      </p:sp>
+      <p:sp>
+        <p:nvSpPr>
+          <p:cNvPr id="5" name="文字方塊 4">
+            <a:extLst>
+              <a:ext uri="{FF2B5EF4-FFF2-40B4-BE49-F238E27FC236}">
+                <a16:creationId xmlns:a16="http://schemas.microsoft.com/office/drawing/2014/main" id="{1ED8058D-F274-4F85-8FE0-141F54DE55C1}"/>
+              </a:ext>
+            </a:extLst>
+          </p:cNvPr>
+          <p:cNvSpPr txBox="1"/>
+          <p:nvPr/>
+        </p:nvSpPr>
+        <p:spPr>
+          <a:xfrm>
+            <a:off x="985534" y="3965943"/>
+            <a:ext cx="10661060" cy="769441"/>
+          </a:xfrm>
+          <a:prstGeom prst="rect">
+            <a:avLst/>
+          </a:prstGeom>
+          <a:noFill/>
+        </p:spPr>
+        <p:txBody>
+          <a:bodyPr wrap="none" rtlCol="0">
+            <a:spAutoFit/>
+          </a:bodyPr>
+          <a:lstStyle/>
+          <a:p>
+            <a:r>
+              <a:rPr lang="en-US" sz="2200" dirty="0">
+                <a:latin typeface="Times New Roman" panose="02020603050405020304" pitchFamily="18" charset="0"/>
+                <a:cs typeface="Times New Roman" panose="02020603050405020304" pitchFamily="18" charset="0"/>
+              </a:rPr>
+              <a:t>Experiments and statistics show our proposed model successfully enhance the dependency </a:t>
+            </a:r>
+          </a:p>
+          <a:p>
+            <a:r>
+              <a:rPr lang="en-US" sz="2200" dirty="0">
+                <a:latin typeface="Times New Roman" panose="02020603050405020304" pitchFamily="18" charset="0"/>
+                <a:cs typeface="Times New Roman" panose="02020603050405020304" pitchFamily="18" charset="0"/>
+              </a:rPr>
+              <a:t>mechanism on local context.</a:t>
+            </a:r>
+          </a:p>
+        </p:txBody>
+      </p:sp>
+      <p:sp>
+        <p:nvSpPr>
+          <p:cNvPr id="6" name="文字方塊 5">
+            <a:extLst>
+              <a:ext uri="{FF2B5EF4-FFF2-40B4-BE49-F238E27FC236}">
+                <a16:creationId xmlns:a16="http://schemas.microsoft.com/office/drawing/2014/main" id="{4F61AFF0-1A69-4A7E-B1DF-D76B12F32D41}"/>
+              </a:ext>
+            </a:extLst>
+          </p:cNvPr>
+          <p:cNvSpPr txBox="1"/>
+          <p:nvPr/>
+        </p:nvSpPr>
+        <p:spPr>
+          <a:xfrm>
+            <a:off x="985534" y="5124208"/>
+            <a:ext cx="10447925" cy="769441"/>
+          </a:xfrm>
+          <a:prstGeom prst="rect">
+            <a:avLst/>
+          </a:prstGeom>
+          <a:noFill/>
+        </p:spPr>
+        <p:txBody>
+          <a:bodyPr wrap="none" rtlCol="0">
+            <a:spAutoFit/>
+          </a:bodyPr>
+          <a:lstStyle/>
+          <a:p>
+            <a:r>
+              <a:rPr lang="en-US" sz="2200" dirty="0">
+                <a:latin typeface="Times New Roman" panose="02020603050405020304" pitchFamily="18" charset="0"/>
+                <a:cs typeface="Times New Roman" panose="02020603050405020304" pitchFamily="18" charset="0"/>
+              </a:rPr>
+              <a:t>EDM-</a:t>
+            </a:r>
+            <a:r>
+              <a:rPr lang="en-US" sz="2200" dirty="0" err="1">
+                <a:latin typeface="Times New Roman" panose="02020603050405020304" pitchFamily="18" charset="0"/>
+                <a:cs typeface="Times New Roman" panose="02020603050405020304" pitchFamily="18" charset="0"/>
+              </a:rPr>
+              <a:t>RoBERTa</a:t>
+            </a:r>
+            <a:r>
+              <a:rPr lang="en-US" sz="2200" dirty="0">
+                <a:latin typeface="Times New Roman" panose="02020603050405020304" pitchFamily="18" charset="0"/>
+                <a:cs typeface="Times New Roman" panose="02020603050405020304" pitchFamily="18" charset="0"/>
               </a:rPr>
               <a:t> outperforms conventional pre-trained models, including Seq2Seq, BERT, </a:t>
             </a:r>
+            <a:br>
+              <a:rPr lang="en-US" sz="2200" dirty="0">
+                <a:latin typeface="Times New Roman" panose="02020603050405020304" pitchFamily="18" charset="0"/>
+                <a:cs typeface="Times New Roman" panose="02020603050405020304" pitchFamily="18" charset="0"/>
+              </a:rPr>
+            </a:br>
             <a:r>
               <a:rPr lang="en-US" sz="2200" dirty="0" err="1">
-                <a:latin typeface="Calibri" panose="020F0502020204030204" pitchFamily="34" charset="0"/>
-                <a:cs typeface="Calibri" panose="020F0502020204030204" pitchFamily="34" charset="0"/>
+                <a:latin typeface="Times New Roman" panose="02020603050405020304" pitchFamily="18" charset="0"/>
+                <a:cs typeface="Times New Roman" panose="02020603050405020304" pitchFamily="18" charset="0"/>
               </a:rPr>
               <a:t>RoBERTa</a:t>
             </a:r>
             <a:r>
               <a:rPr lang="en-US" sz="2200" dirty="0">
-                <a:latin typeface="Calibri" panose="020F0502020204030204" pitchFamily="34" charset="0"/>
-                <a:cs typeface="Calibri" panose="020F0502020204030204" pitchFamily="34" charset="0"/>
+                <a:latin typeface="Times New Roman" panose="02020603050405020304" pitchFamily="18" charset="0"/>
+                <a:cs typeface="Times New Roman" panose="02020603050405020304" pitchFamily="18" charset="0"/>
               </a:rPr>
-              <a:t>,</a:t>
-            </a:r>
-            <a:br>
-              <a:rPr lang="en-US" sz="2200" dirty="0">
-                <a:latin typeface="Calibri" panose="020F0502020204030204" pitchFamily="34" charset="0"/>
-                <a:cs typeface="Calibri" panose="020F0502020204030204" pitchFamily="34" charset="0"/>
-              </a:rPr>
-            </a:br>
+              <a:t>, </a:t>
+            </a:r>
             <a:r>
               <a:rPr lang="en-US" sz="2200" dirty="0" err="1">
-                <a:latin typeface="Calibri" panose="020F0502020204030204" pitchFamily="34" charset="0"/>
-                <a:cs typeface="Calibri" panose="020F0502020204030204" pitchFamily="34" charset="0"/>
+                <a:latin typeface="Times New Roman" panose="02020603050405020304" pitchFamily="18" charset="0"/>
+                <a:cs typeface="Times New Roman" panose="02020603050405020304" pitchFamily="18" charset="0"/>
               </a:rPr>
               <a:t>XLNet</a:t>
             </a:r>
             <a:r>
               <a:rPr lang="en-US" sz="2200" dirty="0">
-                <a:latin typeface="Calibri" panose="020F0502020204030204" pitchFamily="34" charset="0"/>
-                <a:cs typeface="Calibri" panose="020F0502020204030204" pitchFamily="34" charset="0"/>
+                <a:latin typeface="Times New Roman" panose="02020603050405020304" pitchFamily="18" charset="0"/>
+                <a:cs typeface="Times New Roman" panose="02020603050405020304" pitchFamily="18" charset="0"/>
               </a:rPr>
               <a:t>, and </a:t>
             </a:r>
             <a:r>
               <a:rPr lang="en-US" sz="2200" dirty="0" err="1">
-                <a:latin typeface="Calibri" panose="020F0502020204030204" pitchFamily="34" charset="0"/>
-                <a:cs typeface="Calibri" panose="020F0502020204030204" pitchFamily="34" charset="0"/>
+                <a:latin typeface="Times New Roman" panose="02020603050405020304" pitchFamily="18" charset="0"/>
+                <a:cs typeface="Times New Roman" panose="02020603050405020304" pitchFamily="18" charset="0"/>
               </a:rPr>
               <a:t>DistilBERT</a:t>
             </a:r>
             <a:r>
               <a:rPr lang="en-US" sz="2200" dirty="0">
-                <a:latin typeface="Calibri" panose="020F0502020204030204" pitchFamily="34" charset="0"/>
-                <a:cs typeface="Calibri" panose="020F0502020204030204" pitchFamily="34" charset="0"/>
+                <a:latin typeface="Times New Roman" panose="02020603050405020304" pitchFamily="18" charset="0"/>
+                <a:cs typeface="Times New Roman" panose="02020603050405020304" pitchFamily="18" charset="0"/>
               </a:rPr>
               <a:t>.</a:t>
             </a:r>

</xml_diff>

<commit_message>
20210103: Update Current Progress
</commit_message>
<xml_diff>
--- a/Lab/REP.pptx
+++ b/Lab/REP.pptx
@@ -15875,15 +15875,6 @@
 </file>
 
 <file path=customXml/item1.xml><?xml version="1.0" encoding="utf-8"?>
-<p:properties xmlns:p="http://schemas.microsoft.com/office/2006/metadata/properties" xmlns:xsi="http://www.w3.org/2001/XMLSchema-instance" xmlns:pc="http://schemas.microsoft.com/office/infopath/2007/PartnerControls">
-  <documentManagement>
-    <_ip_UnifiedCompliancePolicyUIAction xmlns="http://schemas.microsoft.com/sharepoint/v3" xsi:nil="true"/>
-    <_ip_UnifiedCompliancePolicyProperties xmlns="http://schemas.microsoft.com/sharepoint/v3" xsi:nil="true"/>
-  </documentManagement>
-</p:properties>
-</file>
-
-<file path=customXml/item2.xml><?xml version="1.0" encoding="utf-8"?>
 <ct:contentTypeSchema xmlns:ct="http://schemas.microsoft.com/office/2006/metadata/contentType" xmlns:ma="http://schemas.microsoft.com/office/2006/metadata/properties/metaAttributes" ct:_="" ma:_="" ma:contentTypeName="Document" ma:contentTypeID="0x010100DEEA25CC0A0AC24199CDC46C25B8B0BC" ma:contentTypeVersion="9" ma:contentTypeDescription="Create a new document." ma:contentTypeScope="" ma:versionID="76e25e1730b4532ab1d5e5b131a96a5a">
   <xsd:schema xmlns:xsd="http://www.w3.org/2001/XMLSchema" xmlns:xs="http://www.w3.org/2001/XMLSchema" xmlns:p="http://schemas.microsoft.com/office/2006/metadata/properties" xmlns:ns1="http://schemas.microsoft.com/sharepoint/v3" xmlns:ns2="6dc4bcd6-49db-4c07-9060-8acfc67cef9f" xmlns:ns3="fb0879af-3eba-417a-a55a-ffe6dcd6ca77" targetNamespace="http://schemas.microsoft.com/office/2006/metadata/properties" ma:root="true" ma:fieldsID="ad1e9281a84c4949647088091c718de3" ns1:_="" ns2:_="" ns3:_="">
     <xsd:import namespace="http://schemas.microsoft.com/sharepoint/v3"/>
@@ -16085,25 +16076,16 @@
 </ct:contentTypeSchema>
 </file>
 
-<file path=customXml/itemProps1.xml><?xml version="1.0" encoding="utf-8"?>
-<ds:datastoreItem xmlns:ds="http://schemas.openxmlformats.org/officeDocument/2006/customXml" ds:itemID="{8FB61CFE-D4DA-4753-A9A5-D482B9609A35}">
-  <ds:schemaRefs>
-    <ds:schemaRef ds:uri="http://schemas.microsoft.com/office/2006/metadata/properties"/>
-    <ds:schemaRef ds:uri="http://schemas.openxmlformats.org/package/2006/metadata/core-properties"/>
-    <ds:schemaRef ds:uri="http://purl.org/dc/elements/1.1/"/>
-    <ds:schemaRef ds:uri="http://schemas.microsoft.com/office/2006/documentManagement/types"/>
-    <ds:schemaRef ds:uri="http://schemas.microsoft.com/sharepoint/v3"/>
-    <ds:schemaRef ds:uri="http://purl.org/dc/terms/"/>
-    <ds:schemaRef ds:uri="http://schemas.microsoft.com/office/infopath/2007/PartnerControls"/>
-    <ds:schemaRef ds:uri="http://www.w3.org/XML/1998/namespace"/>
-    <ds:schemaRef ds:uri="fb0879af-3eba-417a-a55a-ffe6dcd6ca77"/>
-    <ds:schemaRef ds:uri="6dc4bcd6-49db-4c07-9060-8acfc67cef9f"/>
-    <ds:schemaRef ds:uri="http://purl.org/dc/dcmitype/"/>
-  </ds:schemaRefs>
-</ds:datastoreItem>
+<file path=customXml/item2.xml><?xml version="1.0" encoding="utf-8"?>
+<p:properties xmlns:p="http://schemas.microsoft.com/office/2006/metadata/properties" xmlns:xsi="http://www.w3.org/2001/XMLSchema-instance" xmlns:pc="http://schemas.microsoft.com/office/infopath/2007/PartnerControls">
+  <documentManagement>
+    <_ip_UnifiedCompliancePolicyUIAction xmlns="http://schemas.microsoft.com/sharepoint/v3" xsi:nil="true"/>
+    <_ip_UnifiedCompliancePolicyProperties xmlns="http://schemas.microsoft.com/sharepoint/v3" xsi:nil="true"/>
+  </documentManagement>
+</p:properties>
 </file>
 
-<file path=customXml/itemProps2.xml><?xml version="1.0" encoding="utf-8"?>
+<file path=customXml/itemProps1.xml><?xml version="1.0" encoding="utf-8"?>
 <ds:datastoreItem xmlns:ds="http://schemas.openxmlformats.org/officeDocument/2006/customXml" ds:itemID="{58A784AD-7888-482C-A72A-80D3063962ED}">
   <ds:schemaRefs>
     <ds:schemaRef ds:uri="http://schemas.microsoft.com/office/2006/metadata/contentType"/>
@@ -16121,4 +16103,22 @@
     <ds:schemaRef ds:uri="http://schemas.microsoft.com/internal/obd"/>
   </ds:schemaRefs>
 </ds:datastoreItem>
+</file>
+
+<file path=customXml/itemProps2.xml><?xml version="1.0" encoding="utf-8"?>
+<ds:datastoreItem xmlns:ds="http://schemas.openxmlformats.org/officeDocument/2006/customXml" ds:itemID="{8FB61CFE-D4DA-4753-A9A5-D482B9609A35}">
+  <ds:schemaRefs>
+    <ds:schemaRef ds:uri="http://schemas.microsoft.com/office/2006/metadata/properties"/>
+    <ds:schemaRef ds:uri="http://schemas.openxmlformats.org/package/2006/metadata/core-properties"/>
+    <ds:schemaRef ds:uri="http://purl.org/dc/elements/1.1/"/>
+    <ds:schemaRef ds:uri="http://schemas.microsoft.com/office/2006/documentManagement/types"/>
+    <ds:schemaRef ds:uri="http://schemas.microsoft.com/sharepoint/v3"/>
+    <ds:schemaRef ds:uri="http://purl.org/dc/terms/"/>
+    <ds:schemaRef ds:uri="http://schemas.microsoft.com/office/infopath/2007/PartnerControls"/>
+    <ds:schemaRef ds:uri="http://www.w3.org/XML/1998/namespace"/>
+    <ds:schemaRef ds:uri="fb0879af-3eba-417a-a55a-ffe6dcd6ca77"/>
+    <ds:schemaRef ds:uri="6dc4bcd6-49db-4c07-9060-8acfc67cef9f"/>
+    <ds:schemaRef ds:uri="http://purl.org/dc/dcmitype/"/>
+  </ds:schemaRefs>
+</ds:datastoreItem>
 </file>
</xml_diff>

<commit_message>
20200103: Update REP and add PDF format
</commit_message>
<xml_diff>
--- a/Lab/REP.pptx
+++ b/Lab/REP.pptx
@@ -15893,15 +15893,6 @@
 </file>
 
 <file path=customXml/item1.xml><?xml version="1.0" encoding="utf-8"?>
-<p:properties xmlns:p="http://schemas.microsoft.com/office/2006/metadata/properties" xmlns:xsi="http://www.w3.org/2001/XMLSchema-instance" xmlns:pc="http://schemas.microsoft.com/office/infopath/2007/PartnerControls">
-  <documentManagement>
-    <_ip_UnifiedCompliancePolicyUIAction xmlns="http://schemas.microsoft.com/sharepoint/v3" xsi:nil="true"/>
-    <_ip_UnifiedCompliancePolicyProperties xmlns="http://schemas.microsoft.com/sharepoint/v3" xsi:nil="true"/>
-  </documentManagement>
-</p:properties>
-</file>
-
-<file path=customXml/item2.xml><?xml version="1.0" encoding="utf-8"?>
 <ct:contentTypeSchema xmlns:ct="http://schemas.microsoft.com/office/2006/metadata/contentType" xmlns:ma="http://schemas.microsoft.com/office/2006/metadata/properties/metaAttributes" ct:_="" ma:_="" ma:contentTypeName="Document" ma:contentTypeID="0x010100DEEA25CC0A0AC24199CDC46C25B8B0BC" ma:contentTypeVersion="9" ma:contentTypeDescription="Create a new document." ma:contentTypeScope="" ma:versionID="76e25e1730b4532ab1d5e5b131a96a5a">
   <xsd:schema xmlns:xsd="http://www.w3.org/2001/XMLSchema" xmlns:xs="http://www.w3.org/2001/XMLSchema" xmlns:p="http://schemas.microsoft.com/office/2006/metadata/properties" xmlns:ns1="http://schemas.microsoft.com/sharepoint/v3" xmlns:ns2="6dc4bcd6-49db-4c07-9060-8acfc67cef9f" xmlns:ns3="fb0879af-3eba-417a-a55a-ffe6dcd6ca77" targetNamespace="http://schemas.microsoft.com/office/2006/metadata/properties" ma:root="true" ma:fieldsID="ad1e9281a84c4949647088091c718de3" ns1:_="" ns2:_="" ns3:_="">
     <xsd:import namespace="http://schemas.microsoft.com/sharepoint/v3"/>
@@ -16103,25 +16094,16 @@
 </ct:contentTypeSchema>
 </file>
 
-<file path=customXml/itemProps1.xml><?xml version="1.0" encoding="utf-8"?>
-<ds:datastoreItem xmlns:ds="http://schemas.openxmlformats.org/officeDocument/2006/customXml" ds:itemID="{8FB61CFE-D4DA-4753-A9A5-D482B9609A35}">
-  <ds:schemaRefs>
-    <ds:schemaRef ds:uri="http://schemas.microsoft.com/office/2006/metadata/properties"/>
-    <ds:schemaRef ds:uri="http://schemas.openxmlformats.org/package/2006/metadata/core-properties"/>
-    <ds:schemaRef ds:uri="http://purl.org/dc/elements/1.1/"/>
-    <ds:schemaRef ds:uri="http://schemas.microsoft.com/office/2006/documentManagement/types"/>
-    <ds:schemaRef ds:uri="http://schemas.microsoft.com/sharepoint/v3"/>
-    <ds:schemaRef ds:uri="http://purl.org/dc/terms/"/>
-    <ds:schemaRef ds:uri="http://schemas.microsoft.com/office/infopath/2007/PartnerControls"/>
-    <ds:schemaRef ds:uri="http://www.w3.org/XML/1998/namespace"/>
-    <ds:schemaRef ds:uri="fb0879af-3eba-417a-a55a-ffe6dcd6ca77"/>
-    <ds:schemaRef ds:uri="6dc4bcd6-49db-4c07-9060-8acfc67cef9f"/>
-    <ds:schemaRef ds:uri="http://purl.org/dc/dcmitype/"/>
-  </ds:schemaRefs>
-</ds:datastoreItem>
+<file path=customXml/item2.xml><?xml version="1.0" encoding="utf-8"?>
+<p:properties xmlns:p="http://schemas.microsoft.com/office/2006/metadata/properties" xmlns:xsi="http://www.w3.org/2001/XMLSchema-instance" xmlns:pc="http://schemas.microsoft.com/office/infopath/2007/PartnerControls">
+  <documentManagement>
+    <_ip_UnifiedCompliancePolicyUIAction xmlns="http://schemas.microsoft.com/sharepoint/v3" xsi:nil="true"/>
+    <_ip_UnifiedCompliancePolicyProperties xmlns="http://schemas.microsoft.com/sharepoint/v3" xsi:nil="true"/>
+  </documentManagement>
+</p:properties>
 </file>
 
-<file path=customXml/itemProps2.xml><?xml version="1.0" encoding="utf-8"?>
+<file path=customXml/itemProps1.xml><?xml version="1.0" encoding="utf-8"?>
 <ds:datastoreItem xmlns:ds="http://schemas.openxmlformats.org/officeDocument/2006/customXml" ds:itemID="{58A784AD-7888-482C-A72A-80D3063962ED}">
   <ds:schemaRefs>
     <ds:schemaRef ds:uri="http://schemas.microsoft.com/office/2006/metadata/contentType"/>
@@ -16139,4 +16121,22 @@
     <ds:schemaRef ds:uri="http://schemas.microsoft.com/internal/obd"/>
   </ds:schemaRefs>
 </ds:datastoreItem>
+</file>
+
+<file path=customXml/itemProps2.xml><?xml version="1.0" encoding="utf-8"?>
+<ds:datastoreItem xmlns:ds="http://schemas.openxmlformats.org/officeDocument/2006/customXml" ds:itemID="{8FB61CFE-D4DA-4753-A9A5-D482B9609A35}">
+  <ds:schemaRefs>
+    <ds:schemaRef ds:uri="http://schemas.microsoft.com/office/2006/metadata/properties"/>
+    <ds:schemaRef ds:uri="http://schemas.openxmlformats.org/package/2006/metadata/core-properties"/>
+    <ds:schemaRef ds:uri="http://purl.org/dc/elements/1.1/"/>
+    <ds:schemaRef ds:uri="http://schemas.microsoft.com/office/2006/documentManagement/types"/>
+    <ds:schemaRef ds:uri="http://schemas.microsoft.com/sharepoint/v3"/>
+    <ds:schemaRef ds:uri="http://purl.org/dc/terms/"/>
+    <ds:schemaRef ds:uri="http://schemas.microsoft.com/office/infopath/2007/PartnerControls"/>
+    <ds:schemaRef ds:uri="http://www.w3.org/XML/1998/namespace"/>
+    <ds:schemaRef ds:uri="fb0879af-3eba-417a-a55a-ffe6dcd6ca77"/>
+    <ds:schemaRef ds:uri="6dc4bcd6-49db-4c07-9060-8acfc67cef9f"/>
+    <ds:schemaRef ds:uri="http://purl.org/dc/dcmitype/"/>
+  </ds:schemaRefs>
+</ds:datastoreItem>
 </file>
</xml_diff>

<commit_message>
20210103: Add sentiment analysis graph
</commit_message>
<xml_diff>
--- a/Lab/REP.pptx
+++ b/Lab/REP.pptx
@@ -5,10 +5,10 @@
     <p:sldMasterId id="2147483648" r:id="rId3"/>
   </p:sldMasterIdLst>
   <p:notesMasterIdLst>
-    <p:notesMasterId r:id="rId25"/>
+    <p:notesMasterId r:id="rId26"/>
   </p:notesMasterIdLst>
   <p:handoutMasterIdLst>
-    <p:handoutMasterId r:id="rId26"/>
+    <p:handoutMasterId r:id="rId27"/>
   </p:handoutMasterIdLst>
   <p:sldIdLst>
     <p:sldId id="282" r:id="rId4"/>
@@ -26,12 +26,13 @@
     <p:sldId id="313" r:id="rId16"/>
     <p:sldId id="311" r:id="rId17"/>
     <p:sldId id="305" r:id="rId18"/>
-    <p:sldId id="318" r:id="rId19"/>
-    <p:sldId id="307" r:id="rId20"/>
-    <p:sldId id="306" r:id="rId21"/>
-    <p:sldId id="308" r:id="rId22"/>
-    <p:sldId id="309" r:id="rId23"/>
-    <p:sldId id="310" r:id="rId24"/>
+    <p:sldId id="319" r:id="rId19"/>
+    <p:sldId id="318" r:id="rId20"/>
+    <p:sldId id="307" r:id="rId21"/>
+    <p:sldId id="306" r:id="rId22"/>
+    <p:sldId id="308" r:id="rId23"/>
+    <p:sldId id="309" r:id="rId24"/>
+    <p:sldId id="310" r:id="rId25"/>
   </p:sldIdLst>
   <p:sldSz cx="12192000" cy="6858000"/>
   <p:notesSz cx="6858000" cy="9144000"/>
@@ -1648,7 +1649,7 @@
     </p:spTree>
     <p:extLst>
       <p:ext uri="{BB962C8B-B14F-4D97-AF65-F5344CB8AC3E}">
-        <p14:creationId xmlns:p14="http://schemas.microsoft.com/office/powerpoint/2010/main" val="1798000473"/>
+        <p14:creationId xmlns:p14="http://schemas.microsoft.com/office/powerpoint/2010/main" val="2395718010"/>
       </p:ext>
     </p:extLst>
   </p:cSld>
@@ -1735,7 +1736,7 @@
           <p:cNvPr id="5" name="頁首版面配置區 4">
             <a:extLst>
               <a:ext uri="{FF2B5EF4-FFF2-40B4-BE49-F238E27FC236}">
-                <a16:creationId xmlns:a16="http://schemas.microsoft.com/office/drawing/2014/main" id="{395663F1-EC29-4F7E-B7B3-C47C3BAA9D0F}"/>
+                <a16:creationId xmlns:a16="http://schemas.microsoft.com/office/drawing/2014/main" id="{FF80F06F-3710-4263-9F80-0D2A92DDD819}"/>
               </a:ext>
             </a:extLst>
           </p:cNvPr>
@@ -1762,7 +1763,7 @@
     </p:spTree>
     <p:extLst>
       <p:ext uri="{BB962C8B-B14F-4D97-AF65-F5344CB8AC3E}">
-        <p14:creationId xmlns:p14="http://schemas.microsoft.com/office/powerpoint/2010/main" val="2701519937"/>
+        <p14:creationId xmlns:p14="http://schemas.microsoft.com/office/powerpoint/2010/main" val="1798000473"/>
       </p:ext>
     </p:extLst>
   </p:cSld>
@@ -1849,7 +1850,7 @@
           <p:cNvPr id="5" name="頁首版面配置區 4">
             <a:extLst>
               <a:ext uri="{FF2B5EF4-FFF2-40B4-BE49-F238E27FC236}">
-                <a16:creationId xmlns:a16="http://schemas.microsoft.com/office/drawing/2014/main" id="{6E8C5AB6-E61C-4B97-8238-2D971E93E5C6}"/>
+                <a16:creationId xmlns:a16="http://schemas.microsoft.com/office/drawing/2014/main" id="{395663F1-EC29-4F7E-B7B3-C47C3BAA9D0F}"/>
               </a:ext>
             </a:extLst>
           </p:cNvPr>
@@ -1876,7 +1877,7 @@
     </p:spTree>
     <p:extLst>
       <p:ext uri="{BB962C8B-B14F-4D97-AF65-F5344CB8AC3E}">
-        <p14:creationId xmlns:p14="http://schemas.microsoft.com/office/powerpoint/2010/main" val="3565233456"/>
+        <p14:creationId xmlns:p14="http://schemas.microsoft.com/office/powerpoint/2010/main" val="2701519937"/>
       </p:ext>
     </p:extLst>
   </p:cSld>
@@ -1963,7 +1964,7 @@
           <p:cNvPr id="5" name="頁首版面配置區 4">
             <a:extLst>
               <a:ext uri="{FF2B5EF4-FFF2-40B4-BE49-F238E27FC236}">
-                <a16:creationId xmlns:a16="http://schemas.microsoft.com/office/drawing/2014/main" id="{8FD7EE22-8F34-425B-82D2-EC0C0E66DD50}"/>
+                <a16:creationId xmlns:a16="http://schemas.microsoft.com/office/drawing/2014/main" id="{6E8C5AB6-E61C-4B97-8238-2D971E93E5C6}"/>
               </a:ext>
             </a:extLst>
           </p:cNvPr>
@@ -1990,7 +1991,7 @@
     </p:spTree>
     <p:extLst>
       <p:ext uri="{BB962C8B-B14F-4D97-AF65-F5344CB8AC3E}">
-        <p14:creationId xmlns:p14="http://schemas.microsoft.com/office/powerpoint/2010/main" val="2220057016"/>
+        <p14:creationId xmlns:p14="http://schemas.microsoft.com/office/powerpoint/2010/main" val="3565233456"/>
       </p:ext>
     </p:extLst>
   </p:cSld>
@@ -2191,7 +2192,7 @@
           <p:cNvPr id="5" name="頁首版面配置區 4">
             <a:extLst>
               <a:ext uri="{FF2B5EF4-FFF2-40B4-BE49-F238E27FC236}">
-                <a16:creationId xmlns:a16="http://schemas.microsoft.com/office/drawing/2014/main" id="{B0ED961B-B77E-4128-9A1E-997B6008F2D5}"/>
+                <a16:creationId xmlns:a16="http://schemas.microsoft.com/office/drawing/2014/main" id="{8FD7EE22-8F34-425B-82D2-EC0C0E66DD50}"/>
               </a:ext>
             </a:extLst>
           </p:cNvPr>
@@ -2218,7 +2219,7 @@
     </p:spTree>
     <p:extLst>
       <p:ext uri="{BB962C8B-B14F-4D97-AF65-F5344CB8AC3E}">
-        <p14:creationId xmlns:p14="http://schemas.microsoft.com/office/powerpoint/2010/main" val="2333112210"/>
+        <p14:creationId xmlns:p14="http://schemas.microsoft.com/office/powerpoint/2010/main" val="2220057016"/>
       </p:ext>
     </p:extLst>
   </p:cSld>
@@ -2295,6 +2296,120 @@
               <a:rPr lang="en-ZA" smtClean="0"/>
               <a:pPr/>
               <a:t>21</a:t>
+            </a:fld>
+            <a:endParaRPr lang="en-ZA"/>
+          </a:p>
+        </p:txBody>
+      </p:sp>
+      <p:sp>
+        <p:nvSpPr>
+          <p:cNvPr id="5" name="頁首版面配置區 4">
+            <a:extLst>
+              <a:ext uri="{FF2B5EF4-FFF2-40B4-BE49-F238E27FC236}">
+                <a16:creationId xmlns:a16="http://schemas.microsoft.com/office/drawing/2014/main" id="{B0ED961B-B77E-4128-9A1E-997B6008F2D5}"/>
+              </a:ext>
+            </a:extLst>
+          </p:cNvPr>
+          <p:cNvSpPr>
+            <a:spLocks noGrp="1"/>
+          </p:cNvSpPr>
+          <p:nvPr>
+            <p:ph type="hdr" sz="quarter"/>
+          </p:nvPr>
+        </p:nvSpPr>
+        <p:spPr/>
+        <p:txBody>
+          <a:bodyPr/>
+          <a:lstStyle/>
+          <a:p>
+            <a:r>
+              <a:rPr lang="en-US" altLang="zh-TW"/>
+              <a:t>1</a:t>
+            </a:r>
+            <a:endParaRPr lang="zh-TW" altLang="en-US" dirty="0"/>
+          </a:p>
+        </p:txBody>
+      </p:sp>
+    </p:spTree>
+    <p:extLst>
+      <p:ext uri="{BB962C8B-B14F-4D97-AF65-F5344CB8AC3E}">
+        <p14:creationId xmlns:p14="http://schemas.microsoft.com/office/powerpoint/2010/main" val="2333112210"/>
+      </p:ext>
+    </p:extLst>
+  </p:cSld>
+  <p:clrMapOvr>
+    <a:masterClrMapping/>
+  </p:clrMapOvr>
+</p:notes>
+</file>
+
+<file path=ppt/notesSlides/notesSlide22.xml><?xml version="1.0" encoding="utf-8"?>
+<p:notes xmlns:a="http://schemas.openxmlformats.org/drawingml/2006/main" xmlns:r="http://schemas.openxmlformats.org/officeDocument/2006/relationships" xmlns:p="http://schemas.openxmlformats.org/presentationml/2006/main">
+  <p:cSld>
+    <p:spTree>
+      <p:nvGrpSpPr>
+        <p:cNvPr id="1" name=""/>
+        <p:cNvGrpSpPr/>
+        <p:nvPr/>
+      </p:nvGrpSpPr>
+      <p:grpSpPr>
+        <a:xfrm>
+          <a:off x="0" y="0"/>
+          <a:ext cx="0" cy="0"/>
+          <a:chOff x="0" y="0"/>
+          <a:chExt cx="0" cy="0"/>
+        </a:xfrm>
+      </p:grpSpPr>
+      <p:sp>
+        <p:nvSpPr>
+          <p:cNvPr id="2" name="投影片影像版面配置區 1"/>
+          <p:cNvSpPr>
+            <a:spLocks noGrp="1" noRot="1" noChangeAspect="1"/>
+          </p:cNvSpPr>
+          <p:nvPr>
+            <p:ph type="sldImg"/>
+          </p:nvPr>
+        </p:nvSpPr>
+        <p:spPr/>
+      </p:sp>
+      <p:sp>
+        <p:nvSpPr>
+          <p:cNvPr id="3" name="備忘稿版面配置區 2"/>
+          <p:cNvSpPr>
+            <a:spLocks noGrp="1"/>
+          </p:cNvSpPr>
+          <p:nvPr>
+            <p:ph type="body" idx="1"/>
+          </p:nvPr>
+        </p:nvSpPr>
+        <p:spPr/>
+        <p:txBody>
+          <a:bodyPr/>
+          <a:lstStyle/>
+          <a:p>
+            <a:endParaRPr lang="zh-TW" altLang="en-US" dirty="0"/>
+          </a:p>
+        </p:txBody>
+      </p:sp>
+      <p:sp>
+        <p:nvSpPr>
+          <p:cNvPr id="4" name="投影片編號版面配置區 3"/>
+          <p:cNvSpPr>
+            <a:spLocks noGrp="1"/>
+          </p:cNvSpPr>
+          <p:nvPr>
+            <p:ph type="sldNum" sz="quarter" idx="10"/>
+          </p:nvPr>
+        </p:nvSpPr>
+        <p:spPr/>
+        <p:txBody>
+          <a:bodyPr/>
+          <a:lstStyle/>
+          <a:p>
+            <a:fld id="{8530193B-564F-4854-8A52-728F3FB19C85}" type="slidenum">
+              <a:rPr lang="en-ZA" smtClean="0"/>
+              <a:pPr/>
+              <a:t>22</a:t>
             </a:fld>
             <a:endParaRPr lang="en-ZA"/>
           </a:p>
@@ -11333,10 +11448,10 @@
       </p:sp>
       <p:sp>
         <p:nvSpPr>
-          <p:cNvPr id="5" name="TextBox 4">
-            <a:extLst>
-              <a:ext uri="{FF2B5EF4-FFF2-40B4-BE49-F238E27FC236}">
-                <a16:creationId xmlns:a16="http://schemas.microsoft.com/office/drawing/2014/main" id="{0F0A5022-A9F2-4143-B927-A449071B04E6}"/>
+          <p:cNvPr id="9" name="文字方塊 8">
+            <a:extLst>
+              <a:ext uri="{FF2B5EF4-FFF2-40B4-BE49-F238E27FC236}">
+                <a16:creationId xmlns:a16="http://schemas.microsoft.com/office/drawing/2014/main" id="{AE73553F-4114-411F-A6A1-3291FA4B6CF8}"/>
               </a:ext>
             </a:extLst>
           </p:cNvPr>
@@ -11345,8 +11460,8 @@
         </p:nvSpPr>
         <p:spPr>
           <a:xfrm>
-            <a:off x="952373" y="1568534"/>
-            <a:ext cx="11102783" cy="830997"/>
+            <a:off x="11484528" y="6493241"/>
+            <a:ext cx="805343" cy="276999"/>
           </a:xfrm>
           <a:prstGeom prst="rect">
             <a:avLst/>
@@ -11354,122 +11469,11 @@
           <a:noFill/>
         </p:spPr>
         <p:txBody>
-          <a:bodyPr wrap="none" rtlCol="0">
-            <a:spAutoFit/>
-          </a:bodyPr>
-          <a:lstStyle/>
-          <a:p>
-            <a:pPr marL="342900" indent="-342900">
-              <a:buFont typeface="Arial" panose="020B0604020202020204" pitchFamily="34" charset="0"/>
-              <a:buChar char="•"/>
-            </a:pPr>
-            <a:r>
-              <a:rPr lang="en-US" sz="2400" dirty="0">
-                <a:latin typeface="Times New Roman" panose="02020603050405020304" pitchFamily="18" charset="0"/>
-                <a:cs typeface="Times New Roman" panose="02020603050405020304" pitchFamily="18" charset="0"/>
-              </a:rPr>
-              <a:t>Why using both two-dimensional and multi-dimensional sentiment analysis datasets </a:t>
-            </a:r>
-          </a:p>
-          <a:p>
-            <a:r>
-              <a:rPr lang="en-US" sz="2400" dirty="0">
-                <a:latin typeface="Times New Roman" panose="02020603050405020304" pitchFamily="18" charset="0"/>
-                <a:cs typeface="Times New Roman" panose="02020603050405020304" pitchFamily="18" charset="0"/>
-              </a:rPr>
-              <a:t>      to train EDM-</a:t>
-            </a:r>
-            <a:r>
-              <a:rPr lang="en-US" sz="2400" dirty="0" err="1">
-                <a:latin typeface="Times New Roman" panose="02020603050405020304" pitchFamily="18" charset="0"/>
-                <a:cs typeface="Times New Roman" panose="02020603050405020304" pitchFamily="18" charset="0"/>
-              </a:rPr>
-              <a:t>RoBERTa</a:t>
-            </a:r>
-            <a:r>
-              <a:rPr lang="en-US" sz="2400" dirty="0">
-                <a:latin typeface="Times New Roman" panose="02020603050405020304" pitchFamily="18" charset="0"/>
-                <a:cs typeface="Times New Roman" panose="02020603050405020304" pitchFamily="18" charset="0"/>
-              </a:rPr>
-              <a:t> ?</a:t>
-            </a:r>
-          </a:p>
-        </p:txBody>
-      </p:sp>
-      <p:sp>
-        <p:nvSpPr>
-          <p:cNvPr id="6" name="TextBox 5">
-            <a:extLst>
-              <a:ext uri="{FF2B5EF4-FFF2-40B4-BE49-F238E27FC236}">
-                <a16:creationId xmlns:a16="http://schemas.microsoft.com/office/drawing/2014/main" id="{F0562E0E-EEBC-9146-9A8A-71CE457A66D7}"/>
-              </a:ext>
-            </a:extLst>
-          </p:cNvPr>
-          <p:cNvSpPr txBox="1"/>
-          <p:nvPr/>
-        </p:nvSpPr>
-        <p:spPr>
-          <a:xfrm>
-            <a:off x="1629842" y="2644168"/>
-            <a:ext cx="9422471" cy="461665"/>
-          </a:xfrm>
-          <a:prstGeom prst="rect">
-            <a:avLst/>
-          </a:prstGeom>
-          <a:noFill/>
-        </p:spPr>
-        <p:txBody>
           <a:bodyPr wrap="square" rtlCol="0">
             <a:spAutoFit/>
           </a:bodyPr>
           <a:lstStyle/>
           <a:p>
-            <a:pPr marL="342900" indent="-342900">
-              <a:buFont typeface="Wingdings" pitchFamily="2" charset="2"/>
-              <a:buChar char="§"/>
-            </a:pPr>
-            <a:r>
-              <a:rPr lang="en-US" sz="2400" b="1" dirty="0">
-                <a:latin typeface="Calibri" panose="020F0502020204030204" pitchFamily="34" charset="0"/>
-                <a:cs typeface="Calibri" panose="020F0502020204030204" pitchFamily="34" charset="0"/>
-              </a:rPr>
-              <a:t>Deal with the sentences with sentimental ambiguity</a:t>
-            </a:r>
-            <a:endParaRPr lang="en-US" sz="2400" dirty="0">
-              <a:latin typeface="Calibri" panose="020F0502020204030204" pitchFamily="34" charset="0"/>
-              <a:cs typeface="Calibri" panose="020F0502020204030204" pitchFamily="34" charset="0"/>
-            </a:endParaRPr>
-          </a:p>
-        </p:txBody>
-      </p:sp>
-      <p:sp>
-        <p:nvSpPr>
-          <p:cNvPr id="9" name="文字方塊 8">
-            <a:extLst>
-              <a:ext uri="{FF2B5EF4-FFF2-40B4-BE49-F238E27FC236}">
-                <a16:creationId xmlns:a16="http://schemas.microsoft.com/office/drawing/2014/main" id="{AE73553F-4114-411F-A6A1-3291FA4B6CF8}"/>
-              </a:ext>
-            </a:extLst>
-          </p:cNvPr>
-          <p:cNvSpPr txBox="1"/>
-          <p:nvPr/>
-        </p:nvSpPr>
-        <p:spPr>
-          <a:xfrm>
-            <a:off x="11484528" y="6493241"/>
-            <a:ext cx="805343" cy="276999"/>
-          </a:xfrm>
-          <a:prstGeom prst="rect">
-            <a:avLst/>
-          </a:prstGeom>
-          <a:noFill/>
-        </p:spPr>
-        <p:txBody>
-          <a:bodyPr wrap="square" rtlCol="0">
-            <a:spAutoFit/>
-          </a:bodyPr>
-          <a:lstStyle/>
-          <a:p>
             <a:r>
               <a:rPr lang="en-US" sz="1200" dirty="0"/>
               <a:t>11</a:t>
@@ -11479,10 +11483,10 @@
       </p:sp>
       <p:pic>
         <p:nvPicPr>
-          <p:cNvPr id="7" name="Picture 6">
-            <a:extLst>
-              <a:ext uri="{FF2B5EF4-FFF2-40B4-BE49-F238E27FC236}">
-                <a16:creationId xmlns:a16="http://schemas.microsoft.com/office/drawing/2014/main" id="{C93D3C89-0C3D-1D41-9BAC-E72071BBCA8E}"/>
+          <p:cNvPr id="10" name="Picture 9">
+            <a:extLst>
+              <a:ext uri="{FF2B5EF4-FFF2-40B4-BE49-F238E27FC236}">
+                <a16:creationId xmlns:a16="http://schemas.microsoft.com/office/drawing/2014/main" id="{F784B830-3049-CB41-A98F-95816DED6B0B}"/>
               </a:ext>
             </a:extLst>
           </p:cNvPr>
@@ -11505,8 +11509,8 @@
         </p:blipFill>
         <p:spPr>
           <a:xfrm>
-            <a:off x="1377377" y="3634580"/>
-            <a:ext cx="9437245" cy="1623612"/>
+            <a:off x="1771650" y="1660995"/>
+            <a:ext cx="8648700" cy="4076700"/>
           </a:xfrm>
           <a:prstGeom prst="rect">
             <a:avLst/>
@@ -11516,7 +11520,7 @@
     </p:spTree>
     <p:extLst>
       <p:ext uri="{BB962C8B-B14F-4D97-AF65-F5344CB8AC3E}">
-        <p14:creationId xmlns:p14="http://schemas.microsoft.com/office/powerpoint/2010/main" val="3234856110"/>
+        <p14:creationId xmlns:p14="http://schemas.microsoft.com/office/powerpoint/2010/main" val="4237160290"/>
       </p:ext>
     </p:extLst>
   </p:cSld>
@@ -11581,13 +11585,8 @@
           <a:p>
             <a:r>
               <a:rPr lang="en-US" sz="2800" b="1" dirty="0"/>
-              <a:t>Improved Learning Model:  EDM-</a:t>
-            </a:r>
-            <a:r>
-              <a:rPr lang="en-US" sz="2800" b="1" dirty="0" err="1"/>
-              <a:t>RoBERTa</a:t>
-            </a:r>
-            <a:endParaRPr lang="en-US" sz="2800" b="1" dirty="0"/>
+              <a:t>Optimization: Sentimental Ambiguity</a:t>
+            </a:r>
           </a:p>
         </p:txBody>
       </p:sp>
@@ -11606,7 +11605,7 @@
         <p:spPr>
           <a:xfrm>
             <a:off x="952373" y="1568534"/>
-            <a:ext cx="6384248" cy="461665"/>
+            <a:ext cx="11102783" cy="830997"/>
           </a:xfrm>
           <a:prstGeom prst="rect">
             <a:avLst/>
@@ -11625,13 +11624,22 @@
             </a:pPr>
             <a:r>
               <a:rPr lang="en-US" sz="2400" dirty="0">
-                <a:latin typeface="Calibri" panose="020F0502020204030204" pitchFamily="34" charset="0"/>
-                <a:cs typeface="Calibri" panose="020F0502020204030204" pitchFamily="34" charset="0"/>
+                <a:latin typeface="Times New Roman" panose="02020603050405020304" pitchFamily="18" charset="0"/>
+                <a:cs typeface="Times New Roman" panose="02020603050405020304" pitchFamily="18" charset="0"/>
               </a:rPr>
-              <a:t>Choose the best-performed model: </a:t>
-            </a:r>
-            <a:r>
-              <a:rPr lang="en-US" sz="2400" b="1" dirty="0" err="1">
+              <a:t>Why using both two-dimensional and multi-dimensional sentiment analysis datasets </a:t>
+            </a:r>
+          </a:p>
+          <a:p>
+            <a:r>
+              <a:rPr lang="en-US" sz="2400" dirty="0">
+                <a:latin typeface="Times New Roman" panose="02020603050405020304" pitchFamily="18" charset="0"/>
+                <a:cs typeface="Times New Roman" panose="02020603050405020304" pitchFamily="18" charset="0"/>
+              </a:rPr>
+              <a:t>      to train EDM-</a:t>
+            </a:r>
+            <a:r>
+              <a:rPr lang="en-US" sz="2400" dirty="0" err="1">
                 <a:latin typeface="Times New Roman" panose="02020603050405020304" pitchFamily="18" charset="0"/>
                 <a:cs typeface="Times New Roman" panose="02020603050405020304" pitchFamily="18" charset="0"/>
               </a:rPr>
@@ -11639,10 +11647,10 @@
             </a:r>
             <a:r>
               <a:rPr lang="en-US" sz="2400" dirty="0">
-                <a:latin typeface="Calibri" panose="020F0502020204030204" pitchFamily="34" charset="0"/>
-                <a:cs typeface="Calibri" panose="020F0502020204030204" pitchFamily="34" charset="0"/>
+                <a:latin typeface="Times New Roman" panose="02020603050405020304" pitchFamily="18" charset="0"/>
+                <a:cs typeface="Times New Roman" panose="02020603050405020304" pitchFamily="18" charset="0"/>
               </a:rPr>
-              <a:t> </a:t>
+              <a:t> ?</a:t>
             </a:r>
           </a:p>
         </p:txBody>
@@ -11661,8 +11669,8 @@
         </p:nvSpPr>
         <p:spPr>
           <a:xfrm>
-            <a:off x="952373" y="2376449"/>
-            <a:ext cx="6661566" cy="461665"/>
+            <a:off x="1629842" y="2644168"/>
+            <a:ext cx="9422471" cy="461665"/>
           </a:xfrm>
           <a:prstGeom prst="rect">
             <a:avLst/>
@@ -11676,29 +11684,15 @@
           <a:lstStyle/>
           <a:p>
             <a:pPr marL="342900" indent="-342900">
-              <a:buFont typeface="Arial" panose="020B0604020202020204" pitchFamily="34" charset="0"/>
-              <a:buChar char="•"/>
+              <a:buFont typeface="Wingdings" pitchFamily="2" charset="2"/>
+              <a:buChar char="§"/>
             </a:pPr>
             <a:r>
               <a:rPr lang="en-US" sz="2400" b="1" dirty="0">
                 <a:latin typeface="Calibri" panose="020F0502020204030204" pitchFamily="34" charset="0"/>
                 <a:cs typeface="Calibri" panose="020F0502020204030204" pitchFamily="34" charset="0"/>
               </a:rPr>
-              <a:t>Optimize the </a:t>
-            </a:r>
-            <a:r>
-              <a:rPr lang="en-US" sz="2400" b="1" dirty="0" err="1">
-                <a:latin typeface="Calibri" panose="020F0502020204030204" pitchFamily="34" charset="0"/>
-                <a:cs typeface="Calibri" panose="020F0502020204030204" pitchFamily="34" charset="0"/>
-              </a:rPr>
-              <a:t>RoBERTa</a:t>
-            </a:r>
-            <a:r>
-              <a:rPr lang="en-US" sz="2400" b="1" dirty="0">
-                <a:latin typeface="Calibri" panose="020F0502020204030204" pitchFamily="34" charset="0"/>
-                <a:cs typeface="Calibri" panose="020F0502020204030204" pitchFamily="34" charset="0"/>
-              </a:rPr>
-              <a:t> model with Boom Layer</a:t>
+              <a:t>Deal with the sentences with sentimental ambiguity</a:t>
             </a:r>
             <a:endParaRPr lang="en-US" sz="2400" dirty="0">
               <a:latin typeface="Calibri" panose="020F0502020204030204" pitchFamily="34" charset="0"/>
@@ -11707,12 +11701,47 @@
           </a:p>
         </p:txBody>
       </p:sp>
+      <p:sp>
+        <p:nvSpPr>
+          <p:cNvPr id="9" name="文字方塊 8">
+            <a:extLst>
+              <a:ext uri="{FF2B5EF4-FFF2-40B4-BE49-F238E27FC236}">
+                <a16:creationId xmlns:a16="http://schemas.microsoft.com/office/drawing/2014/main" id="{AE73553F-4114-411F-A6A1-3291FA4B6CF8}"/>
+              </a:ext>
+            </a:extLst>
+          </p:cNvPr>
+          <p:cNvSpPr txBox="1"/>
+          <p:nvPr/>
+        </p:nvSpPr>
+        <p:spPr>
+          <a:xfrm>
+            <a:off x="11484528" y="6493241"/>
+            <a:ext cx="805343" cy="276999"/>
+          </a:xfrm>
+          <a:prstGeom prst="rect">
+            <a:avLst/>
+          </a:prstGeom>
+          <a:noFill/>
+        </p:spPr>
+        <p:txBody>
+          <a:bodyPr wrap="square" rtlCol="0">
+            <a:spAutoFit/>
+          </a:bodyPr>
+          <a:lstStyle/>
+          <a:p>
+            <a:r>
+              <a:rPr lang="en-US" sz="1200" dirty="0"/>
+              <a:t>11</a:t>
+            </a:r>
+          </a:p>
+        </p:txBody>
+      </p:sp>
       <p:pic>
         <p:nvPicPr>
           <p:cNvPr id="7" name="Picture 6">
             <a:extLst>
               <a:ext uri="{FF2B5EF4-FFF2-40B4-BE49-F238E27FC236}">
-                <a16:creationId xmlns:a16="http://schemas.microsoft.com/office/drawing/2014/main" id="{03DD16DF-6DDD-1440-BEC6-E2C893E34BBD}"/>
+                <a16:creationId xmlns:a16="http://schemas.microsoft.com/office/drawing/2014/main" id="{C93D3C89-0C3D-1D41-9BAC-E72071BBCA8E}"/>
               </a:ext>
             </a:extLst>
           </p:cNvPr>
@@ -11735,102 +11764,18 @@
         </p:blipFill>
         <p:spPr>
           <a:xfrm>
-            <a:off x="8858536" y="28820"/>
-            <a:ext cx="2516459" cy="6778202"/>
+            <a:off x="1377377" y="3634580"/>
+            <a:ext cx="9437245" cy="1623612"/>
           </a:xfrm>
           <a:prstGeom prst="rect">
             <a:avLst/>
           </a:prstGeom>
         </p:spPr>
       </p:pic>
-      <p:sp>
-        <p:nvSpPr>
-          <p:cNvPr id="14" name="TextBox 13">
-            <a:extLst>
-              <a:ext uri="{FF2B5EF4-FFF2-40B4-BE49-F238E27FC236}">
-                <a16:creationId xmlns:a16="http://schemas.microsoft.com/office/drawing/2014/main" id="{8A847973-0319-9B4F-B5CD-4F522B13162B}"/>
-              </a:ext>
-            </a:extLst>
-          </p:cNvPr>
-          <p:cNvSpPr txBox="1"/>
-          <p:nvPr/>
-        </p:nvSpPr>
-        <p:spPr>
-          <a:xfrm>
-            <a:off x="1154104" y="3882972"/>
-            <a:ext cx="8424781" cy="477054"/>
-          </a:xfrm>
-          <a:prstGeom prst="rect">
-            <a:avLst/>
-          </a:prstGeom>
-          <a:noFill/>
-        </p:spPr>
-        <p:txBody>
-          <a:bodyPr wrap="square" rtlCol="0">
-            <a:spAutoFit/>
-          </a:bodyPr>
-          <a:lstStyle/>
-          <a:p>
-            <a:r>
-              <a:rPr lang="en-US" sz="2500" b="1" dirty="0">
-                <a:latin typeface="Times New Roman" panose="02020603050405020304" pitchFamily="18" charset="0"/>
-                <a:cs typeface="Times New Roman" panose="02020603050405020304" pitchFamily="18" charset="0"/>
-              </a:rPr>
-              <a:t>Enhancing the Dependency Mechanism of </a:t>
-            </a:r>
-            <a:r>
-              <a:rPr lang="en-US" sz="2500" b="1" dirty="0" err="1">
-                <a:latin typeface="Times New Roman" panose="02020603050405020304" pitchFamily="18" charset="0"/>
-                <a:cs typeface="Times New Roman" panose="02020603050405020304" pitchFamily="18" charset="0"/>
-              </a:rPr>
-              <a:t>RoBERTa</a:t>
-            </a:r>
-            <a:endParaRPr lang="en-US" sz="2500" dirty="0">
-              <a:latin typeface="Times New Roman" panose="02020603050405020304" pitchFamily="18" charset="0"/>
-              <a:cs typeface="Times New Roman" panose="02020603050405020304" pitchFamily="18" charset="0"/>
-            </a:endParaRPr>
-          </a:p>
-        </p:txBody>
-      </p:sp>
-      <p:sp>
-        <p:nvSpPr>
-          <p:cNvPr id="8" name="文字方塊 7">
-            <a:extLst>
-              <a:ext uri="{FF2B5EF4-FFF2-40B4-BE49-F238E27FC236}">
-                <a16:creationId xmlns:a16="http://schemas.microsoft.com/office/drawing/2014/main" id="{CA9DE776-E94C-47BA-B7C4-BC7427DC5373}"/>
-              </a:ext>
-            </a:extLst>
-          </p:cNvPr>
-          <p:cNvSpPr txBox="1"/>
-          <p:nvPr/>
-        </p:nvSpPr>
-        <p:spPr>
-          <a:xfrm>
-            <a:off x="11484528" y="6493241"/>
-            <a:ext cx="805343" cy="276999"/>
-          </a:xfrm>
-          <a:prstGeom prst="rect">
-            <a:avLst/>
-          </a:prstGeom>
-          <a:noFill/>
-        </p:spPr>
-        <p:txBody>
-          <a:bodyPr wrap="square" rtlCol="0">
-            <a:spAutoFit/>
-          </a:bodyPr>
-          <a:lstStyle/>
-          <a:p>
-            <a:r>
-              <a:rPr lang="en-US" sz="1200" dirty="0"/>
-              <a:t>12</a:t>
-            </a:r>
-          </a:p>
-        </p:txBody>
-      </p:sp>
     </p:spTree>
     <p:extLst>
       <p:ext uri="{BB962C8B-B14F-4D97-AF65-F5344CB8AC3E}">
-        <p14:creationId xmlns:p14="http://schemas.microsoft.com/office/powerpoint/2010/main" val="2301789250"/>
+        <p14:creationId xmlns:p14="http://schemas.microsoft.com/office/powerpoint/2010/main" val="3234856110"/>
       </p:ext>
     </p:extLst>
   </p:cSld>
@@ -11895,8 +11840,129 @@
           <a:p>
             <a:r>
               <a:rPr lang="en-US" sz="2800" b="1" dirty="0"/>
-              <a:t>Optimization: Statistics</a:t>
-            </a:r>
+              <a:t>Improved Learning Model:  EDM-</a:t>
+            </a:r>
+            <a:r>
+              <a:rPr lang="en-US" sz="2800" b="1" dirty="0" err="1"/>
+              <a:t>RoBERTa</a:t>
+            </a:r>
+            <a:endParaRPr lang="en-US" sz="2800" b="1" dirty="0"/>
+          </a:p>
+        </p:txBody>
+      </p:sp>
+      <p:sp>
+        <p:nvSpPr>
+          <p:cNvPr id="5" name="TextBox 4">
+            <a:extLst>
+              <a:ext uri="{FF2B5EF4-FFF2-40B4-BE49-F238E27FC236}">
+                <a16:creationId xmlns:a16="http://schemas.microsoft.com/office/drawing/2014/main" id="{0F0A5022-A9F2-4143-B927-A449071B04E6}"/>
+              </a:ext>
+            </a:extLst>
+          </p:cNvPr>
+          <p:cNvSpPr txBox="1"/>
+          <p:nvPr/>
+        </p:nvSpPr>
+        <p:spPr>
+          <a:xfrm>
+            <a:off x="952373" y="1568534"/>
+            <a:ext cx="6384248" cy="461665"/>
+          </a:xfrm>
+          <a:prstGeom prst="rect">
+            <a:avLst/>
+          </a:prstGeom>
+          <a:noFill/>
+        </p:spPr>
+        <p:txBody>
+          <a:bodyPr wrap="none" rtlCol="0">
+            <a:spAutoFit/>
+          </a:bodyPr>
+          <a:lstStyle/>
+          <a:p>
+            <a:pPr marL="342900" indent="-342900">
+              <a:buFont typeface="Arial" panose="020B0604020202020204" pitchFamily="34" charset="0"/>
+              <a:buChar char="•"/>
+            </a:pPr>
+            <a:r>
+              <a:rPr lang="en-US" sz="2400" dirty="0">
+                <a:latin typeface="Calibri" panose="020F0502020204030204" pitchFamily="34" charset="0"/>
+                <a:cs typeface="Calibri" panose="020F0502020204030204" pitchFamily="34" charset="0"/>
+              </a:rPr>
+              <a:t>Choose the best-performed model: </a:t>
+            </a:r>
+            <a:r>
+              <a:rPr lang="en-US" sz="2400" b="1" dirty="0" err="1">
+                <a:latin typeface="Times New Roman" panose="02020603050405020304" pitchFamily="18" charset="0"/>
+                <a:cs typeface="Times New Roman" panose="02020603050405020304" pitchFamily="18" charset="0"/>
+              </a:rPr>
+              <a:t>RoBERTa</a:t>
+            </a:r>
+            <a:r>
+              <a:rPr lang="en-US" sz="2400" dirty="0">
+                <a:latin typeface="Calibri" panose="020F0502020204030204" pitchFamily="34" charset="0"/>
+                <a:cs typeface="Calibri" panose="020F0502020204030204" pitchFamily="34" charset="0"/>
+              </a:rPr>
+              <a:t> </a:t>
+            </a:r>
+          </a:p>
+        </p:txBody>
+      </p:sp>
+      <p:sp>
+        <p:nvSpPr>
+          <p:cNvPr id="6" name="TextBox 5">
+            <a:extLst>
+              <a:ext uri="{FF2B5EF4-FFF2-40B4-BE49-F238E27FC236}">
+                <a16:creationId xmlns:a16="http://schemas.microsoft.com/office/drawing/2014/main" id="{F0562E0E-EEBC-9146-9A8A-71CE457A66D7}"/>
+              </a:ext>
+            </a:extLst>
+          </p:cNvPr>
+          <p:cNvSpPr txBox="1"/>
+          <p:nvPr/>
+        </p:nvSpPr>
+        <p:spPr>
+          <a:xfrm>
+            <a:off x="952373" y="2376449"/>
+            <a:ext cx="6661566" cy="461665"/>
+          </a:xfrm>
+          <a:prstGeom prst="rect">
+            <a:avLst/>
+          </a:prstGeom>
+          <a:noFill/>
+        </p:spPr>
+        <p:txBody>
+          <a:bodyPr wrap="square" rtlCol="0">
+            <a:spAutoFit/>
+          </a:bodyPr>
+          <a:lstStyle/>
+          <a:p>
+            <a:pPr marL="342900" indent="-342900">
+              <a:buFont typeface="Arial" panose="020B0604020202020204" pitchFamily="34" charset="0"/>
+              <a:buChar char="•"/>
+            </a:pPr>
+            <a:r>
+              <a:rPr lang="en-US" sz="2400" b="1" dirty="0">
+                <a:latin typeface="Calibri" panose="020F0502020204030204" pitchFamily="34" charset="0"/>
+                <a:cs typeface="Calibri" panose="020F0502020204030204" pitchFamily="34" charset="0"/>
+              </a:rPr>
+              <a:t>Optimize the </a:t>
+            </a:r>
+            <a:r>
+              <a:rPr lang="en-US" sz="2400" b="1" dirty="0" err="1">
+                <a:latin typeface="Calibri" panose="020F0502020204030204" pitchFamily="34" charset="0"/>
+                <a:cs typeface="Calibri" panose="020F0502020204030204" pitchFamily="34" charset="0"/>
+              </a:rPr>
+              <a:t>RoBERTa</a:t>
+            </a:r>
+            <a:r>
+              <a:rPr lang="en-US" sz="2400" b="1" dirty="0">
+                <a:latin typeface="Calibri" panose="020F0502020204030204" pitchFamily="34" charset="0"/>
+                <a:cs typeface="Calibri" panose="020F0502020204030204" pitchFamily="34" charset="0"/>
+              </a:rPr>
+              <a:t> model with Boom Layer</a:t>
+            </a:r>
+            <a:endParaRPr lang="en-US" sz="2400" dirty="0">
+              <a:latin typeface="Calibri" panose="020F0502020204030204" pitchFamily="34" charset="0"/>
+              <a:cs typeface="Calibri" panose="020F0502020204030204" pitchFamily="34" charset="0"/>
+            </a:endParaRPr>
           </a:p>
         </p:txBody>
       </p:sp>
@@ -11905,7 +11971,7 @@
           <p:cNvPr id="7" name="Picture 6">
             <a:extLst>
               <a:ext uri="{FF2B5EF4-FFF2-40B4-BE49-F238E27FC236}">
-                <a16:creationId xmlns:a16="http://schemas.microsoft.com/office/drawing/2014/main" id="{3EA49A00-B665-BB4E-8414-F14A25C37FAF}"/>
+                <a16:creationId xmlns:a16="http://schemas.microsoft.com/office/drawing/2014/main" id="{03DD16DF-6DDD-1440-BEC6-E2C893E34BBD}"/>
               </a:ext>
             </a:extLst>
           </p:cNvPr>
@@ -11928,56 +11994,20 @@
         </p:blipFill>
         <p:spPr>
           <a:xfrm>
-            <a:off x="817123" y="1479649"/>
-            <a:ext cx="8716836" cy="2237989"/>
+            <a:off x="8858536" y="28820"/>
+            <a:ext cx="2516459" cy="6778202"/>
           </a:xfrm>
           <a:prstGeom prst="rect">
             <a:avLst/>
           </a:prstGeom>
         </p:spPr>
       </p:pic>
-      <p:pic>
-        <p:nvPicPr>
-          <p:cNvPr id="9" name="Picture 8">
-            <a:extLst>
-              <a:ext uri="{FF2B5EF4-FFF2-40B4-BE49-F238E27FC236}">
-                <a16:creationId xmlns:a16="http://schemas.microsoft.com/office/drawing/2014/main" id="{039B4765-42F5-9541-BC34-8ACF710B3366}"/>
-              </a:ext>
-            </a:extLst>
-          </p:cNvPr>
-          <p:cNvPicPr>
-            <a:picLocks noChangeAspect="1"/>
-          </p:cNvPicPr>
-          <p:nvPr/>
-        </p:nvPicPr>
-        <p:blipFill>
-          <a:blip r:embed="rId4">
-            <a:extLst>
-              <a:ext uri="{28A0092B-C50C-407E-A947-70E740481C1C}">
-                <a14:useLocalDpi xmlns:a14="http://schemas.microsoft.com/office/drawing/2010/main" val="0"/>
-              </a:ext>
-            </a:extLst>
-          </a:blip>
-          <a:stretch>
-            <a:fillRect/>
-          </a:stretch>
-        </p:blipFill>
-        <p:spPr>
-          <a:xfrm>
-            <a:off x="2869660" y="4330567"/>
-            <a:ext cx="9015380" cy="2237989"/>
-          </a:xfrm>
-          <a:prstGeom prst="rect">
-            <a:avLst/>
-          </a:prstGeom>
-        </p:spPr>
-      </p:pic>
-      <p:sp>
-        <p:nvSpPr>
-          <p:cNvPr id="5" name="文字方塊 4">
-            <a:extLst>
-              <a:ext uri="{FF2B5EF4-FFF2-40B4-BE49-F238E27FC236}">
-                <a16:creationId xmlns:a16="http://schemas.microsoft.com/office/drawing/2014/main" id="{41506C6F-93EE-49C5-88F9-1B83EB3738F0}"/>
+      <p:sp>
+        <p:nvSpPr>
+          <p:cNvPr id="14" name="TextBox 13">
+            <a:extLst>
+              <a:ext uri="{FF2B5EF4-FFF2-40B4-BE49-F238E27FC236}">
+                <a16:creationId xmlns:a16="http://schemas.microsoft.com/office/drawing/2014/main" id="{8A847973-0319-9B4F-B5CD-4F522B13162B}"/>
               </a:ext>
             </a:extLst>
           </p:cNvPr>
@@ -11986,8 +12016,8 @@
         </p:nvSpPr>
         <p:spPr>
           <a:xfrm>
-            <a:off x="11484528" y="6493241"/>
-            <a:ext cx="805343" cy="276999"/>
+            <a:off x="1154104" y="3882972"/>
+            <a:ext cx="8424781" cy="477054"/>
           </a:xfrm>
           <a:prstGeom prst="rect">
             <a:avLst/>
@@ -12001,8 +12031,57 @@
           <a:lstStyle/>
           <a:p>
             <a:r>
+              <a:rPr lang="en-US" sz="2500" b="1" dirty="0">
+                <a:latin typeface="Times New Roman" panose="02020603050405020304" pitchFamily="18" charset="0"/>
+                <a:cs typeface="Times New Roman" panose="02020603050405020304" pitchFamily="18" charset="0"/>
+              </a:rPr>
+              <a:t>Enhancing the Dependency Mechanism of </a:t>
+            </a:r>
+            <a:r>
+              <a:rPr lang="en-US" sz="2500" b="1" dirty="0" err="1">
+                <a:latin typeface="Times New Roman" panose="02020603050405020304" pitchFamily="18" charset="0"/>
+                <a:cs typeface="Times New Roman" panose="02020603050405020304" pitchFamily="18" charset="0"/>
+              </a:rPr>
+              <a:t>RoBERTa</a:t>
+            </a:r>
+            <a:endParaRPr lang="en-US" sz="2500" dirty="0">
+              <a:latin typeface="Times New Roman" panose="02020603050405020304" pitchFamily="18" charset="0"/>
+              <a:cs typeface="Times New Roman" panose="02020603050405020304" pitchFamily="18" charset="0"/>
+            </a:endParaRPr>
+          </a:p>
+        </p:txBody>
+      </p:sp>
+      <p:sp>
+        <p:nvSpPr>
+          <p:cNvPr id="8" name="文字方塊 7">
+            <a:extLst>
+              <a:ext uri="{FF2B5EF4-FFF2-40B4-BE49-F238E27FC236}">
+                <a16:creationId xmlns:a16="http://schemas.microsoft.com/office/drawing/2014/main" id="{CA9DE776-E94C-47BA-B7C4-BC7427DC5373}"/>
+              </a:ext>
+            </a:extLst>
+          </p:cNvPr>
+          <p:cNvSpPr txBox="1"/>
+          <p:nvPr/>
+        </p:nvSpPr>
+        <p:spPr>
+          <a:xfrm>
+            <a:off x="11484528" y="6493241"/>
+            <a:ext cx="805343" cy="276999"/>
+          </a:xfrm>
+          <a:prstGeom prst="rect">
+            <a:avLst/>
+          </a:prstGeom>
+          <a:noFill/>
+        </p:spPr>
+        <p:txBody>
+          <a:bodyPr wrap="square" rtlCol="0">
+            <a:spAutoFit/>
+          </a:bodyPr>
+          <a:lstStyle/>
+          <a:p>
+            <a:r>
               <a:rPr lang="en-US" sz="1200" dirty="0"/>
-              <a:t>13</a:t>
+              <a:t>12</a:t>
             </a:r>
           </a:p>
         </p:txBody>
@@ -12010,7 +12089,7 @@
     </p:spTree>
     <p:extLst>
       <p:ext uri="{BB962C8B-B14F-4D97-AF65-F5344CB8AC3E}">
-        <p14:creationId xmlns:p14="http://schemas.microsoft.com/office/powerpoint/2010/main" val="1987724706"/>
+        <p14:creationId xmlns:p14="http://schemas.microsoft.com/office/powerpoint/2010/main" val="2301789250"/>
       </p:ext>
     </p:extLst>
   </p:cSld>
@@ -12060,7 +12139,7 @@
         <p:spPr>
           <a:xfrm>
             <a:off x="616225" y="569844"/>
-            <a:ext cx="11008328" cy="523220"/>
+            <a:ext cx="9500541" cy="523220"/>
           </a:xfrm>
           <a:prstGeom prst="rect">
             <a:avLst/>
@@ -12075,30 +12154,17 @@
           <a:p>
             <a:r>
               <a:rPr lang="en-US" sz="2800" b="1" dirty="0"/>
-              <a:t>EDM-</a:t>
-            </a:r>
-            <a:r>
-              <a:rPr lang="en-US" sz="2800" b="1" dirty="0" err="1"/>
-              <a:t>RoBERTa</a:t>
-            </a:r>
-            <a:r>
-              <a:rPr lang="en-US" sz="2800" b="1" dirty="0"/>
-              <a:t>: Enhancing the Dependency Structure of </a:t>
-            </a:r>
-            <a:r>
-              <a:rPr lang="en-US" sz="2800" b="1" dirty="0" err="1"/>
-              <a:t>RoBERTa</a:t>
-            </a:r>
-            <a:endParaRPr lang="en-US" sz="2800" b="1" dirty="0"/>
+              <a:t>Optimization: Statistics</a:t>
+            </a:r>
           </a:p>
         </p:txBody>
       </p:sp>
       <p:pic>
         <p:nvPicPr>
-          <p:cNvPr id="4" name="Picture 3">
-            <a:extLst>
-              <a:ext uri="{FF2B5EF4-FFF2-40B4-BE49-F238E27FC236}">
-                <a16:creationId xmlns:a16="http://schemas.microsoft.com/office/drawing/2014/main" id="{01A05A17-4134-CB42-BA18-D7A967D0F2DB}"/>
+          <p:cNvPr id="7" name="Picture 6">
+            <a:extLst>
+              <a:ext uri="{FF2B5EF4-FFF2-40B4-BE49-F238E27FC236}">
+                <a16:creationId xmlns:a16="http://schemas.microsoft.com/office/drawing/2014/main" id="{3EA49A00-B665-BB4E-8414-F14A25C37FAF}"/>
               </a:ext>
             </a:extLst>
           </p:cNvPr>
@@ -12121,20 +12187,56 @@
         </p:blipFill>
         <p:spPr>
           <a:xfrm>
-            <a:off x="1589975" y="2907884"/>
-            <a:ext cx="9012050" cy="1757124"/>
+            <a:off x="817123" y="1479649"/>
+            <a:ext cx="8716836" cy="2237989"/>
           </a:xfrm>
           <a:prstGeom prst="rect">
             <a:avLst/>
           </a:prstGeom>
         </p:spPr>
       </p:pic>
-      <p:sp>
-        <p:nvSpPr>
-          <p:cNvPr id="5" name="TextBox 4">
-            <a:extLst>
-              <a:ext uri="{FF2B5EF4-FFF2-40B4-BE49-F238E27FC236}">
-                <a16:creationId xmlns:a16="http://schemas.microsoft.com/office/drawing/2014/main" id="{7143B78D-B6B3-474D-B531-66EC4DED1CA1}"/>
+      <p:pic>
+        <p:nvPicPr>
+          <p:cNvPr id="9" name="Picture 8">
+            <a:extLst>
+              <a:ext uri="{FF2B5EF4-FFF2-40B4-BE49-F238E27FC236}">
+                <a16:creationId xmlns:a16="http://schemas.microsoft.com/office/drawing/2014/main" id="{039B4765-42F5-9541-BC34-8ACF710B3366}"/>
+              </a:ext>
+            </a:extLst>
+          </p:cNvPr>
+          <p:cNvPicPr>
+            <a:picLocks noChangeAspect="1"/>
+          </p:cNvPicPr>
+          <p:nvPr/>
+        </p:nvPicPr>
+        <p:blipFill>
+          <a:blip r:embed="rId4">
+            <a:extLst>
+              <a:ext uri="{28A0092B-C50C-407E-A947-70E740481C1C}">
+                <a14:useLocalDpi xmlns:a14="http://schemas.microsoft.com/office/drawing/2010/main" val="0"/>
+              </a:ext>
+            </a:extLst>
+          </a:blip>
+          <a:stretch>
+            <a:fillRect/>
+          </a:stretch>
+        </p:blipFill>
+        <p:spPr>
+          <a:xfrm>
+            <a:off x="2869660" y="4330567"/>
+            <a:ext cx="9015380" cy="2237989"/>
+          </a:xfrm>
+          <a:prstGeom prst="rect">
+            <a:avLst/>
+          </a:prstGeom>
+        </p:spPr>
+      </p:pic>
+      <p:sp>
+        <p:nvSpPr>
+          <p:cNvPr id="5" name="文字方塊 4">
+            <a:extLst>
+              <a:ext uri="{FF2B5EF4-FFF2-40B4-BE49-F238E27FC236}">
+                <a16:creationId xmlns:a16="http://schemas.microsoft.com/office/drawing/2014/main" id="{41506C6F-93EE-49C5-88F9-1B83EB3738F0}"/>
               </a:ext>
             </a:extLst>
           </p:cNvPr>
@@ -12143,8 +12245,8 @@
         </p:nvSpPr>
         <p:spPr>
           <a:xfrm>
-            <a:off x="1322962" y="1780162"/>
-            <a:ext cx="5985293" cy="477054"/>
+            <a:off x="11484528" y="6493241"/>
+            <a:ext cx="805343" cy="276999"/>
           </a:xfrm>
           <a:prstGeom prst="rect">
             <a:avLst/>
@@ -12152,50 +12254,6 @@
           <a:noFill/>
         </p:spPr>
         <p:txBody>
-          <a:bodyPr wrap="none" rtlCol="0">
-            <a:spAutoFit/>
-          </a:bodyPr>
-          <a:lstStyle/>
-          <a:p>
-            <a:pPr marL="342900" indent="-342900">
-              <a:buFont typeface="Arial" panose="020B0604020202020204" pitchFamily="34" charset="0"/>
-              <a:buChar char="•"/>
-            </a:pPr>
-            <a:r>
-              <a:rPr lang="en-US" sz="2500" b="1" dirty="0"/>
-              <a:t>Detailed parameters of EDM-</a:t>
-            </a:r>
-            <a:r>
-              <a:rPr lang="en-US" sz="2500" b="1" dirty="0" err="1"/>
-              <a:t>RoBERTa</a:t>
-            </a:r>
-            <a:endParaRPr lang="en-US" sz="2500" b="1" dirty="0"/>
-          </a:p>
-        </p:txBody>
-      </p:sp>
-      <p:sp>
-        <p:nvSpPr>
-          <p:cNvPr id="6" name="文字方塊 5">
-            <a:extLst>
-              <a:ext uri="{FF2B5EF4-FFF2-40B4-BE49-F238E27FC236}">
-                <a16:creationId xmlns:a16="http://schemas.microsoft.com/office/drawing/2014/main" id="{F1369C88-80E7-407E-80FA-2D871FE3345B}"/>
-              </a:ext>
-            </a:extLst>
-          </p:cNvPr>
-          <p:cNvSpPr txBox="1"/>
-          <p:nvPr/>
-        </p:nvSpPr>
-        <p:spPr>
-          <a:xfrm>
-            <a:off x="11484528" y="6493241"/>
-            <a:ext cx="805343" cy="276999"/>
-          </a:xfrm>
-          <a:prstGeom prst="rect">
-            <a:avLst/>
-          </a:prstGeom>
-          <a:noFill/>
-        </p:spPr>
-        <p:txBody>
           <a:bodyPr wrap="square" rtlCol="0">
             <a:spAutoFit/>
           </a:bodyPr>
@@ -12203,7 +12261,7 @@
           <a:p>
             <a:r>
               <a:rPr lang="en-US" sz="1200" dirty="0"/>
-              <a:t>14</a:t>
+              <a:t>13</a:t>
             </a:r>
           </a:p>
         </p:txBody>
@@ -12211,7 +12269,7 @@
     </p:spTree>
     <p:extLst>
       <p:ext uri="{BB962C8B-B14F-4D97-AF65-F5344CB8AC3E}">
-        <p14:creationId xmlns:p14="http://schemas.microsoft.com/office/powerpoint/2010/main" val="266460702"/>
+        <p14:creationId xmlns:p14="http://schemas.microsoft.com/office/powerpoint/2010/main" val="1987724706"/>
       </p:ext>
     </p:extLst>
   </p:cSld>
@@ -12464,6 +12522,207 @@
           <a:p>
             <a:r>
               <a:rPr lang="en-US" sz="2800" b="1" dirty="0"/>
+              <a:t>EDM-</a:t>
+            </a:r>
+            <a:r>
+              <a:rPr lang="en-US" sz="2800" b="1" dirty="0" err="1"/>
+              <a:t>RoBERTa</a:t>
+            </a:r>
+            <a:r>
+              <a:rPr lang="en-US" sz="2800" b="1" dirty="0"/>
+              <a:t>: Enhancing the Dependency Structure of </a:t>
+            </a:r>
+            <a:r>
+              <a:rPr lang="en-US" sz="2800" b="1" dirty="0" err="1"/>
+              <a:t>RoBERTa</a:t>
+            </a:r>
+            <a:endParaRPr lang="en-US" sz="2800" b="1" dirty="0"/>
+          </a:p>
+        </p:txBody>
+      </p:sp>
+      <p:pic>
+        <p:nvPicPr>
+          <p:cNvPr id="4" name="Picture 3">
+            <a:extLst>
+              <a:ext uri="{FF2B5EF4-FFF2-40B4-BE49-F238E27FC236}">
+                <a16:creationId xmlns:a16="http://schemas.microsoft.com/office/drawing/2014/main" id="{01A05A17-4134-CB42-BA18-D7A967D0F2DB}"/>
+              </a:ext>
+            </a:extLst>
+          </p:cNvPr>
+          <p:cNvPicPr>
+            <a:picLocks noChangeAspect="1"/>
+          </p:cNvPicPr>
+          <p:nvPr/>
+        </p:nvPicPr>
+        <p:blipFill>
+          <a:blip r:embed="rId3">
+            <a:extLst>
+              <a:ext uri="{28A0092B-C50C-407E-A947-70E740481C1C}">
+                <a14:useLocalDpi xmlns:a14="http://schemas.microsoft.com/office/drawing/2010/main" val="0"/>
+              </a:ext>
+            </a:extLst>
+          </a:blip>
+          <a:stretch>
+            <a:fillRect/>
+          </a:stretch>
+        </p:blipFill>
+        <p:spPr>
+          <a:xfrm>
+            <a:off x="1589975" y="2907884"/>
+            <a:ext cx="9012050" cy="1757124"/>
+          </a:xfrm>
+          <a:prstGeom prst="rect">
+            <a:avLst/>
+          </a:prstGeom>
+        </p:spPr>
+      </p:pic>
+      <p:sp>
+        <p:nvSpPr>
+          <p:cNvPr id="5" name="TextBox 4">
+            <a:extLst>
+              <a:ext uri="{FF2B5EF4-FFF2-40B4-BE49-F238E27FC236}">
+                <a16:creationId xmlns:a16="http://schemas.microsoft.com/office/drawing/2014/main" id="{7143B78D-B6B3-474D-B531-66EC4DED1CA1}"/>
+              </a:ext>
+            </a:extLst>
+          </p:cNvPr>
+          <p:cNvSpPr txBox="1"/>
+          <p:nvPr/>
+        </p:nvSpPr>
+        <p:spPr>
+          <a:xfrm>
+            <a:off x="1322962" y="1780162"/>
+            <a:ext cx="5985293" cy="477054"/>
+          </a:xfrm>
+          <a:prstGeom prst="rect">
+            <a:avLst/>
+          </a:prstGeom>
+          <a:noFill/>
+        </p:spPr>
+        <p:txBody>
+          <a:bodyPr wrap="none" rtlCol="0">
+            <a:spAutoFit/>
+          </a:bodyPr>
+          <a:lstStyle/>
+          <a:p>
+            <a:pPr marL="342900" indent="-342900">
+              <a:buFont typeface="Arial" panose="020B0604020202020204" pitchFamily="34" charset="0"/>
+              <a:buChar char="•"/>
+            </a:pPr>
+            <a:r>
+              <a:rPr lang="en-US" sz="2500" b="1" dirty="0"/>
+              <a:t>Detailed parameters of EDM-</a:t>
+            </a:r>
+            <a:r>
+              <a:rPr lang="en-US" sz="2500" b="1" dirty="0" err="1"/>
+              <a:t>RoBERTa</a:t>
+            </a:r>
+            <a:endParaRPr lang="en-US" sz="2500" b="1" dirty="0"/>
+          </a:p>
+        </p:txBody>
+      </p:sp>
+      <p:sp>
+        <p:nvSpPr>
+          <p:cNvPr id="6" name="文字方塊 5">
+            <a:extLst>
+              <a:ext uri="{FF2B5EF4-FFF2-40B4-BE49-F238E27FC236}">
+                <a16:creationId xmlns:a16="http://schemas.microsoft.com/office/drawing/2014/main" id="{F1369C88-80E7-407E-80FA-2D871FE3345B}"/>
+              </a:ext>
+            </a:extLst>
+          </p:cNvPr>
+          <p:cNvSpPr txBox="1"/>
+          <p:nvPr/>
+        </p:nvSpPr>
+        <p:spPr>
+          <a:xfrm>
+            <a:off x="11484528" y="6493241"/>
+            <a:ext cx="805343" cy="276999"/>
+          </a:xfrm>
+          <a:prstGeom prst="rect">
+            <a:avLst/>
+          </a:prstGeom>
+          <a:noFill/>
+        </p:spPr>
+        <p:txBody>
+          <a:bodyPr wrap="square" rtlCol="0">
+            <a:spAutoFit/>
+          </a:bodyPr>
+          <a:lstStyle/>
+          <a:p>
+            <a:r>
+              <a:rPr lang="en-US" sz="1200" dirty="0"/>
+              <a:t>14</a:t>
+            </a:r>
+          </a:p>
+        </p:txBody>
+      </p:sp>
+    </p:spTree>
+    <p:extLst>
+      <p:ext uri="{BB962C8B-B14F-4D97-AF65-F5344CB8AC3E}">
+        <p14:creationId xmlns:p14="http://schemas.microsoft.com/office/powerpoint/2010/main" val="266460702"/>
+      </p:ext>
+    </p:extLst>
+  </p:cSld>
+  <p:clrMapOvr>
+    <a:masterClrMapping/>
+  </p:clrMapOvr>
+</p:sld>
+</file>
+
+<file path=ppt/slides/slide21.xml><?xml version="1.0" encoding="utf-8"?>
+<p:sld xmlns:a="http://schemas.openxmlformats.org/drawingml/2006/main" xmlns:r="http://schemas.openxmlformats.org/officeDocument/2006/relationships" xmlns:p="http://schemas.openxmlformats.org/presentationml/2006/main">
+  <p:cSld>
+    <p:bg>
+      <p:bgPr>
+        <a:solidFill>
+          <a:schemeClr val="bg1"/>
+        </a:solidFill>
+        <a:effectLst/>
+      </p:bgPr>
+    </p:bg>
+    <p:spTree>
+      <p:nvGrpSpPr>
+        <p:cNvPr id="1" name=""/>
+        <p:cNvGrpSpPr/>
+        <p:nvPr/>
+      </p:nvGrpSpPr>
+      <p:grpSpPr>
+        <a:xfrm>
+          <a:off x="0" y="0"/>
+          <a:ext cx="0" cy="0"/>
+          <a:chOff x="0" y="0"/>
+          <a:chExt cx="0" cy="0"/>
+        </a:xfrm>
+      </p:grpSpPr>
+      <p:sp>
+        <p:nvSpPr>
+          <p:cNvPr id="2" name="文字方塊 9">
+            <a:extLst>
+              <a:ext uri="{FF2B5EF4-FFF2-40B4-BE49-F238E27FC236}">
+                <a16:creationId xmlns:a16="http://schemas.microsoft.com/office/drawing/2014/main" id="{1472181F-E1C9-5B4B-AC5F-B6ABF9C576B7}"/>
+              </a:ext>
+            </a:extLst>
+          </p:cNvPr>
+          <p:cNvSpPr txBox="1"/>
+          <p:nvPr/>
+        </p:nvSpPr>
+        <p:spPr>
+          <a:xfrm>
+            <a:off x="616225" y="569844"/>
+            <a:ext cx="11008328" cy="523220"/>
+          </a:xfrm>
+          <a:prstGeom prst="rect">
+            <a:avLst/>
+          </a:prstGeom>
+          <a:noFill/>
+        </p:spPr>
+        <p:txBody>
+          <a:bodyPr wrap="square" rtlCol="0">
+            <a:spAutoFit/>
+          </a:bodyPr>
+          <a:lstStyle/>
+          <a:p>
+            <a:r>
+              <a:rPr lang="en-US" sz="2800" b="1" dirty="0"/>
               <a:t>Runtimes &amp; Environments</a:t>
             </a:r>
           </a:p>
@@ -12553,7 +12812,7 @@
 </p:sld>
 </file>
 
-<file path=ppt/slides/slide21.xml><?xml version="1.0" encoding="utf-8"?>
+<file path=ppt/slides/slide22.xml><?xml version="1.0" encoding="utf-8"?>
 <p:sld xmlns:a="http://schemas.openxmlformats.org/drawingml/2006/main" xmlns:r="http://schemas.openxmlformats.org/officeDocument/2006/relationships" xmlns:p="http://schemas.openxmlformats.org/presentationml/2006/main">
   <p:cSld>
     <p:bg>
@@ -15893,6 +16152,15 @@
 </file>
 
 <file path=customXml/item1.xml><?xml version="1.0" encoding="utf-8"?>
+<p:properties xmlns:p="http://schemas.microsoft.com/office/2006/metadata/properties" xmlns:xsi="http://www.w3.org/2001/XMLSchema-instance" xmlns:pc="http://schemas.microsoft.com/office/infopath/2007/PartnerControls">
+  <documentManagement>
+    <_ip_UnifiedCompliancePolicyUIAction xmlns="http://schemas.microsoft.com/sharepoint/v3" xsi:nil="true"/>
+    <_ip_UnifiedCompliancePolicyProperties xmlns="http://schemas.microsoft.com/sharepoint/v3" xsi:nil="true"/>
+  </documentManagement>
+</p:properties>
+</file>
+
+<file path=customXml/item2.xml><?xml version="1.0" encoding="utf-8"?>
 <ct:contentTypeSchema xmlns:ct="http://schemas.microsoft.com/office/2006/metadata/contentType" xmlns:ma="http://schemas.microsoft.com/office/2006/metadata/properties/metaAttributes" ct:_="" ma:_="" ma:contentTypeName="Document" ma:contentTypeID="0x010100DEEA25CC0A0AC24199CDC46C25B8B0BC" ma:contentTypeVersion="9" ma:contentTypeDescription="Create a new document." ma:contentTypeScope="" ma:versionID="76e25e1730b4532ab1d5e5b131a96a5a">
   <xsd:schema xmlns:xsd="http://www.w3.org/2001/XMLSchema" xmlns:xs="http://www.w3.org/2001/XMLSchema" xmlns:p="http://schemas.microsoft.com/office/2006/metadata/properties" xmlns:ns1="http://schemas.microsoft.com/sharepoint/v3" xmlns:ns2="6dc4bcd6-49db-4c07-9060-8acfc67cef9f" xmlns:ns3="fb0879af-3eba-417a-a55a-ffe6dcd6ca77" targetNamespace="http://schemas.microsoft.com/office/2006/metadata/properties" ma:root="true" ma:fieldsID="ad1e9281a84c4949647088091c718de3" ns1:_="" ns2:_="" ns3:_="">
     <xsd:import namespace="http://schemas.microsoft.com/sharepoint/v3"/>
@@ -16094,16 +16362,25 @@
 </ct:contentTypeSchema>
 </file>
 
-<file path=customXml/item2.xml><?xml version="1.0" encoding="utf-8"?>
-<p:properties xmlns:p="http://schemas.microsoft.com/office/2006/metadata/properties" xmlns:xsi="http://www.w3.org/2001/XMLSchema-instance" xmlns:pc="http://schemas.microsoft.com/office/infopath/2007/PartnerControls">
-  <documentManagement>
-    <_ip_UnifiedCompliancePolicyUIAction xmlns="http://schemas.microsoft.com/sharepoint/v3" xsi:nil="true"/>
-    <_ip_UnifiedCompliancePolicyProperties xmlns="http://schemas.microsoft.com/sharepoint/v3" xsi:nil="true"/>
-  </documentManagement>
-</p:properties>
+<file path=customXml/itemProps1.xml><?xml version="1.0" encoding="utf-8"?>
+<ds:datastoreItem xmlns:ds="http://schemas.openxmlformats.org/officeDocument/2006/customXml" ds:itemID="{8FB61CFE-D4DA-4753-A9A5-D482B9609A35}">
+  <ds:schemaRefs>
+    <ds:schemaRef ds:uri="http://schemas.microsoft.com/office/2006/metadata/properties"/>
+    <ds:schemaRef ds:uri="http://schemas.openxmlformats.org/package/2006/metadata/core-properties"/>
+    <ds:schemaRef ds:uri="http://purl.org/dc/elements/1.1/"/>
+    <ds:schemaRef ds:uri="http://schemas.microsoft.com/office/2006/documentManagement/types"/>
+    <ds:schemaRef ds:uri="http://schemas.microsoft.com/sharepoint/v3"/>
+    <ds:schemaRef ds:uri="http://purl.org/dc/terms/"/>
+    <ds:schemaRef ds:uri="http://schemas.microsoft.com/office/infopath/2007/PartnerControls"/>
+    <ds:schemaRef ds:uri="http://www.w3.org/XML/1998/namespace"/>
+    <ds:schemaRef ds:uri="fb0879af-3eba-417a-a55a-ffe6dcd6ca77"/>
+    <ds:schemaRef ds:uri="6dc4bcd6-49db-4c07-9060-8acfc67cef9f"/>
+    <ds:schemaRef ds:uri="http://purl.org/dc/dcmitype/"/>
+  </ds:schemaRefs>
+</ds:datastoreItem>
 </file>
 
-<file path=customXml/itemProps1.xml><?xml version="1.0" encoding="utf-8"?>
+<file path=customXml/itemProps2.xml><?xml version="1.0" encoding="utf-8"?>
 <ds:datastoreItem xmlns:ds="http://schemas.openxmlformats.org/officeDocument/2006/customXml" ds:itemID="{58A784AD-7888-482C-A72A-80D3063962ED}">
   <ds:schemaRefs>
     <ds:schemaRef ds:uri="http://schemas.microsoft.com/office/2006/metadata/contentType"/>
@@ -16121,22 +16398,4 @@
     <ds:schemaRef ds:uri="http://schemas.microsoft.com/internal/obd"/>
   </ds:schemaRefs>
 </ds:datastoreItem>
-</file>
-
-<file path=customXml/itemProps2.xml><?xml version="1.0" encoding="utf-8"?>
-<ds:datastoreItem xmlns:ds="http://schemas.openxmlformats.org/officeDocument/2006/customXml" ds:itemID="{8FB61CFE-D4DA-4753-A9A5-D482B9609A35}">
-  <ds:schemaRefs>
-    <ds:schemaRef ds:uri="http://schemas.microsoft.com/office/2006/metadata/properties"/>
-    <ds:schemaRef ds:uri="http://schemas.openxmlformats.org/package/2006/metadata/core-properties"/>
-    <ds:schemaRef ds:uri="http://purl.org/dc/elements/1.1/"/>
-    <ds:schemaRef ds:uri="http://schemas.microsoft.com/office/2006/documentManagement/types"/>
-    <ds:schemaRef ds:uri="http://schemas.microsoft.com/sharepoint/v3"/>
-    <ds:schemaRef ds:uri="http://purl.org/dc/terms/"/>
-    <ds:schemaRef ds:uri="http://schemas.microsoft.com/office/infopath/2007/PartnerControls"/>
-    <ds:schemaRef ds:uri="http://www.w3.org/XML/1998/namespace"/>
-    <ds:schemaRef ds:uri="fb0879af-3eba-417a-a55a-ffe6dcd6ca77"/>
-    <ds:schemaRef ds:uri="6dc4bcd6-49db-4c07-9060-8acfc67cef9f"/>
-    <ds:schemaRef ds:uri="http://purl.org/dc/dcmitype/"/>
-  </ds:schemaRefs>
-</ds:datastoreItem>
 </file>
</xml_diff>

<commit_message>
Update current progress of Lab
</commit_message>
<xml_diff>
--- a/Lab/REP.pptx
+++ b/Lab/REP.pptx
@@ -255,7 +255,7 @@
                 <a:ea typeface="Microsoft JhengHei UI" panose="020B0604030504040204" pitchFamily="34" charset="-120"/>
                 <a:sym typeface="Microsoft JhengHei UI" panose="020B0604030504040204" pitchFamily="34" charset="-120"/>
               </a:rPr>
-              <a:t>2021/1/5</a:t>
+              <a:t>2021/1/9</a:t>
             </a:fld>
             <a:endParaRPr lang="en-US" altLang="zh-TW" dirty="0">
               <a:latin typeface="Microsoft JhengHei UI" panose="020B0604030504040204" pitchFamily="34" charset="-120"/>
@@ -464,7 +464,7 @@
             <a:fld id="{AA006804-164C-4CDA-8F38-2D5258C292C6}" type="datetime1">
               <a:rPr lang="zh-TW" altLang="en-US" smtClean="0"/>
               <a:pPr/>
-              <a:t>2021/1/5</a:t>
+              <a:t>2021/1/9</a:t>
             </a:fld>
             <a:endParaRPr lang="zh-TW" altLang="en-US" dirty="0"/>
           </a:p>
@@ -11124,7 +11124,7 @@
                 <a:latin typeface="Times New Roman" panose="02020603050405020304" pitchFamily="18" charset="0"/>
                 <a:cs typeface="Times New Roman" panose="02020603050405020304" pitchFamily="18" charset="0"/>
               </a:rPr>
-              <a:t>in parallel.</a:t>
+              <a:t>  in parallel.</a:t>
             </a:r>
             <a:endParaRPr lang="en-US" sz="2400" dirty="0">
               <a:latin typeface="Times New Roman" panose="02020603050405020304" pitchFamily="18" charset="0"/>
@@ -12544,12 +12544,47 @@
           </a:p>
         </p:txBody>
       </p:sp>
+      <p:sp>
+        <p:nvSpPr>
+          <p:cNvPr id="2" name="文字方塊 1">
+            <a:extLst>
+              <a:ext uri="{FF2B5EF4-FFF2-40B4-BE49-F238E27FC236}">
+                <a16:creationId xmlns:a16="http://schemas.microsoft.com/office/drawing/2014/main" id="{5F30D373-061A-4C17-BA1D-F9A8D2B156F8}"/>
+              </a:ext>
+            </a:extLst>
+          </p:cNvPr>
+          <p:cNvSpPr txBox="1"/>
+          <p:nvPr/>
+        </p:nvSpPr>
+        <p:spPr>
+          <a:xfrm>
+            <a:off x="11484528" y="6493241"/>
+            <a:ext cx="805343" cy="276999"/>
+          </a:xfrm>
+          <a:prstGeom prst="rect">
+            <a:avLst/>
+          </a:prstGeom>
+          <a:noFill/>
+        </p:spPr>
+        <p:txBody>
+          <a:bodyPr wrap="square" rtlCol="0">
+            <a:spAutoFit/>
+          </a:bodyPr>
+          <a:lstStyle/>
+          <a:p>
+            <a:r>
+              <a:rPr lang="en-US" sz="1200" dirty="0"/>
+              <a:t>1</a:t>
+            </a:r>
+          </a:p>
+        </p:txBody>
+      </p:sp>
       <p:pic>
         <p:nvPicPr>
-          <p:cNvPr id="5" name="圖片 4">
-            <a:extLst>
-              <a:ext uri="{FF2B5EF4-FFF2-40B4-BE49-F238E27FC236}">
-                <a16:creationId xmlns:a16="http://schemas.microsoft.com/office/drawing/2014/main" id="{79DAFDD5-E509-4888-A0D9-C4EA4047A2C6}"/>
+          <p:cNvPr id="7" name="圖片 6">
+            <a:extLst>
+              <a:ext uri="{FF2B5EF4-FFF2-40B4-BE49-F238E27FC236}">
+                <a16:creationId xmlns:a16="http://schemas.microsoft.com/office/drawing/2014/main" id="{98A74D17-D6DE-4457-8A2E-6B2A91090676}"/>
               </a:ext>
             </a:extLst>
           </p:cNvPr>
@@ -12572,49 +12607,14 @@
         </p:blipFill>
         <p:spPr>
           <a:xfrm>
-            <a:off x="2354996" y="2216079"/>
-            <a:ext cx="8234592" cy="4090449"/>
+            <a:off x="1969151" y="1919007"/>
+            <a:ext cx="8337521" cy="4718185"/>
           </a:xfrm>
           <a:prstGeom prst="rect">
             <a:avLst/>
           </a:prstGeom>
         </p:spPr>
       </p:pic>
-      <p:sp>
-        <p:nvSpPr>
-          <p:cNvPr id="2" name="文字方塊 1">
-            <a:extLst>
-              <a:ext uri="{FF2B5EF4-FFF2-40B4-BE49-F238E27FC236}">
-                <a16:creationId xmlns:a16="http://schemas.microsoft.com/office/drawing/2014/main" id="{5F30D373-061A-4C17-BA1D-F9A8D2B156F8}"/>
-              </a:ext>
-            </a:extLst>
-          </p:cNvPr>
-          <p:cNvSpPr txBox="1"/>
-          <p:nvPr/>
-        </p:nvSpPr>
-        <p:spPr>
-          <a:xfrm>
-            <a:off x="11484528" y="6493241"/>
-            <a:ext cx="805343" cy="276999"/>
-          </a:xfrm>
-          <a:prstGeom prst="rect">
-            <a:avLst/>
-          </a:prstGeom>
-          <a:noFill/>
-        </p:spPr>
-        <p:txBody>
-          <a:bodyPr wrap="square" rtlCol="0">
-            <a:spAutoFit/>
-          </a:bodyPr>
-          <a:lstStyle/>
-          <a:p>
-            <a:r>
-              <a:rPr lang="en-US" sz="1200" dirty="0"/>
-              <a:t>1</a:t>
-            </a:r>
-          </a:p>
-        </p:txBody>
-      </p:sp>
     </p:spTree>
     <p:extLst>
       <p:ext uri="{BB962C8B-B14F-4D97-AF65-F5344CB8AC3E}">

</xml_diff>

<commit_message>
Remove unused files and re-constructure
</commit_message>
<xml_diff>
--- a/Lab/REP.pptx
+++ b/Lab/REP.pptx
@@ -255,7 +255,7 @@
                 <a:ea typeface="Microsoft JhengHei UI" panose="020B0604030504040204" pitchFamily="34" charset="-120"/>
                 <a:sym typeface="Microsoft JhengHei UI" panose="020B0604030504040204" pitchFamily="34" charset="-120"/>
               </a:rPr>
-              <a:t>2021/1/9</a:t>
+              <a:t>2021/1/22</a:t>
             </a:fld>
             <a:endParaRPr lang="en-US" altLang="zh-TW" dirty="0">
               <a:latin typeface="Microsoft JhengHei UI" panose="020B0604030504040204" pitchFamily="34" charset="-120"/>
@@ -464,7 +464,7 @@
             <a:fld id="{AA006804-164C-4CDA-8F38-2D5258C292C6}" type="datetime1">
               <a:rPr lang="zh-TW" altLang="en-US" smtClean="0"/>
               <a:pPr/>
-              <a:t>2021/1/9</a:t>
+              <a:t>2021/1/22</a:t>
             </a:fld>
             <a:endParaRPr lang="zh-TW" altLang="en-US" dirty="0"/>
           </a:p>
@@ -9360,7 +9360,7 @@
         </p:nvSpPr>
         <p:spPr>
           <a:xfrm>
-            <a:off x="5319426" y="3540568"/>
+            <a:off x="5323271" y="3626417"/>
             <a:ext cx="4770946" cy="1602932"/>
           </a:xfrm>
         </p:spPr>
@@ -9485,7 +9485,7 @@
         </p:nvSpPr>
         <p:spPr>
           <a:xfrm>
-            <a:off x="1319067" y="1797784"/>
+            <a:off x="1319067" y="1600367"/>
             <a:ext cx="8775150" cy="1631216"/>
           </a:xfrm>
           <a:prstGeom prst="rect">
@@ -9533,8 +9533,8 @@
         </p:nvSpPr>
         <p:spPr>
           <a:xfrm>
-            <a:off x="658377" y="5966500"/>
-            <a:ext cx="9322099" cy="835033"/>
+            <a:off x="658377" y="5426766"/>
+            <a:ext cx="9322099" cy="1374768"/>
           </a:xfrm>
           <a:prstGeom prst="rect">
             <a:avLst/>
@@ -9720,47 +9720,67 @@
             <a:r>
               <a:rPr lang="en-US" altLang="zh-TW" sz="2200" b="1" i="0" dirty="0">
                 <a:latin typeface="+mn-lt"/>
-              </a:rPr>
-              <a:t>PRJ2020-002  Team Members: </a:t>
-            </a:r>
-            <a:r>
-              <a:rPr lang="zh-TW" altLang="en-US" sz="2200" b="1" i="0" dirty="0">
-                <a:latin typeface="DFKai-SB" panose="03000509000000000000" pitchFamily="65" charset="-120"/>
                 <a:ea typeface="DFKai-SB" panose="03000509000000000000" pitchFamily="65" charset="-120"/>
               </a:rPr>
-              <a:t>李昱廷 郭為軒 曹仲辰 吳岳霖 林裕峰</a:t>
+              <a:t>Lecturer:  </a:t>
+            </a:r>
+            <a:r>
+              <a:rPr lang="en-US" altLang="zh-TW" sz="2200" b="1" i="0" dirty="0" err="1">
+                <a:latin typeface="+mn-lt"/>
+                <a:ea typeface="DFKai-SB" panose="03000509000000000000" pitchFamily="65" charset="-120"/>
+              </a:rPr>
+              <a:t>Quert</a:t>
             </a:r>
             <a:endParaRPr lang="en-US" altLang="zh-TW" sz="2200" b="1" i="0" dirty="0">
-              <a:latin typeface="DFKai-SB" panose="03000509000000000000" pitchFamily="65" charset="-120"/>
+              <a:latin typeface="+mn-lt"/>
               <a:ea typeface="DFKai-SB" panose="03000509000000000000" pitchFamily="65" charset="-120"/>
             </a:endParaRPr>
           </a:p>
           <a:p>
-            <a:r>
-              <a:rPr lang="en-US" altLang="zh-TW" sz="2200" b="1" i="0" dirty="0">
-                <a:latin typeface="DFKai-SB" panose="03000509000000000000" pitchFamily="65" charset="-120"/>
-                <a:ea typeface="DFKai-SB" panose="03000509000000000000" pitchFamily="65" charset="-120"/>
-              </a:rPr>
-              <a:t>	      </a:t>
-            </a:r>
             <a:r>
               <a:rPr lang="en-US" altLang="zh-TW" sz="2200" b="1" i="0" dirty="0">
                 <a:latin typeface="+mn-lt"/>
                 <a:ea typeface="DFKai-SB" panose="03000509000000000000" pitchFamily="65" charset="-120"/>
               </a:rPr>
-              <a:t>Instructor: </a:t>
-            </a:r>
-            <a:r>
-              <a:rPr lang="zh-TW" altLang="en-US" sz="2200" b="1" i="0" dirty="0">
+              <a:t>Producer: </a:t>
+            </a:r>
+            <a:r>
+              <a:rPr lang="en-US" altLang="zh-TW" sz="2200" b="1" i="0" dirty="0" err="1">
                 <a:latin typeface="+mn-lt"/>
                 <a:ea typeface="DFKai-SB" panose="03000509000000000000" pitchFamily="65" charset="-120"/>
               </a:rPr>
-              <a:t>         張炎清 教授</a:t>
-            </a:r>
-            <a:endParaRPr lang="en-US" altLang="zh-TW" sz="2200" b="1" i="0" dirty="0">
-              <a:latin typeface="+mn-lt"/>
-              <a:ea typeface="DFKai-SB" panose="03000509000000000000" pitchFamily="65" charset="-120"/>
-            </a:endParaRPr>
+              <a:t>TechEDU</a:t>
+            </a:r>
+            <a:r>
+              <a:rPr lang="en-US" altLang="zh-TW" sz="2200" b="1" i="0" dirty="0">
+                <a:latin typeface="+mn-lt"/>
+                <a:ea typeface="DFKai-SB" panose="03000509000000000000" pitchFamily="65" charset="-120"/>
+              </a:rPr>
+              <a:t> Studio</a:t>
+            </a:r>
+          </a:p>
+          <a:p>
+            <a:r>
+              <a:rPr lang="en-US" altLang="zh-TW" sz="2200" b="1" i="0" dirty="0">
+                <a:latin typeface="+mn-lt"/>
+                <a:ea typeface="DFKai-SB" panose="03000509000000000000" pitchFamily="65" charset="-120"/>
+              </a:rPr>
+              <a:t>Copyright: </a:t>
+            </a:r>
+            <a:r>
+              <a:rPr lang="en-US" altLang="zh-TW" sz="2200" b="1" i="0" dirty="0" err="1">
+                <a:latin typeface="+mn-lt"/>
+                <a:ea typeface="DFKai-SB" panose="03000509000000000000" pitchFamily="65" charset="-120"/>
+              </a:rPr>
+              <a:t>TechEDU</a:t>
+            </a:r>
+            <a:r>
+              <a:rPr lang="en-US" altLang="zh-TW" sz="2200" b="1" i="0" dirty="0">
+                <a:latin typeface="+mn-lt"/>
+                <a:ea typeface="DFKai-SB" panose="03000509000000000000" pitchFamily="65" charset="-120"/>
+              </a:rPr>
+              <a:t> Studio</a:t>
+            </a:r>
           </a:p>
         </p:txBody>
       </p:sp>
@@ -15279,7 +15299,7 @@
         <p:spPr>
           <a:xfrm>
             <a:off x="1430548" y="2272206"/>
-            <a:ext cx="6236772" cy="461665"/>
+            <a:ext cx="6322693" cy="461665"/>
           </a:xfrm>
           <a:prstGeom prst="rect">
             <a:avLst/>
@@ -15304,18 +15324,11 @@
               <a:t>BERT:  </a:t>
             </a:r>
             <a:r>
-              <a:rPr lang="en-US" sz="2400" dirty="0" err="1">
-                <a:latin typeface="Calibri" panose="020F0502020204030204" pitchFamily="34" charset="0"/>
-                <a:cs typeface="Calibri" panose="020F0502020204030204" pitchFamily="34" charset="0"/>
-              </a:rPr>
-              <a:t>Maskd</a:t>
-            </a:r>
-            <a:r>
               <a:rPr lang="en-US" sz="2400" dirty="0">
                 <a:latin typeface="Calibri" panose="020F0502020204030204" pitchFamily="34" charset="0"/>
                 <a:cs typeface="Calibri" panose="020F0502020204030204" pitchFamily="34" charset="0"/>
               </a:rPr>
-              <a:t> LM &amp; Next Sentence Prediction</a:t>
+              <a:t>Masked LM &amp; Next Sentence Prediction</a:t>
             </a:r>
           </a:p>
         </p:txBody>

</xml_diff>